<commit_message>
turbo king annimations 1/2 done
</commit_message>
<xml_diff>
--- a/doc/MidTerm/MidTerm.pptx
+++ b/doc/MidTerm/MidTerm.pptx
@@ -4172,21 +4172,7 @@
                 <a:latin typeface="Segoe Light"/>
                 <a:cs typeface="Segoe Light"/>
               </a:rPr>
-              <a:t>An Internet Latency </a:t>
-            </a:r>
-            <a:r>
-              <a:rPr lang="en-US" dirty="0" smtClean="0">
-                <a:latin typeface="Segoe Light"/>
-                <a:cs typeface="Segoe Light"/>
-              </a:rPr>
-              <a:t>Measurement </a:t>
-            </a:r>
-            <a:r>
-              <a:rPr lang="en-US" dirty="0" smtClean="0">
-                <a:latin typeface="Segoe Light"/>
-                <a:cs typeface="Segoe Light"/>
-              </a:rPr>
-              <a:t>Study</a:t>
+              <a:t>An Internet Latency Measurement Study</a:t>
             </a:r>
             <a:endParaRPr lang="en-US" dirty="0">
               <a:latin typeface="Segoe Light"/>
@@ -4248,6 +4234,13 @@
   <p:clrMapOvr>
     <a:masterClrMapping/>
   </p:clrMapOvr>
+  <p:timing>
+    <p:tnLst>
+      <p:par>
+        <p:cTn xmlns:p14="http://schemas.microsoft.com/office/powerpoint/2010/main" id="1" dur="indefinite" restart="never" nodeType="tmRoot"/>
+      </p:par>
+    </p:tnLst>
+  </p:timing>
 </p:sld>
 </file>
 
@@ -4329,19 +4322,18 @@
                 <a:latin typeface="Segoe Light"/>
                 <a:cs typeface="Segoe Light"/>
               </a:rPr>
-              <a:t>We seek to measure and characterize latency </a:t>
-            </a:r>
+              <a:t>We seek to measure and characterize latency as it relates to:</a:t>
+            </a:r>
+          </a:p>
+          <a:p>
+            <a:pPr lvl="1"/>
             <a:r>
               <a:rPr lang="en-US" dirty="0" smtClean="0">
                 <a:latin typeface="Segoe Light"/>
                 <a:cs typeface="Segoe Light"/>
               </a:rPr>
-              <a:t>as it relates to:</a:t>
-            </a:r>
-            <a:endParaRPr lang="en-US" dirty="0" smtClean="0">
-              <a:latin typeface="Segoe Light"/>
-              <a:cs typeface="Segoe Light"/>
-            </a:endParaRPr>
+              <a:t>Wide Area Networks</a:t>
+            </a:r>
           </a:p>
           <a:p>
             <a:pPr lvl="1"/>
@@ -4350,54 +4342,18 @@
                 <a:latin typeface="Segoe Light"/>
                 <a:cs typeface="Segoe Light"/>
               </a:rPr>
-              <a:t>Wide Area </a:t>
-            </a:r>
+              <a:t>Data Centers*</a:t>
+            </a:r>
+          </a:p>
+          <a:p>
+            <a:pPr lvl="1"/>
             <a:r>
               <a:rPr lang="en-US" dirty="0" smtClean="0">
                 <a:latin typeface="Segoe Light"/>
                 <a:cs typeface="Segoe Light"/>
               </a:rPr>
-              <a:t>Networks</a:t>
-            </a:r>
-            <a:endParaRPr lang="en-US" dirty="0" smtClean="0">
-              <a:latin typeface="Segoe Light"/>
-              <a:cs typeface="Segoe Light"/>
-            </a:endParaRPr>
-          </a:p>
-          <a:p>
-            <a:pPr lvl="1"/>
-            <a:r>
-              <a:rPr lang="en-US" dirty="0" smtClean="0">
-                <a:latin typeface="Segoe Light"/>
-                <a:cs typeface="Segoe Light"/>
-              </a:rPr>
-              <a:t>Data Centers*</a:t>
-            </a:r>
-            <a:endParaRPr lang="en-US" dirty="0" smtClean="0">
-              <a:latin typeface="Segoe Light"/>
-              <a:cs typeface="Segoe Light"/>
-            </a:endParaRPr>
-          </a:p>
-          <a:p>
-            <a:pPr lvl="1"/>
-            <a:r>
-              <a:rPr lang="en-US" dirty="0" smtClean="0">
-                <a:latin typeface="Segoe Light"/>
-                <a:cs typeface="Segoe Light"/>
-              </a:rPr>
-              <a:t>Cellular </a:t>
-            </a:r>
-            <a:r>
-              <a:rPr lang="en-US" dirty="0" smtClean="0">
-                <a:latin typeface="Segoe Light"/>
-                <a:cs typeface="Segoe Light"/>
-              </a:rPr>
-              <a:t>Networks</a:t>
-            </a:r>
-            <a:endParaRPr lang="en-US" dirty="0" smtClean="0">
-              <a:latin typeface="Segoe Light"/>
-              <a:cs typeface="Segoe Light"/>
-            </a:endParaRPr>
+              <a:t>Cellular Networks</a:t>
+            </a:r>
           </a:p>
         </p:txBody>
       </p:sp>
@@ -4583,6 +4539,13 @@
   <p:clrMapOvr>
     <a:masterClrMapping/>
   </p:clrMapOvr>
+  <p:timing>
+    <p:tnLst>
+      <p:par>
+        <p:cTn xmlns:p14="http://schemas.microsoft.com/office/powerpoint/2010/main" id="1" dur="indefinite" restart="never" nodeType="tmRoot"/>
+      </p:par>
+    </p:tnLst>
+  </p:timing>
 </p:sld>
 </file>
 
@@ -4686,40 +4649,18 @@
                 <a:latin typeface="Segoe Light"/>
                 <a:cs typeface="Segoe Light"/>
               </a:rPr>
-              <a:t>Geographical </a:t>
-            </a:r>
+              <a:t>Geographical correlation (Latency vs. Distance)</a:t>
+            </a:r>
+          </a:p>
+          <a:p>
+            <a:pPr lvl="1"/>
             <a:r>
               <a:rPr lang="en-US" sz="2400" dirty="0" smtClean="0">
                 <a:latin typeface="Segoe Light"/>
                 <a:cs typeface="Segoe Light"/>
               </a:rPr>
-              <a:t>correlation (Latency vs. Distance)</a:t>
-            </a:r>
-            <a:endParaRPr lang="en-US" sz="2400" dirty="0" smtClean="0">
-              <a:latin typeface="Segoe Light"/>
-              <a:cs typeface="Segoe Light"/>
-            </a:endParaRPr>
-          </a:p>
-          <a:p>
-            <a:pPr lvl="1"/>
-            <a:r>
-              <a:rPr lang="en-US" sz="2400" dirty="0" smtClean="0">
-                <a:latin typeface="Segoe Light"/>
-                <a:cs typeface="Segoe Light"/>
-              </a:rPr>
-              <a:t>Time-series </a:t>
-            </a:r>
-            <a:r>
-              <a:rPr lang="en-US" sz="2400" dirty="0" smtClean="0">
-                <a:latin typeface="Segoe Light"/>
-                <a:cs typeface="Segoe Light"/>
-              </a:rPr>
-              <a:t>patterns</a:t>
-            </a:r>
-            <a:endParaRPr lang="en-US" sz="2400" dirty="0" smtClean="0">
-              <a:latin typeface="Segoe Light"/>
-              <a:cs typeface="Segoe Light"/>
-            </a:endParaRPr>
+              <a:t>Time-series patterns</a:t>
+            </a:r>
           </a:p>
           <a:p>
             <a:pPr lvl="1"/>
@@ -4744,29 +4685,18 @@
                 <a:latin typeface="Segoe Light"/>
                 <a:cs typeface="Segoe Light"/>
               </a:rPr>
-              <a:t>User ----&gt; WAN ----&gt; DC ----&gt; WAN ----&gt; </a:t>
-            </a:r>
+              <a:t>User ----&gt; WAN ----&gt; DC ----&gt; WAN ----&gt; User</a:t>
+            </a:r>
+          </a:p>
+          <a:p>
+            <a:pPr lvl="1"/>
             <a:r>
               <a:rPr lang="en-US" sz="2000" dirty="0" smtClean="0">
                 <a:latin typeface="Segoe Light"/>
                 <a:cs typeface="Segoe Light"/>
               </a:rPr>
-              <a:t>User</a:t>
-            </a:r>
-          </a:p>
-          <a:p>
-            <a:pPr lvl="1"/>
-            <a:r>
-              <a:rPr lang="en-US" sz="2000" dirty="0" smtClean="0">
-                <a:latin typeface="Segoe Light"/>
-                <a:cs typeface="Segoe Light"/>
-              </a:rPr>
               <a:t>Discover the fraction of latency on WAN and inside DC</a:t>
             </a:r>
-            <a:endParaRPr lang="en-US" sz="2000" dirty="0" smtClean="0">
-              <a:latin typeface="Segoe Light"/>
-              <a:cs typeface="Segoe Light"/>
-            </a:endParaRPr>
           </a:p>
           <a:p>
             <a:pPr marL="457200" lvl="1" indent="0">
@@ -4845,6 +4775,13 @@
   <p:clrMapOvr>
     <a:masterClrMapping/>
   </p:clrMapOvr>
+  <p:timing>
+    <p:tnLst>
+      <p:par>
+        <p:cTn xmlns:p14="http://schemas.microsoft.com/office/powerpoint/2010/main" id="1" dur="indefinite" restart="never" nodeType="tmRoot"/>
+      </p:par>
+    </p:tnLst>
+  </p:timing>
 </p:sld>
 </file>
 
@@ -5189,6 +5126,13 @@
   <p:clrMapOvr>
     <a:masterClrMapping/>
   </p:clrMapOvr>
+  <p:timing>
+    <p:tnLst>
+      <p:par>
+        <p:cTn xmlns:p14="http://schemas.microsoft.com/office/powerpoint/2010/main" id="1" dur="indefinite" restart="never" nodeType="tmRoot"/>
+      </p:par>
+    </p:tnLst>
+  </p:timing>
 </p:sld>
 </file>
 
@@ -5282,21 +5226,27 @@
                 <a:latin typeface="Segoe Light"/>
                 <a:cs typeface="Segoe Light"/>
               </a:rPr>
-              <a:t>Measurement methodologies are based </a:t>
-            </a:r>
+              <a:t>Measurement methodologies are based on the King/T-King methods (recursive DNS query)</a:t>
+            </a:r>
+          </a:p>
+          <a:p>
+            <a:pPr lvl="1"/>
             <a:r>
               <a:rPr lang="en-US" sz="1600" dirty="0" smtClean="0">
                 <a:latin typeface="Segoe Light"/>
                 <a:cs typeface="Segoe Light"/>
               </a:rPr>
-              <a:t>on the King/T-King methods </a:t>
-            </a:r>
+              <a:t>Do a continuous study on a daily/weekly basis</a:t>
+            </a:r>
+          </a:p>
+          <a:p>
+            <a:pPr lvl="1"/>
             <a:r>
               <a:rPr lang="en-US" sz="1600" dirty="0" smtClean="0">
                 <a:latin typeface="Segoe Light"/>
                 <a:cs typeface="Segoe Light"/>
               </a:rPr>
-              <a:t>(recursive DNS query)</a:t>
+              <a:t>Use various techniques to infer DNS server locations and perform correlation</a:t>
             </a:r>
           </a:p>
           <a:p>
@@ -5306,34 +5256,7 @@
                 <a:latin typeface="Segoe Light"/>
                 <a:cs typeface="Segoe Light"/>
               </a:rPr>
-              <a:t>Do a continuous study on a daily/weekly basis</a:t>
-            </a:r>
-          </a:p>
-          <a:p>
-            <a:pPr lvl="1"/>
-            <a:r>
-              <a:rPr lang="en-US" sz="1600" dirty="0" smtClean="0">
-                <a:latin typeface="Segoe Light"/>
-                <a:cs typeface="Segoe Light"/>
-              </a:rPr>
-              <a:t>Use various techniques to infer DNS server locations and perform correlation</a:t>
-            </a:r>
-          </a:p>
-          <a:p>
-            <a:pPr lvl="1"/>
-            <a:r>
-              <a:rPr lang="en-US" sz="1600" dirty="0" smtClean="0">
-                <a:latin typeface="Segoe Light"/>
-                <a:cs typeface="Segoe Light"/>
-              </a:rPr>
-              <a:t>Filter out DNS forwarders tha</a:t>
-            </a:r>
-            <a:r>
-              <a:rPr lang="en-US" sz="1600" dirty="0" smtClean="0">
-                <a:latin typeface="Segoe Light"/>
-                <a:cs typeface="Segoe Light"/>
-              </a:rPr>
-              <a:t>t would otherwise skew results</a:t>
+              <a:t>Filter out DNS forwarders that would otherwise skew results</a:t>
             </a:r>
           </a:p>
           <a:p>
@@ -5378,10 +5301,6 @@
               </a:rPr>
               <a:t>Perform Query to determine DC time (Query Time – Ping RTT)</a:t>
             </a:r>
-            <a:endParaRPr lang="en-US" sz="1600" dirty="0" smtClean="0">
-              <a:latin typeface="Segoe Light"/>
-              <a:cs typeface="Segoe Light"/>
-            </a:endParaRPr>
           </a:p>
           <a:p>
             <a:pPr lvl="1"/>
@@ -5390,21 +5309,7 @@
                 <a:latin typeface="Segoe Light"/>
                 <a:cs typeface="Segoe Light"/>
               </a:rPr>
-              <a:t>To </a:t>
-            </a:r>
-            <a:r>
-              <a:rPr lang="en-US" sz="1600" dirty="0" smtClean="0">
-                <a:latin typeface="Segoe Light"/>
-                <a:cs typeface="Segoe Light"/>
-              </a:rPr>
-              <a:t>eliminate caching, we are </a:t>
-            </a:r>
-            <a:r>
-              <a:rPr lang="en-US" sz="1600" dirty="0" smtClean="0">
-                <a:latin typeface="Segoe Light"/>
-                <a:cs typeface="Segoe Light"/>
-              </a:rPr>
-              <a:t>considering (we would love feedback!)</a:t>
+              <a:t>To eliminate caching, we are considering (we would love feedback!)</a:t>
             </a:r>
           </a:p>
           <a:p>
@@ -5449,10 +5354,6 @@
               </a:rPr>
               <a:t>Mobile</a:t>
             </a:r>
-            <a:endParaRPr lang="en-US" sz="2000" dirty="0" smtClean="0">
-              <a:latin typeface="Segoe Light"/>
-              <a:cs typeface="Segoe Light"/>
-            </a:endParaRPr>
           </a:p>
           <a:p>
             <a:pPr lvl="1"/>
@@ -5487,10 +5388,6 @@
               </a:rPr>
               <a:t> to reverse engineer network topology</a:t>
             </a:r>
-            <a:endParaRPr lang="en-US" sz="1600" dirty="0" smtClean="0">
-              <a:latin typeface="Segoe Light"/>
-              <a:cs typeface="Segoe Light"/>
-            </a:endParaRPr>
           </a:p>
         </p:txBody>
       </p:sp>
@@ -5504,6 +5401,13 @@
   <p:clrMapOvr>
     <a:masterClrMapping/>
   </p:clrMapOvr>
+  <p:timing>
+    <p:tnLst>
+      <p:par>
+        <p:cTn xmlns:p14="http://schemas.microsoft.com/office/powerpoint/2010/main" id="1" dur="indefinite" restart="never" nodeType="tmRoot"/>
+      </p:par>
+    </p:tnLst>
+  </p:timing>
 </p:sld>
 </file>
 
@@ -5562,39 +5466,596 @@
       </p:sp>
       <p:sp>
         <p:nvSpPr>
-          <p:cNvPr id="3" name="Content Placeholder 2"/>
-          <p:cNvSpPr>
-            <a:spLocks noGrp="1"/>
-          </p:cNvSpPr>
-          <p:nvPr>
-            <p:ph idx="1"/>
-          </p:nvPr>
+          <p:cNvPr id="34" name="TextBox 33"/>
+          <p:cNvSpPr txBox="1"/>
+          <p:nvPr/>
         </p:nvSpPr>
         <p:spPr>
           <a:xfrm>
-            <a:off x="457200" y="1228193"/>
-            <a:ext cx="8229600" cy="5122129"/>
+            <a:off x="2124648" y="4380099"/>
+            <a:ext cx="184666" cy="369332"/>
           </a:xfrm>
+          <a:prstGeom prst="rect">
+            <a:avLst/>
+          </a:prstGeom>
+          <a:noFill/>
         </p:spPr>
         <p:txBody>
-          <a:bodyPr>
-            <a:normAutofit/>
+          <a:bodyPr wrap="none" rtlCol="0">
+            <a:spAutoFit/>
           </a:bodyPr>
           <a:lstStyle/>
           <a:p>
-            <a:endParaRPr lang="en-US" sz="2400" dirty="0" smtClean="0">
-              <a:latin typeface="Segoe Light"/>
-              <a:cs typeface="Segoe Light"/>
-            </a:endParaRPr>
-          </a:p>
-          <a:p>
-            <a:endParaRPr lang="en-US" sz="2400" dirty="0">
-              <a:latin typeface="Segoe Light"/>
-              <a:cs typeface="Segoe Light"/>
-            </a:endParaRPr>
-          </a:p>
-        </p:txBody>
-      </p:sp>
+            <a:endParaRPr lang="en-US" dirty="0"/>
+          </a:p>
+        </p:txBody>
+      </p:sp>
+      <p:grpSp>
+        <p:nvGrpSpPr>
+          <p:cNvPr id="25" name="Group 24"/>
+          <p:cNvGrpSpPr/>
+          <p:nvPr/>
+        </p:nvGrpSpPr>
+        <p:grpSpPr>
+          <a:xfrm>
+            <a:off x="617227" y="1556562"/>
+            <a:ext cx="1493070" cy="1921161"/>
+            <a:chOff x="427307" y="1449733"/>
+            <a:chExt cx="1364994" cy="1585419"/>
+          </a:xfrm>
+        </p:grpSpPr>
+        <p:sp>
+          <p:nvSpPr>
+            <p:cNvPr id="4" name="Rectangle 3"/>
+            <p:cNvSpPr/>
+            <p:nvPr/>
+          </p:nvSpPr>
+          <p:spPr>
+            <a:xfrm>
+              <a:off x="427307" y="1449733"/>
+              <a:ext cx="1364994" cy="1585419"/>
+            </a:xfrm>
+            <a:prstGeom prst="rect">
+              <a:avLst/>
+            </a:prstGeom>
+          </p:spPr>
+          <p:style>
+            <a:lnRef idx="1">
+              <a:schemeClr val="accent1"/>
+            </a:lnRef>
+            <a:fillRef idx="3">
+              <a:schemeClr val="accent1"/>
+            </a:fillRef>
+            <a:effectRef idx="2">
+              <a:schemeClr val="accent1"/>
+            </a:effectRef>
+            <a:fontRef idx="minor">
+              <a:schemeClr val="lt1"/>
+            </a:fontRef>
+          </p:style>
+          <p:txBody>
+            <a:bodyPr rtlCol="0" anchor="ctr"/>
+            <a:lstStyle/>
+            <a:p>
+              <a:pPr algn="ctr"/>
+              <a:endParaRPr lang="en-US" dirty="0"/>
+            </a:p>
+          </p:txBody>
+        </p:sp>
+        <p:sp>
+          <p:nvSpPr>
+            <p:cNvPr id="13" name="Rounded Rectangle 12"/>
+            <p:cNvSpPr/>
+            <p:nvPr/>
+          </p:nvSpPr>
+          <p:spPr>
+            <a:xfrm>
+              <a:off x="526831" y="1578727"/>
+              <a:ext cx="1165934" cy="557908"/>
+            </a:xfrm>
+            <a:prstGeom prst="roundRect">
+              <a:avLst/>
+            </a:prstGeom>
+            <a:ln/>
+          </p:spPr>
+          <p:style>
+            <a:lnRef idx="1">
+              <a:schemeClr val="accent6"/>
+            </a:lnRef>
+            <a:fillRef idx="3">
+              <a:schemeClr val="accent6"/>
+            </a:fillRef>
+            <a:effectRef idx="2">
+              <a:schemeClr val="accent6"/>
+            </a:effectRef>
+            <a:fontRef idx="minor">
+              <a:schemeClr val="lt1"/>
+            </a:fontRef>
+          </p:style>
+          <p:txBody>
+            <a:bodyPr rtlCol="0" anchor="ctr"/>
+            <a:lstStyle/>
+            <a:p>
+              <a:pPr algn="ctr"/>
+              <a:r>
+                <a:rPr lang="en-US" sz="1600" dirty="0" smtClean="0"/>
+                <a:t>DNS Client</a:t>
+              </a:r>
+              <a:endParaRPr lang="en-US" sz="1600" dirty="0"/>
+            </a:p>
+          </p:txBody>
+        </p:sp>
+        <p:sp>
+          <p:nvSpPr>
+            <p:cNvPr id="14" name="Rounded Rectangle 13"/>
+            <p:cNvSpPr/>
+            <p:nvPr/>
+          </p:nvSpPr>
+          <p:spPr>
+            <a:xfrm>
+              <a:off x="524543" y="2324627"/>
+              <a:ext cx="1165934" cy="559829"/>
+            </a:xfrm>
+            <a:prstGeom prst="roundRect">
+              <a:avLst/>
+            </a:prstGeom>
+          </p:spPr>
+          <p:style>
+            <a:lnRef idx="1">
+              <a:schemeClr val="accent6"/>
+            </a:lnRef>
+            <a:fillRef idx="3">
+              <a:schemeClr val="accent6"/>
+            </a:fillRef>
+            <a:effectRef idx="2">
+              <a:schemeClr val="accent6"/>
+            </a:effectRef>
+            <a:fontRef idx="minor">
+              <a:schemeClr val="lt1"/>
+            </a:fontRef>
+          </p:style>
+          <p:txBody>
+            <a:bodyPr rtlCol="0" anchor="ctr"/>
+            <a:lstStyle/>
+            <a:p>
+              <a:pPr algn="ctr"/>
+              <a:r>
+                <a:rPr lang="en-US" sz="1600" dirty="0" smtClean="0"/>
+                <a:t>DNS Server</a:t>
+              </a:r>
+              <a:endParaRPr lang="en-US" sz="1600" dirty="0"/>
+            </a:p>
+          </p:txBody>
+        </p:sp>
+      </p:grpSp>
+      <p:cxnSp>
+        <p:nvCxnSpPr>
+          <p:cNvPr id="6" name="Straight Arrow Connector 5"/>
+          <p:cNvCxnSpPr/>
+          <p:nvPr/>
+        </p:nvCxnSpPr>
+        <p:spPr>
+          <a:xfrm>
+            <a:off x="2058349" y="1842326"/>
+            <a:ext cx="1752764" cy="0"/>
+          </a:xfrm>
+          <a:prstGeom prst="straightConnector1">
+            <a:avLst/>
+          </a:prstGeom>
+          <a:ln>
+            <a:solidFill>
+              <a:schemeClr val="tx1"/>
+            </a:solidFill>
+            <a:tailEnd type="arrow"/>
+          </a:ln>
+        </p:spPr>
+        <p:style>
+          <a:lnRef idx="2">
+            <a:schemeClr val="accent1"/>
+          </a:lnRef>
+          <a:fillRef idx="0">
+            <a:schemeClr val="accent1"/>
+          </a:fillRef>
+          <a:effectRef idx="1">
+            <a:schemeClr val="accent1"/>
+          </a:effectRef>
+          <a:fontRef idx="minor">
+            <a:schemeClr val="tx1"/>
+          </a:fontRef>
+        </p:style>
+      </p:cxnSp>
+      <p:sp>
+        <p:nvSpPr>
+          <p:cNvPr id="19" name="Rectangle 18"/>
+          <p:cNvSpPr/>
+          <p:nvPr/>
+        </p:nvSpPr>
+        <p:spPr>
+          <a:xfrm>
+            <a:off x="3850047" y="1568607"/>
+            <a:ext cx="1493090" cy="1921161"/>
+          </a:xfrm>
+          <a:prstGeom prst="rect">
+            <a:avLst/>
+          </a:prstGeom>
+        </p:spPr>
+        <p:style>
+          <a:lnRef idx="1">
+            <a:schemeClr val="accent1"/>
+          </a:lnRef>
+          <a:fillRef idx="3">
+            <a:schemeClr val="accent1"/>
+          </a:fillRef>
+          <a:effectRef idx="2">
+            <a:schemeClr val="accent1"/>
+          </a:effectRef>
+          <a:fontRef idx="minor">
+            <a:schemeClr val="lt1"/>
+          </a:fontRef>
+        </p:style>
+        <p:txBody>
+          <a:bodyPr rtlCol="0" anchor="ctr"/>
+          <a:lstStyle/>
+          <a:p>
+            <a:pPr algn="ctr"/>
+            <a:r>
+              <a:rPr lang="en-US" sz="1500" dirty="0" smtClean="0"/>
+              <a:t>ns.target1.com</a:t>
+            </a:r>
+          </a:p>
+          <a:p>
+            <a:pPr algn="ctr"/>
+            <a:r>
+              <a:rPr lang="en-US" sz="1500" dirty="0" smtClean="0"/>
+              <a:t>(Recursive)</a:t>
+            </a:r>
+            <a:endParaRPr lang="en-US" sz="1500" dirty="0"/>
+          </a:p>
+        </p:txBody>
+      </p:sp>
+      <p:cxnSp>
+        <p:nvCxnSpPr>
+          <p:cNvPr id="22" name="Straight Arrow Connector 21"/>
+          <p:cNvCxnSpPr/>
+          <p:nvPr/>
+        </p:nvCxnSpPr>
+        <p:spPr>
+          <a:xfrm>
+            <a:off x="2071333" y="2774963"/>
+            <a:ext cx="1752764" cy="0"/>
+          </a:xfrm>
+          <a:prstGeom prst="straightConnector1">
+            <a:avLst/>
+          </a:prstGeom>
+          <a:ln>
+            <a:solidFill>
+              <a:schemeClr val="tx1"/>
+            </a:solidFill>
+            <a:tailEnd type="arrow"/>
+          </a:ln>
+        </p:spPr>
+        <p:style>
+          <a:lnRef idx="2">
+            <a:schemeClr val="accent1"/>
+          </a:lnRef>
+          <a:fillRef idx="0">
+            <a:schemeClr val="accent1"/>
+          </a:fillRef>
+          <a:effectRef idx="1">
+            <a:schemeClr val="accent1"/>
+          </a:effectRef>
+          <a:fontRef idx="minor">
+            <a:schemeClr val="tx1"/>
+          </a:fontRef>
+        </p:style>
+      </p:cxnSp>
+      <p:cxnSp>
+        <p:nvCxnSpPr>
+          <p:cNvPr id="23" name="Straight Arrow Connector 22"/>
+          <p:cNvCxnSpPr/>
+          <p:nvPr/>
+        </p:nvCxnSpPr>
+        <p:spPr>
+          <a:xfrm flipH="1">
+            <a:off x="2030292" y="3189775"/>
+            <a:ext cx="1752764" cy="0"/>
+          </a:xfrm>
+          <a:prstGeom prst="straightConnector1">
+            <a:avLst/>
+          </a:prstGeom>
+          <a:ln>
+            <a:solidFill>
+              <a:schemeClr val="tx1"/>
+            </a:solidFill>
+            <a:tailEnd type="arrow"/>
+          </a:ln>
+        </p:spPr>
+        <p:style>
+          <a:lnRef idx="2">
+            <a:schemeClr val="accent1"/>
+          </a:lnRef>
+          <a:fillRef idx="0">
+            <a:schemeClr val="accent1"/>
+          </a:fillRef>
+          <a:effectRef idx="1">
+            <a:schemeClr val="accent1"/>
+          </a:effectRef>
+          <a:fontRef idx="minor">
+            <a:schemeClr val="tx1"/>
+          </a:fontRef>
+        </p:style>
+      </p:cxnSp>
+      <p:cxnSp>
+        <p:nvCxnSpPr>
+          <p:cNvPr id="24" name="Straight Arrow Connector 23"/>
+          <p:cNvCxnSpPr/>
+          <p:nvPr/>
+        </p:nvCxnSpPr>
+        <p:spPr>
+          <a:xfrm flipH="1">
+            <a:off x="2045365" y="2252509"/>
+            <a:ext cx="1752764" cy="0"/>
+          </a:xfrm>
+          <a:prstGeom prst="straightConnector1">
+            <a:avLst/>
+          </a:prstGeom>
+          <a:ln>
+            <a:solidFill>
+              <a:schemeClr val="tx1"/>
+            </a:solidFill>
+            <a:tailEnd type="arrow"/>
+          </a:ln>
+        </p:spPr>
+        <p:style>
+          <a:lnRef idx="2">
+            <a:schemeClr val="accent1"/>
+          </a:lnRef>
+          <a:fillRef idx="0">
+            <a:schemeClr val="accent1"/>
+          </a:fillRef>
+          <a:effectRef idx="1">
+            <a:schemeClr val="accent1"/>
+          </a:effectRef>
+          <a:fontRef idx="minor">
+            <a:schemeClr val="tx1"/>
+          </a:fontRef>
+        </p:style>
+      </p:cxnSp>
+      <p:sp>
+        <p:nvSpPr>
+          <p:cNvPr id="26" name="Rectangle 25"/>
+          <p:cNvSpPr/>
+          <p:nvPr/>
+        </p:nvSpPr>
+        <p:spPr>
+          <a:xfrm>
+            <a:off x="7171670" y="1556562"/>
+            <a:ext cx="1493090" cy="1921161"/>
+          </a:xfrm>
+          <a:prstGeom prst="rect">
+            <a:avLst/>
+          </a:prstGeom>
+        </p:spPr>
+        <p:style>
+          <a:lnRef idx="1">
+            <a:schemeClr val="accent1"/>
+          </a:lnRef>
+          <a:fillRef idx="3">
+            <a:schemeClr val="accent1"/>
+          </a:fillRef>
+          <a:effectRef idx="2">
+            <a:schemeClr val="accent1"/>
+          </a:effectRef>
+          <a:fontRef idx="minor">
+            <a:schemeClr val="lt1"/>
+          </a:fontRef>
+        </p:style>
+        <p:txBody>
+          <a:bodyPr rtlCol="0" anchor="ctr"/>
+          <a:lstStyle/>
+          <a:p>
+            <a:pPr algn="ctr"/>
+            <a:r>
+              <a:rPr lang="en-US" sz="1500" dirty="0" smtClean="0"/>
+              <a:t>ns.target2.com</a:t>
+            </a:r>
+          </a:p>
+          <a:p>
+            <a:pPr algn="ctr"/>
+            <a:r>
+              <a:rPr lang="en-US" sz="1500" dirty="0" smtClean="0"/>
+              <a:t>(Recursive or Iterative)</a:t>
+            </a:r>
+            <a:endParaRPr lang="en-US" sz="1500" dirty="0"/>
+          </a:p>
+        </p:txBody>
+      </p:sp>
+      <p:cxnSp>
+        <p:nvCxnSpPr>
+          <p:cNvPr id="27" name="Straight Arrow Connector 26"/>
+          <p:cNvCxnSpPr/>
+          <p:nvPr/>
+        </p:nvCxnSpPr>
+        <p:spPr>
+          <a:xfrm flipH="1">
+            <a:off x="2110297" y="3477723"/>
+            <a:ext cx="1713799" cy="1575279"/>
+          </a:xfrm>
+          <a:prstGeom prst="straightConnector1">
+            <a:avLst/>
+          </a:prstGeom>
+          <a:ln>
+            <a:solidFill>
+              <a:schemeClr val="tx1"/>
+            </a:solidFill>
+            <a:tailEnd type="arrow"/>
+          </a:ln>
+        </p:spPr>
+        <p:style>
+          <a:lnRef idx="2">
+            <a:schemeClr val="accent1"/>
+          </a:lnRef>
+          <a:fillRef idx="0">
+            <a:schemeClr val="accent1"/>
+          </a:fillRef>
+          <a:effectRef idx="1">
+            <a:schemeClr val="accent1"/>
+          </a:effectRef>
+          <a:fontRef idx="minor">
+            <a:schemeClr val="tx1"/>
+          </a:fontRef>
+        </p:style>
+      </p:cxnSp>
+      <p:cxnSp>
+        <p:nvCxnSpPr>
+          <p:cNvPr id="31" name="Straight Arrow Connector 30"/>
+          <p:cNvCxnSpPr/>
+          <p:nvPr/>
+        </p:nvCxnSpPr>
+        <p:spPr>
+          <a:xfrm flipV="1">
+            <a:off x="2110297" y="3506490"/>
+            <a:ext cx="2375919" cy="2394429"/>
+          </a:xfrm>
+          <a:prstGeom prst="straightConnector1">
+            <a:avLst/>
+          </a:prstGeom>
+          <a:ln>
+            <a:solidFill>
+              <a:schemeClr val="tx1"/>
+            </a:solidFill>
+            <a:tailEnd type="arrow"/>
+          </a:ln>
+        </p:spPr>
+        <p:style>
+          <a:lnRef idx="2">
+            <a:schemeClr val="accent1"/>
+          </a:lnRef>
+          <a:fillRef idx="0">
+            <a:schemeClr val="accent1"/>
+          </a:fillRef>
+          <a:effectRef idx="1">
+            <a:schemeClr val="accent1"/>
+          </a:effectRef>
+          <a:fontRef idx="minor">
+            <a:schemeClr val="tx1"/>
+          </a:fontRef>
+        </p:style>
+      </p:cxnSp>
+      <p:sp>
+        <p:nvSpPr>
+          <p:cNvPr id="36" name="Rectangle 35"/>
+          <p:cNvSpPr/>
+          <p:nvPr/>
+        </p:nvSpPr>
+        <p:spPr>
+          <a:xfrm>
+            <a:off x="617227" y="4464998"/>
+            <a:ext cx="1493090" cy="1921161"/>
+          </a:xfrm>
+          <a:prstGeom prst="rect">
+            <a:avLst/>
+          </a:prstGeom>
+        </p:spPr>
+        <p:style>
+          <a:lnRef idx="1">
+            <a:schemeClr val="accent1"/>
+          </a:lnRef>
+          <a:fillRef idx="3">
+            <a:schemeClr val="accent1"/>
+          </a:fillRef>
+          <a:effectRef idx="2">
+            <a:schemeClr val="accent1"/>
+          </a:effectRef>
+          <a:fontRef idx="minor">
+            <a:schemeClr val="lt1"/>
+          </a:fontRef>
+        </p:style>
+        <p:txBody>
+          <a:bodyPr rtlCol="0" anchor="ctr"/>
+          <a:lstStyle/>
+          <a:p>
+            <a:pPr algn="ctr"/>
+            <a:r>
+              <a:rPr lang="en-US" sz="1500" dirty="0" smtClean="0"/>
+              <a:t>ns1.mydomain.com</a:t>
+            </a:r>
+            <a:endParaRPr lang="en-US" sz="1500" dirty="0"/>
+          </a:p>
+        </p:txBody>
+      </p:sp>
+      <p:cxnSp>
+        <p:nvCxnSpPr>
+          <p:cNvPr id="39" name="Straight Arrow Connector 38"/>
+          <p:cNvCxnSpPr/>
+          <p:nvPr/>
+        </p:nvCxnSpPr>
+        <p:spPr>
+          <a:xfrm>
+            <a:off x="5379976" y="1986163"/>
+            <a:ext cx="1752764" cy="0"/>
+          </a:xfrm>
+          <a:prstGeom prst="straightConnector1">
+            <a:avLst/>
+          </a:prstGeom>
+          <a:ln>
+            <a:solidFill>
+              <a:schemeClr val="tx1"/>
+            </a:solidFill>
+            <a:tailEnd type="arrow"/>
+          </a:ln>
+        </p:spPr>
+        <p:style>
+          <a:lnRef idx="2">
+            <a:schemeClr val="accent1"/>
+          </a:lnRef>
+          <a:fillRef idx="0">
+            <a:schemeClr val="accent1"/>
+          </a:fillRef>
+          <a:effectRef idx="1">
+            <a:schemeClr val="accent1"/>
+          </a:effectRef>
+          <a:fontRef idx="minor">
+            <a:schemeClr val="tx1"/>
+          </a:fontRef>
+        </p:style>
+      </p:cxnSp>
+      <p:cxnSp>
+        <p:nvCxnSpPr>
+          <p:cNvPr id="40" name="Straight Arrow Connector 39"/>
+          <p:cNvCxnSpPr/>
+          <p:nvPr/>
+        </p:nvCxnSpPr>
+        <p:spPr>
+          <a:xfrm flipH="1">
+            <a:off x="5377887" y="2976323"/>
+            <a:ext cx="1752764" cy="0"/>
+          </a:xfrm>
+          <a:prstGeom prst="straightConnector1">
+            <a:avLst/>
+          </a:prstGeom>
+          <a:ln>
+            <a:solidFill>
+              <a:schemeClr val="tx1"/>
+            </a:solidFill>
+            <a:tailEnd type="arrow"/>
+          </a:ln>
+        </p:spPr>
+        <p:style>
+          <a:lnRef idx="2">
+            <a:schemeClr val="accent1"/>
+          </a:lnRef>
+          <a:fillRef idx="0">
+            <a:schemeClr val="accent1"/>
+          </a:fillRef>
+          <a:effectRef idx="1">
+            <a:schemeClr val="accent1"/>
+          </a:effectRef>
+          <a:fontRef idx="minor">
+            <a:schemeClr val="tx1"/>
+          </a:fontRef>
+        </p:style>
+      </p:cxnSp>
     </p:spTree>
     <p:extLst>
       <p:ext uri="{BB962C8B-B14F-4D97-AF65-F5344CB8AC3E}">
@@ -5605,6 +6066,530 @@
   <p:clrMapOvr>
     <a:masterClrMapping/>
   </p:clrMapOvr>
+  <p:timing>
+    <p:tnLst>
+      <p:par>
+        <p:cTn xmlns:p14="http://schemas.microsoft.com/office/powerpoint/2010/main" id="1" dur="indefinite" restart="never" nodeType="tmRoot">
+          <p:childTnLst>
+            <p:seq concurrent="1" nextAc="seek">
+              <p:cTn id="2" dur="indefinite" nodeType="mainSeq">
+                <p:childTnLst>
+                  <p:par>
+                    <p:cTn id="3" fill="hold">
+                      <p:stCondLst>
+                        <p:cond delay="indefinite"/>
+                        <p:cond evt="onBegin" delay="0">
+                          <p:tn val="2"/>
+                        </p:cond>
+                      </p:stCondLst>
+                      <p:childTnLst>
+                        <p:par>
+                          <p:cTn id="4" fill="hold">
+                            <p:stCondLst>
+                              <p:cond delay="0"/>
+                            </p:stCondLst>
+                            <p:childTnLst>
+                              <p:par>
+                                <p:cTn id="5" presetID="1" presetClass="entr" presetSubtype="0" fill="hold" nodeType="afterEffect">
+                                  <p:stCondLst>
+                                    <p:cond delay="0"/>
+                                  </p:stCondLst>
+                                  <p:childTnLst>
+                                    <p:set>
+                                      <p:cBhvr>
+                                        <p:cTn id="6" dur="1" fill="hold">
+                                          <p:stCondLst>
+                                            <p:cond delay="9"/>
+                                          </p:stCondLst>
+                                        </p:cTn>
+                                        <p:tgtEl>
+                                          <p:spTgt spid="25"/>
+                                        </p:tgtEl>
+                                        <p:attrNameLst>
+                                          <p:attrName>style.visibility</p:attrName>
+                                        </p:attrNameLst>
+                                      </p:cBhvr>
+                                      <p:to>
+                                        <p:strVal val="visible"/>
+                                      </p:to>
+                                    </p:set>
+                                  </p:childTnLst>
+                                </p:cTn>
+                              </p:par>
+                            </p:childTnLst>
+                          </p:cTn>
+                        </p:par>
+                      </p:childTnLst>
+                    </p:cTn>
+                  </p:par>
+                  <p:par>
+                    <p:cTn id="7" fill="hold">
+                      <p:stCondLst>
+                        <p:cond delay="indefinite"/>
+                      </p:stCondLst>
+                      <p:childTnLst>
+                        <p:par>
+                          <p:cTn id="8" fill="hold">
+                            <p:stCondLst>
+                              <p:cond delay="0"/>
+                            </p:stCondLst>
+                            <p:childTnLst>
+                              <p:par>
+                                <p:cTn id="9" presetID="1" presetClass="entr" presetSubtype="0" fill="hold" nodeType="clickEffect">
+                                  <p:stCondLst>
+                                    <p:cond delay="0"/>
+                                  </p:stCondLst>
+                                  <p:childTnLst>
+                                    <p:set>
+                                      <p:cBhvr>
+                                        <p:cTn id="10" dur="1" fill="hold">
+                                          <p:stCondLst>
+                                            <p:cond delay="0"/>
+                                          </p:stCondLst>
+                                        </p:cTn>
+                                        <p:tgtEl>
+                                          <p:spTgt spid="6"/>
+                                        </p:tgtEl>
+                                        <p:attrNameLst>
+                                          <p:attrName>style.visibility</p:attrName>
+                                        </p:attrNameLst>
+                                      </p:cBhvr>
+                                      <p:to>
+                                        <p:strVal val="visible"/>
+                                      </p:to>
+                                    </p:set>
+                                  </p:childTnLst>
+                                </p:cTn>
+                              </p:par>
+                              <p:par>
+                                <p:cTn id="11" presetID="1" presetClass="entr" presetSubtype="0" fill="hold" grpId="0" nodeType="withEffect">
+                                  <p:stCondLst>
+                                    <p:cond delay="0"/>
+                                  </p:stCondLst>
+                                  <p:childTnLst>
+                                    <p:set>
+                                      <p:cBhvr>
+                                        <p:cTn id="12" dur="1" fill="hold">
+                                          <p:stCondLst>
+                                            <p:cond delay="0"/>
+                                          </p:stCondLst>
+                                        </p:cTn>
+                                        <p:tgtEl>
+                                          <p:spTgt spid="19"/>
+                                        </p:tgtEl>
+                                        <p:attrNameLst>
+                                          <p:attrName>style.visibility</p:attrName>
+                                        </p:attrNameLst>
+                                      </p:cBhvr>
+                                      <p:to>
+                                        <p:strVal val="visible"/>
+                                      </p:to>
+                                    </p:set>
+                                  </p:childTnLst>
+                                </p:cTn>
+                              </p:par>
+                            </p:childTnLst>
+                          </p:cTn>
+                        </p:par>
+                      </p:childTnLst>
+                    </p:cTn>
+                  </p:par>
+                  <p:par>
+                    <p:cTn id="13" fill="hold">
+                      <p:stCondLst>
+                        <p:cond delay="indefinite"/>
+                      </p:stCondLst>
+                      <p:childTnLst>
+                        <p:par>
+                          <p:cTn id="14" fill="hold">
+                            <p:stCondLst>
+                              <p:cond delay="0"/>
+                            </p:stCondLst>
+                            <p:childTnLst>
+                              <p:par>
+                                <p:cTn id="15" presetID="1" presetClass="entr" presetSubtype="0" fill="hold" nodeType="clickEffect">
+                                  <p:stCondLst>
+                                    <p:cond delay="0"/>
+                                  </p:stCondLst>
+                                  <p:childTnLst>
+                                    <p:set>
+                                      <p:cBhvr>
+                                        <p:cTn id="16" dur="1" fill="hold">
+                                          <p:stCondLst>
+                                            <p:cond delay="0"/>
+                                          </p:stCondLst>
+                                        </p:cTn>
+                                        <p:tgtEl>
+                                          <p:spTgt spid="27"/>
+                                        </p:tgtEl>
+                                        <p:attrNameLst>
+                                          <p:attrName>style.visibility</p:attrName>
+                                        </p:attrNameLst>
+                                      </p:cBhvr>
+                                      <p:to>
+                                        <p:strVal val="visible"/>
+                                      </p:to>
+                                    </p:set>
+                                  </p:childTnLst>
+                                </p:cTn>
+                              </p:par>
+                              <p:par>
+                                <p:cTn id="17" presetID="1" presetClass="entr" presetSubtype="0" fill="hold" grpId="0" nodeType="withEffect">
+                                  <p:stCondLst>
+                                    <p:cond delay="0"/>
+                                  </p:stCondLst>
+                                  <p:childTnLst>
+                                    <p:set>
+                                      <p:cBhvr>
+                                        <p:cTn id="18" dur="1" fill="hold">
+                                          <p:stCondLst>
+                                            <p:cond delay="0"/>
+                                          </p:stCondLst>
+                                        </p:cTn>
+                                        <p:tgtEl>
+                                          <p:spTgt spid="36"/>
+                                        </p:tgtEl>
+                                        <p:attrNameLst>
+                                          <p:attrName>style.visibility</p:attrName>
+                                        </p:attrNameLst>
+                                      </p:cBhvr>
+                                      <p:to>
+                                        <p:strVal val="visible"/>
+                                      </p:to>
+                                    </p:set>
+                                  </p:childTnLst>
+                                </p:cTn>
+                              </p:par>
+                            </p:childTnLst>
+                          </p:cTn>
+                        </p:par>
+                      </p:childTnLst>
+                    </p:cTn>
+                  </p:par>
+                  <p:par>
+                    <p:cTn id="19" fill="hold">
+                      <p:stCondLst>
+                        <p:cond delay="indefinite"/>
+                      </p:stCondLst>
+                      <p:childTnLst>
+                        <p:par>
+                          <p:cTn id="20" fill="hold">
+                            <p:stCondLst>
+                              <p:cond delay="0"/>
+                            </p:stCondLst>
+                            <p:childTnLst>
+                              <p:par>
+                                <p:cTn id="21" presetID="1" presetClass="entr" presetSubtype="0" fill="hold" nodeType="clickEffect">
+                                  <p:stCondLst>
+                                    <p:cond delay="0"/>
+                                  </p:stCondLst>
+                                  <p:childTnLst>
+                                    <p:set>
+                                      <p:cBhvr>
+                                        <p:cTn id="22" dur="1" fill="hold">
+                                          <p:stCondLst>
+                                            <p:cond delay="0"/>
+                                          </p:stCondLst>
+                                        </p:cTn>
+                                        <p:tgtEl>
+                                          <p:spTgt spid="31"/>
+                                        </p:tgtEl>
+                                        <p:attrNameLst>
+                                          <p:attrName>style.visibility</p:attrName>
+                                        </p:attrNameLst>
+                                      </p:cBhvr>
+                                      <p:to>
+                                        <p:strVal val="visible"/>
+                                      </p:to>
+                                    </p:set>
+                                  </p:childTnLst>
+                                </p:cTn>
+                              </p:par>
+                            </p:childTnLst>
+                          </p:cTn>
+                        </p:par>
+                      </p:childTnLst>
+                    </p:cTn>
+                  </p:par>
+                  <p:par>
+                    <p:cTn id="23" fill="hold">
+                      <p:stCondLst>
+                        <p:cond delay="indefinite"/>
+                      </p:stCondLst>
+                      <p:childTnLst>
+                        <p:par>
+                          <p:cTn id="24" fill="hold">
+                            <p:stCondLst>
+                              <p:cond delay="0"/>
+                            </p:stCondLst>
+                            <p:childTnLst>
+                              <p:par>
+                                <p:cTn id="25" presetID="1" presetClass="entr" presetSubtype="0" fill="hold" nodeType="clickEffect">
+                                  <p:stCondLst>
+                                    <p:cond delay="0"/>
+                                  </p:stCondLst>
+                                  <p:childTnLst>
+                                    <p:set>
+                                      <p:cBhvr>
+                                        <p:cTn id="26" dur="1" fill="hold">
+                                          <p:stCondLst>
+                                            <p:cond delay="0"/>
+                                          </p:stCondLst>
+                                        </p:cTn>
+                                        <p:tgtEl>
+                                          <p:spTgt spid="23"/>
+                                        </p:tgtEl>
+                                        <p:attrNameLst>
+                                          <p:attrName>style.visibility</p:attrName>
+                                        </p:attrNameLst>
+                                      </p:cBhvr>
+                                      <p:to>
+                                        <p:strVal val="visible"/>
+                                      </p:to>
+                                    </p:set>
+                                  </p:childTnLst>
+                                </p:cTn>
+                              </p:par>
+                            </p:childTnLst>
+                          </p:cTn>
+                        </p:par>
+                      </p:childTnLst>
+                    </p:cTn>
+                  </p:par>
+                  <p:par>
+                    <p:cTn id="27" fill="hold">
+                      <p:stCondLst>
+                        <p:cond delay="indefinite"/>
+                      </p:stCondLst>
+                      <p:childTnLst>
+                        <p:par>
+                          <p:cTn id="28" fill="hold">
+                            <p:stCondLst>
+                              <p:cond delay="0"/>
+                            </p:stCondLst>
+                            <p:childTnLst>
+                              <p:par>
+                                <p:cTn id="29" presetID="1" presetClass="entr" presetSubtype="0" fill="hold" nodeType="clickEffect">
+                                  <p:stCondLst>
+                                    <p:cond delay="0"/>
+                                  </p:stCondLst>
+                                  <p:childTnLst>
+                                    <p:set>
+                                      <p:cBhvr>
+                                        <p:cTn id="30" dur="1" fill="hold">
+                                          <p:stCondLst>
+                                            <p:cond delay="0"/>
+                                          </p:stCondLst>
+                                        </p:cTn>
+                                        <p:tgtEl>
+                                          <p:spTgt spid="22"/>
+                                        </p:tgtEl>
+                                        <p:attrNameLst>
+                                          <p:attrName>style.visibility</p:attrName>
+                                        </p:attrNameLst>
+                                      </p:cBhvr>
+                                      <p:to>
+                                        <p:strVal val="visible"/>
+                                      </p:to>
+                                    </p:set>
+                                  </p:childTnLst>
+                                </p:cTn>
+                              </p:par>
+                            </p:childTnLst>
+                          </p:cTn>
+                        </p:par>
+                      </p:childTnLst>
+                    </p:cTn>
+                  </p:par>
+                  <p:par>
+                    <p:cTn id="31" fill="hold">
+                      <p:stCondLst>
+                        <p:cond delay="indefinite"/>
+                      </p:stCondLst>
+                      <p:childTnLst>
+                        <p:par>
+                          <p:cTn id="32" fill="hold">
+                            <p:stCondLst>
+                              <p:cond delay="0"/>
+                            </p:stCondLst>
+                            <p:childTnLst>
+                              <p:par>
+                                <p:cTn id="33" presetID="1" presetClass="entr" presetSubtype="0" fill="hold" nodeType="clickEffect">
+                                  <p:stCondLst>
+                                    <p:cond delay="0"/>
+                                  </p:stCondLst>
+                                  <p:childTnLst>
+                                    <p:set>
+                                      <p:cBhvr>
+                                        <p:cTn id="34" dur="1" fill="hold">
+                                          <p:stCondLst>
+                                            <p:cond delay="0"/>
+                                          </p:stCondLst>
+                                        </p:cTn>
+                                        <p:tgtEl>
+                                          <p:spTgt spid="39"/>
+                                        </p:tgtEl>
+                                        <p:attrNameLst>
+                                          <p:attrName>style.visibility</p:attrName>
+                                        </p:attrNameLst>
+                                      </p:cBhvr>
+                                      <p:to>
+                                        <p:strVal val="visible"/>
+                                      </p:to>
+                                    </p:set>
+                                  </p:childTnLst>
+                                </p:cTn>
+                              </p:par>
+                              <p:par>
+                                <p:cTn id="35" presetID="1" presetClass="entr" presetSubtype="0" fill="hold" grpId="0" nodeType="withEffect">
+                                  <p:stCondLst>
+                                    <p:cond delay="0"/>
+                                  </p:stCondLst>
+                                  <p:childTnLst>
+                                    <p:set>
+                                      <p:cBhvr>
+                                        <p:cTn id="36" dur="1" fill="hold">
+                                          <p:stCondLst>
+                                            <p:cond delay="0"/>
+                                          </p:stCondLst>
+                                        </p:cTn>
+                                        <p:tgtEl>
+                                          <p:spTgt spid="26"/>
+                                        </p:tgtEl>
+                                        <p:attrNameLst>
+                                          <p:attrName>style.visibility</p:attrName>
+                                        </p:attrNameLst>
+                                      </p:cBhvr>
+                                      <p:to>
+                                        <p:strVal val="visible"/>
+                                      </p:to>
+                                    </p:set>
+                                  </p:childTnLst>
+                                </p:cTn>
+                              </p:par>
+                            </p:childTnLst>
+                          </p:cTn>
+                        </p:par>
+                      </p:childTnLst>
+                    </p:cTn>
+                  </p:par>
+                  <p:par>
+                    <p:cTn id="37" fill="hold">
+                      <p:stCondLst>
+                        <p:cond delay="indefinite"/>
+                      </p:stCondLst>
+                      <p:childTnLst>
+                        <p:par>
+                          <p:cTn id="38" fill="hold">
+                            <p:stCondLst>
+                              <p:cond delay="0"/>
+                            </p:stCondLst>
+                            <p:childTnLst>
+                              <p:par>
+                                <p:cTn id="39" presetID="1" presetClass="entr" presetSubtype="0" fill="hold" nodeType="clickEffect">
+                                  <p:stCondLst>
+                                    <p:cond delay="0"/>
+                                  </p:stCondLst>
+                                  <p:childTnLst>
+                                    <p:set>
+                                      <p:cBhvr>
+                                        <p:cTn id="40" dur="1" fill="hold">
+                                          <p:stCondLst>
+                                            <p:cond delay="0"/>
+                                          </p:stCondLst>
+                                        </p:cTn>
+                                        <p:tgtEl>
+                                          <p:spTgt spid="40"/>
+                                        </p:tgtEl>
+                                        <p:attrNameLst>
+                                          <p:attrName>style.visibility</p:attrName>
+                                        </p:attrNameLst>
+                                      </p:cBhvr>
+                                      <p:to>
+                                        <p:strVal val="visible"/>
+                                      </p:to>
+                                    </p:set>
+                                  </p:childTnLst>
+                                </p:cTn>
+                              </p:par>
+                            </p:childTnLst>
+                          </p:cTn>
+                        </p:par>
+                      </p:childTnLst>
+                    </p:cTn>
+                  </p:par>
+                  <p:par>
+                    <p:cTn id="41" fill="hold">
+                      <p:stCondLst>
+                        <p:cond delay="indefinite"/>
+                      </p:stCondLst>
+                      <p:childTnLst>
+                        <p:par>
+                          <p:cTn id="42" fill="hold">
+                            <p:stCondLst>
+                              <p:cond delay="0"/>
+                            </p:stCondLst>
+                            <p:childTnLst>
+                              <p:par>
+                                <p:cTn id="43" presetID="1" presetClass="entr" presetSubtype="0" fill="hold" nodeType="clickEffect">
+                                  <p:stCondLst>
+                                    <p:cond delay="0"/>
+                                  </p:stCondLst>
+                                  <p:childTnLst>
+                                    <p:set>
+                                      <p:cBhvr>
+                                        <p:cTn id="44" dur="1" fill="hold">
+                                          <p:stCondLst>
+                                            <p:cond delay="0"/>
+                                          </p:stCondLst>
+                                        </p:cTn>
+                                        <p:tgtEl>
+                                          <p:spTgt spid="24"/>
+                                        </p:tgtEl>
+                                        <p:attrNameLst>
+                                          <p:attrName>style.visibility</p:attrName>
+                                        </p:attrNameLst>
+                                      </p:cBhvr>
+                                      <p:to>
+                                        <p:strVal val="visible"/>
+                                      </p:to>
+                                    </p:set>
+                                  </p:childTnLst>
+                                </p:cTn>
+                              </p:par>
+                            </p:childTnLst>
+                          </p:cTn>
+                        </p:par>
+                      </p:childTnLst>
+                    </p:cTn>
+                  </p:par>
+                </p:childTnLst>
+              </p:cTn>
+              <p:prevCondLst>
+                <p:cond evt="onPrev" delay="0">
+                  <p:tgtEl>
+                    <p:sldTgt/>
+                  </p:tgtEl>
+                </p:cond>
+              </p:prevCondLst>
+              <p:nextCondLst>
+                <p:cond evt="onNext" delay="0">
+                  <p:tgtEl>
+                    <p:sldTgt/>
+                  </p:tgtEl>
+                </p:cond>
+              </p:nextCondLst>
+            </p:seq>
+          </p:childTnLst>
+        </p:cTn>
+      </p:par>
+    </p:tnLst>
+    <p:bldLst>
+      <p:bldP spid="19" grpId="0" animBg="1"/>
+      <p:bldP spid="26" grpId="0" animBg="1"/>
+      <p:bldP spid="36" grpId="0" animBg="1"/>
+    </p:bldLst>
+  </p:timing>
 </p:sld>
 </file>
 
@@ -5766,14 +6751,7 @@
                 <a:latin typeface="Segoe Light"/>
                 <a:cs typeface="Segoe Light"/>
               </a:rPr>
-              <a:t>Issue command </a:t>
-            </a:r>
-            <a:r>
-              <a:rPr lang="en-US" sz="1600" dirty="0" smtClean="0">
-                <a:latin typeface="Segoe Light"/>
-                <a:cs typeface="Segoe Light"/>
-              </a:rPr>
-              <a:t>measurement command (NS1, IP1, NS2, IP2)</a:t>
+              <a:t>Issue command measurement command (NS1, IP1, NS2, IP2)</a:t>
             </a:r>
           </a:p>
           <a:p>
@@ -5809,6 +6787,13 @@
   <p:clrMapOvr>
     <a:masterClrMapping/>
   </p:clrMapOvr>
+  <p:timing>
+    <p:tnLst>
+      <p:par>
+        <p:cTn xmlns:p14="http://schemas.microsoft.com/office/powerpoint/2010/main" id="1" dur="indefinite" restart="never" nodeType="tmRoot"/>
+      </p:par>
+    </p:tnLst>
+  </p:timing>
 </p:sld>
 </file>
 
@@ -5911,6 +6896,13 @@
   <p:clrMapOvr>
     <a:masterClrMapping/>
   </p:clrMapOvr>
+  <p:timing>
+    <p:tnLst>
+      <p:par>
+        <p:cTn xmlns:p14="http://schemas.microsoft.com/office/powerpoint/2010/main" id="1" dur="indefinite" restart="never" nodeType="tmRoot"/>
+      </p:par>
+    </p:tnLst>
+  </p:timing>
 </p:sld>
 </file>
 

</xml_diff>

<commit_message>
updating slides on mobile measurement
</commit_message>
<xml_diff>
--- a/doc/MidTerm/MidTerm.pptx
+++ b/doc/MidTerm/MidTerm.pptx
@@ -5,7 +5,7 @@
     <p:sldMasterId id="2147483673" r:id="rId1"/>
   </p:sldMasterIdLst>
   <p:notesMasterIdLst>
-    <p:notesMasterId r:id="rId10"/>
+    <p:notesMasterId r:id="rId11"/>
   </p:notesMasterIdLst>
   <p:sldIdLst>
     <p:sldId id="256" r:id="rId2"/>
@@ -16,6 +16,7 @@
     <p:sldId id="263" r:id="rId7"/>
     <p:sldId id="264" r:id="rId8"/>
     <p:sldId id="265" r:id="rId9"/>
+    <p:sldId id="266" r:id="rId10"/>
   </p:sldIdLst>
   <p:sldSz cx="9144000" cy="6858000" type="screen4x3"/>
   <p:notesSz cx="6858000" cy="9144000"/>
@@ -1102,17 +1103,15 @@
           <a:lstStyle/>
           <a:p>
             <a:r>
-              <a:rPr lang="en-US" sz="1200" kern="1200" dirty="0" smtClean="0">
-                <a:solidFill>
-                  <a:schemeClr val="tx1"/>
-                </a:solidFill>
-                <a:latin typeface="+mn-lt"/>
-                <a:ea typeface="+mn-ea"/>
-                <a:cs typeface="+mn-cs"/>
-              </a:rPr>
-              <a:t>Slide #2: Motivate your project by describing why its solution is important. Who would care if you are successful and why?</a:t>
-            </a:r>
-            <a:endParaRPr lang="en-US" dirty="0"/>
+              <a:rPr lang="en-US" dirty="0" smtClean="0"/>
+              <a:t>RFC 1918</a:t>
+            </a:r>
+          </a:p>
+          <a:p>
+            <a:r>
+              <a:rPr lang="en-US" smtClean="0"/>
+              <a:t>172.16.0.0 - 172.31.255.255 (172.16/12 prefix)</a:t>
+            </a:r>
           </a:p>
         </p:txBody>
       </p:sp>
@@ -1134,6 +1133,90 @@
             <a:fld id="{437C7616-B134-0047-ABFF-A95E6FAEFE2A}" type="slidenum">
               <a:rPr lang="en-US" smtClean="0"/>
               <a:t>8</a:t>
+            </a:fld>
+            <a:endParaRPr lang="en-US"/>
+          </a:p>
+        </p:txBody>
+      </p:sp>
+    </p:spTree>
+    <p:extLst>
+      <p:ext uri="{BB962C8B-B14F-4D97-AF65-F5344CB8AC3E}">
+        <p14:creationId xmlns:p14="http://schemas.microsoft.com/office/powerpoint/2010/main" val="274700957"/>
+      </p:ext>
+    </p:extLst>
+  </p:cSld>
+  <p:clrMapOvr>
+    <a:masterClrMapping/>
+  </p:clrMapOvr>
+</p:notes>
+</file>
+
+<file path=ppt/notesSlides/notesSlide8.xml><?xml version="1.0" encoding="utf-8"?>
+<p:notes xmlns:a="http://schemas.openxmlformats.org/drawingml/2006/main" xmlns:r="http://schemas.openxmlformats.org/officeDocument/2006/relationships" xmlns:p="http://schemas.openxmlformats.org/presentationml/2006/main">
+  <p:cSld>
+    <p:spTree>
+      <p:nvGrpSpPr>
+        <p:cNvPr id="1" name=""/>
+        <p:cNvGrpSpPr/>
+        <p:nvPr/>
+      </p:nvGrpSpPr>
+      <p:grpSpPr>
+        <a:xfrm>
+          <a:off x="0" y="0"/>
+          <a:ext cx="0" cy="0"/>
+          <a:chOff x="0" y="0"/>
+          <a:chExt cx="0" cy="0"/>
+        </a:xfrm>
+      </p:grpSpPr>
+      <p:sp>
+        <p:nvSpPr>
+          <p:cNvPr id="2" name="Slide Image Placeholder 1"/>
+          <p:cNvSpPr>
+            <a:spLocks noGrp="1" noRot="1" noChangeAspect="1"/>
+          </p:cNvSpPr>
+          <p:nvPr>
+            <p:ph type="sldImg"/>
+          </p:nvPr>
+        </p:nvSpPr>
+        <p:spPr/>
+      </p:sp>
+      <p:sp>
+        <p:nvSpPr>
+          <p:cNvPr id="3" name="Notes Placeholder 2"/>
+          <p:cNvSpPr>
+            <a:spLocks noGrp="1"/>
+          </p:cNvSpPr>
+          <p:nvPr>
+            <p:ph type="body" idx="1"/>
+          </p:nvPr>
+        </p:nvSpPr>
+        <p:spPr/>
+        <p:txBody>
+          <a:bodyPr/>
+          <a:lstStyle/>
+          <a:p>
+            <a:endParaRPr lang="en-US" dirty="0" smtClean="0"/>
+          </a:p>
+        </p:txBody>
+      </p:sp>
+      <p:sp>
+        <p:nvSpPr>
+          <p:cNvPr id="4" name="Slide Number Placeholder 3"/>
+          <p:cNvSpPr>
+            <a:spLocks noGrp="1"/>
+          </p:cNvSpPr>
+          <p:nvPr>
+            <p:ph type="sldNum" sz="quarter" idx="10"/>
+          </p:nvPr>
+        </p:nvSpPr>
+        <p:spPr/>
+        <p:txBody>
+          <a:bodyPr/>
+          <a:lstStyle/>
+          <a:p>
+            <a:fld id="{437C7616-B134-0047-ABFF-A95E6FAEFE2A}" type="slidenum">
+              <a:rPr lang="en-US" smtClean="0"/>
+              <a:t>9</a:t>
             </a:fld>
             <a:endParaRPr lang="en-US"/>
           </a:p>
@@ -4273,8 +4356,8 @@
         </p:nvSpPr>
         <p:spPr>
           <a:xfrm>
-            <a:off x="0" y="274638"/>
-            <a:ext cx="2749131" cy="744205"/>
+            <a:off x="1" y="274638"/>
+            <a:ext cx="2513164" cy="744205"/>
           </a:xfrm>
         </p:spPr>
         <p:txBody>
@@ -5440,8 +5523,8 @@
         </p:nvSpPr>
         <p:spPr>
           <a:xfrm>
-            <a:off x="23740" y="274638"/>
-            <a:ext cx="5056426" cy="744205"/>
+            <a:off x="23739" y="274638"/>
+            <a:ext cx="5218775" cy="744205"/>
           </a:xfrm>
         </p:spPr>
         <p:txBody>
@@ -7125,7 +7208,7 @@
         <p:spPr>
           <a:xfrm>
             <a:off x="0" y="274638"/>
-            <a:ext cx="5673642" cy="744205"/>
+            <a:ext cx="5256027" cy="744205"/>
           </a:xfrm>
         </p:spPr>
         <p:txBody>
@@ -7328,8 +7411,8 @@
         </p:nvSpPr>
         <p:spPr>
           <a:xfrm>
-            <a:off x="0" y="274638"/>
-            <a:ext cx="5673642" cy="744205"/>
+            <a:off x="-1" y="274638"/>
+            <a:ext cx="4296701" cy="744205"/>
           </a:xfrm>
         </p:spPr>
         <p:txBody>
@@ -7364,8 +7447,8 @@
         </p:nvSpPr>
         <p:spPr>
           <a:xfrm>
-            <a:off x="457200" y="1228193"/>
-            <a:ext cx="8229600" cy="5122129"/>
+            <a:off x="457200" y="1228192"/>
+            <a:ext cx="4508075" cy="5274529"/>
           </a:xfrm>
         </p:spPr>
         <p:txBody>
@@ -7380,8 +7463,1756 @@
             </a:endParaRPr>
           </a:p>
           <a:p>
-            <a:pPr lvl="2"/>
-            <a:endParaRPr lang="en-US" sz="1600" dirty="0" smtClean="0">
+            <a:r>
+              <a:rPr lang="en-US" sz="2400" dirty="0" err="1" smtClean="0">
+                <a:latin typeface="Segoe Light"/>
+                <a:cs typeface="Segoe Light"/>
+              </a:rPr>
+              <a:t>Traceroute</a:t>
+            </a:r>
+            <a:r>
+              <a:rPr lang="en-US" sz="2400" dirty="0" smtClean="0">
+                <a:latin typeface="Segoe Light"/>
+                <a:cs typeface="Segoe Light"/>
+              </a:rPr>
+              <a:t> </a:t>
+            </a:r>
+          </a:p>
+          <a:p>
+            <a:pPr lvl="1"/>
+            <a:r>
+              <a:rPr lang="en-US" sz="2000" dirty="0" smtClean="0">
+                <a:latin typeface="Segoe Light"/>
+                <a:cs typeface="Segoe Light"/>
+              </a:rPr>
+              <a:t>From </a:t>
+            </a:r>
+            <a:r>
+              <a:rPr lang="en-US" sz="2000" dirty="0" err="1" smtClean="0">
+                <a:latin typeface="Segoe Light"/>
+                <a:cs typeface="Segoe Light"/>
+              </a:rPr>
+              <a:t>iphone</a:t>
+            </a:r>
+            <a:r>
+              <a:rPr lang="en-US" sz="2000" dirty="0" smtClean="0">
+                <a:latin typeface="Segoe Light"/>
+                <a:cs typeface="Segoe Light"/>
+              </a:rPr>
+              <a:t> (ATT LTE)</a:t>
+            </a:r>
+          </a:p>
+          <a:p>
+            <a:pPr lvl="1"/>
+            <a:r>
+              <a:rPr lang="en-US" sz="2000" dirty="0" smtClean="0">
+                <a:latin typeface="Segoe Light"/>
+                <a:cs typeface="Segoe Light"/>
+              </a:rPr>
+              <a:t>to top 943 websites</a:t>
+            </a:r>
+          </a:p>
+          <a:p>
+            <a:pPr lvl="1"/>
+            <a:r>
+              <a:rPr lang="en-US" sz="2000" dirty="0" smtClean="0">
+                <a:latin typeface="Segoe Light"/>
+                <a:cs typeface="Segoe Light"/>
+              </a:rPr>
+              <a:t>Raw logs/</a:t>
+            </a:r>
+            <a:r>
+              <a:rPr lang="en-US" sz="2000" dirty="0" err="1" smtClean="0">
+                <a:latin typeface="Segoe Light"/>
+                <a:cs typeface="Segoe Light"/>
+              </a:rPr>
+              <a:t>NoSQL</a:t>
+            </a:r>
+            <a:r>
+              <a:rPr lang="en-US" sz="2000" dirty="0" smtClean="0">
+                <a:latin typeface="Segoe Light"/>
+                <a:cs typeface="Segoe Light"/>
+              </a:rPr>
+              <a:t> </a:t>
+            </a:r>
+            <a:r>
+              <a:rPr lang="en-US" sz="2000" dirty="0" err="1" smtClean="0">
+                <a:latin typeface="Segoe Light"/>
+                <a:cs typeface="Segoe Light"/>
+              </a:rPr>
+              <a:t>db</a:t>
+            </a:r>
+            <a:endParaRPr lang="en-US" sz="2400" dirty="0" smtClean="0">
+              <a:latin typeface="Segoe Light"/>
+              <a:cs typeface="Segoe Light"/>
+            </a:endParaRPr>
+          </a:p>
+          <a:p>
+            <a:endParaRPr lang="en-US" sz="2400" dirty="0" smtClean="0">
+              <a:latin typeface="Segoe Light"/>
+              <a:cs typeface="Segoe Light"/>
+            </a:endParaRPr>
+          </a:p>
+        </p:txBody>
+      </p:sp>
+      <p:sp>
+        <p:nvSpPr>
+          <p:cNvPr id="4" name="Content Placeholder 2"/>
+          <p:cNvSpPr txBox="1">
+            <a:spLocks/>
+          </p:cNvSpPr>
+          <p:nvPr/>
+        </p:nvSpPr>
+        <p:spPr>
+          <a:xfrm>
+            <a:off x="609600" y="1380593"/>
+            <a:ext cx="8229600" cy="5122129"/>
+          </a:xfrm>
+          <a:prstGeom prst="rect">
+            <a:avLst/>
+          </a:prstGeom>
+        </p:spPr>
+        <p:txBody>
+          <a:bodyPr vert="horz" lIns="91440" tIns="45720" rIns="91440" bIns="45720" rtlCol="0">
+            <a:normAutofit/>
+          </a:bodyPr>
+          <a:lstStyle>
+            <a:lvl1pPr marL="342900" indent="-342900" algn="l" defTabSz="914400" rtl="0" eaLnBrk="1" latinLnBrk="0" hangingPunct="1">
+              <a:spcBef>
+                <a:spcPct val="20000"/>
+              </a:spcBef>
+              <a:buFont typeface="Arial" pitchFamily="34" charset="0"/>
+              <a:buChar char="•"/>
+              <a:defRPr sz="3200" kern="1200">
+                <a:solidFill>
+                  <a:schemeClr val="tx1"/>
+                </a:solidFill>
+                <a:latin typeface="+mn-lt"/>
+                <a:ea typeface="+mn-ea"/>
+                <a:cs typeface="+mn-cs"/>
+              </a:defRPr>
+            </a:lvl1pPr>
+            <a:lvl2pPr marL="742950" indent="-285750" algn="l" defTabSz="914400" rtl="0" eaLnBrk="1" latinLnBrk="0" hangingPunct="1">
+              <a:spcBef>
+                <a:spcPct val="20000"/>
+              </a:spcBef>
+              <a:buFont typeface="Arial" pitchFamily="34" charset="0"/>
+              <a:buChar char="–"/>
+              <a:defRPr sz="2800" kern="1200">
+                <a:solidFill>
+                  <a:schemeClr val="tx1"/>
+                </a:solidFill>
+                <a:latin typeface="+mn-lt"/>
+                <a:ea typeface="+mn-ea"/>
+                <a:cs typeface="+mn-cs"/>
+              </a:defRPr>
+            </a:lvl2pPr>
+            <a:lvl3pPr marL="1143000" indent="-228600" algn="l" defTabSz="914400" rtl="0" eaLnBrk="1" latinLnBrk="0" hangingPunct="1">
+              <a:spcBef>
+                <a:spcPct val="20000"/>
+              </a:spcBef>
+              <a:buFont typeface="Arial" pitchFamily="34" charset="0"/>
+              <a:buChar char="•"/>
+              <a:defRPr sz="2400" kern="1200">
+                <a:solidFill>
+                  <a:schemeClr val="tx1"/>
+                </a:solidFill>
+                <a:latin typeface="+mn-lt"/>
+                <a:ea typeface="+mn-ea"/>
+                <a:cs typeface="+mn-cs"/>
+              </a:defRPr>
+            </a:lvl3pPr>
+            <a:lvl4pPr marL="1600200" indent="-228600" algn="l" defTabSz="914400" rtl="0" eaLnBrk="1" latinLnBrk="0" hangingPunct="1">
+              <a:spcBef>
+                <a:spcPct val="20000"/>
+              </a:spcBef>
+              <a:buFont typeface="Arial" pitchFamily="34" charset="0"/>
+              <a:buChar char="–"/>
+              <a:defRPr sz="2000" kern="1200">
+                <a:solidFill>
+                  <a:schemeClr val="tx1"/>
+                </a:solidFill>
+                <a:latin typeface="+mn-lt"/>
+                <a:ea typeface="+mn-ea"/>
+                <a:cs typeface="+mn-cs"/>
+              </a:defRPr>
+            </a:lvl4pPr>
+            <a:lvl5pPr marL="2057400" indent="-228600" algn="l" defTabSz="914400" rtl="0" eaLnBrk="1" latinLnBrk="0" hangingPunct="1">
+              <a:spcBef>
+                <a:spcPct val="20000"/>
+              </a:spcBef>
+              <a:buFont typeface="Arial" pitchFamily="34" charset="0"/>
+              <a:buChar char="»"/>
+              <a:defRPr sz="2000" kern="1200">
+                <a:solidFill>
+                  <a:schemeClr val="tx1"/>
+                </a:solidFill>
+                <a:latin typeface="+mn-lt"/>
+                <a:ea typeface="+mn-ea"/>
+                <a:cs typeface="+mn-cs"/>
+              </a:defRPr>
+            </a:lvl5pPr>
+            <a:lvl6pPr marL="2514600" indent="-228600" algn="l" defTabSz="914400" rtl="0" eaLnBrk="1" latinLnBrk="0" hangingPunct="1">
+              <a:spcBef>
+                <a:spcPct val="20000"/>
+              </a:spcBef>
+              <a:buFont typeface="Arial" pitchFamily="34" charset="0"/>
+              <a:buChar char="•"/>
+              <a:defRPr sz="2000" kern="1200">
+                <a:solidFill>
+                  <a:schemeClr val="tx1"/>
+                </a:solidFill>
+                <a:latin typeface="+mn-lt"/>
+                <a:ea typeface="+mn-ea"/>
+                <a:cs typeface="+mn-cs"/>
+              </a:defRPr>
+            </a:lvl6pPr>
+            <a:lvl7pPr marL="2971800" indent="-228600" algn="l" defTabSz="914400" rtl="0" eaLnBrk="1" latinLnBrk="0" hangingPunct="1">
+              <a:spcBef>
+                <a:spcPct val="20000"/>
+              </a:spcBef>
+              <a:buFont typeface="Arial" pitchFamily="34" charset="0"/>
+              <a:buChar char="•"/>
+              <a:defRPr sz="2000" kern="1200">
+                <a:solidFill>
+                  <a:schemeClr val="tx1"/>
+                </a:solidFill>
+                <a:latin typeface="+mn-lt"/>
+                <a:ea typeface="+mn-ea"/>
+                <a:cs typeface="+mn-cs"/>
+              </a:defRPr>
+            </a:lvl7pPr>
+            <a:lvl8pPr marL="3429000" indent="-228600" algn="l" defTabSz="914400" rtl="0" eaLnBrk="1" latinLnBrk="0" hangingPunct="1">
+              <a:spcBef>
+                <a:spcPct val="20000"/>
+              </a:spcBef>
+              <a:buFont typeface="Arial" pitchFamily="34" charset="0"/>
+              <a:buChar char="•"/>
+              <a:defRPr sz="2000" kern="1200">
+                <a:solidFill>
+                  <a:schemeClr val="tx1"/>
+                </a:solidFill>
+                <a:latin typeface="+mn-lt"/>
+                <a:ea typeface="+mn-ea"/>
+                <a:cs typeface="+mn-cs"/>
+              </a:defRPr>
+            </a:lvl8pPr>
+            <a:lvl9pPr marL="3886200" indent="-228600" algn="l" defTabSz="914400" rtl="0" eaLnBrk="1" latinLnBrk="0" hangingPunct="1">
+              <a:spcBef>
+                <a:spcPct val="20000"/>
+              </a:spcBef>
+              <a:buFont typeface="Arial" pitchFamily="34" charset="0"/>
+              <a:buChar char="•"/>
+              <a:defRPr sz="2000" kern="1200">
+                <a:solidFill>
+                  <a:schemeClr val="tx1"/>
+                </a:solidFill>
+                <a:latin typeface="+mn-lt"/>
+                <a:ea typeface="+mn-ea"/>
+                <a:cs typeface="+mn-cs"/>
+              </a:defRPr>
+            </a:lvl9pPr>
+          </a:lstStyle>
+          <a:p>
+            <a:endParaRPr lang="en-US" sz="2400" dirty="0" smtClean="0">
+              <a:latin typeface="Segoe Light"/>
+              <a:cs typeface="Segoe Light"/>
+            </a:endParaRPr>
+          </a:p>
+        </p:txBody>
+      </p:sp>
+      <p:sp>
+        <p:nvSpPr>
+          <p:cNvPr id="5" name="TextBox 4"/>
+          <p:cNvSpPr txBox="1"/>
+          <p:nvPr/>
+        </p:nvSpPr>
+        <p:spPr>
+          <a:xfrm>
+            <a:off x="6422789" y="618676"/>
+            <a:ext cx="184666" cy="369332"/>
+          </a:xfrm>
+          <a:prstGeom prst="rect">
+            <a:avLst/>
+          </a:prstGeom>
+          <a:noFill/>
+        </p:spPr>
+        <p:txBody>
+          <a:bodyPr wrap="none" rtlCol="0">
+            <a:spAutoFit/>
+          </a:bodyPr>
+          <a:lstStyle/>
+          <a:p>
+            <a:endParaRPr lang="en-US" dirty="0"/>
+          </a:p>
+        </p:txBody>
+      </p:sp>
+      <p:sp>
+        <p:nvSpPr>
+          <p:cNvPr id="6" name="Rectangle 5"/>
+          <p:cNvSpPr/>
+          <p:nvPr/>
+        </p:nvSpPr>
+        <p:spPr>
+          <a:xfrm>
+            <a:off x="5069430" y="152083"/>
+            <a:ext cx="2827922" cy="384246"/>
+          </a:xfrm>
+          <a:prstGeom prst="rect">
+            <a:avLst/>
+          </a:prstGeom>
+          <a:solidFill>
+            <a:schemeClr val="bg1">
+              <a:lumMod val="65000"/>
+              <a:lumOff val="35000"/>
+            </a:schemeClr>
+          </a:solidFill>
+          <a:ln>
+            <a:noFill/>
+          </a:ln>
+        </p:spPr>
+        <p:style>
+          <a:lnRef idx="1">
+            <a:schemeClr val="accent1"/>
+          </a:lnRef>
+          <a:fillRef idx="3">
+            <a:schemeClr val="accent1"/>
+          </a:fillRef>
+          <a:effectRef idx="2">
+            <a:schemeClr val="accent1"/>
+          </a:effectRef>
+          <a:fontRef idx="minor">
+            <a:schemeClr val="lt1"/>
+          </a:fontRef>
+        </p:style>
+        <p:txBody>
+          <a:bodyPr rtlCol="0" anchor="ctr"/>
+          <a:lstStyle/>
+          <a:p>
+            <a:pPr algn="ctr"/>
+            <a:r>
+              <a:rPr lang="en-US" dirty="0">
+                <a:latin typeface="Segoe Light"/>
+                <a:cs typeface="Segoe Light"/>
+              </a:rPr>
+              <a:t>[AS0] </a:t>
+            </a:r>
+            <a:r>
+              <a:rPr lang="en-US" dirty="0" smtClean="0">
+                <a:latin typeface="Segoe Light"/>
+                <a:cs typeface="Segoe Light"/>
+              </a:rPr>
+              <a:t>172.20.10.1</a:t>
+            </a:r>
+            <a:endParaRPr lang="en-US" dirty="0">
+              <a:latin typeface="Segoe Light"/>
+              <a:cs typeface="Segoe Light"/>
+            </a:endParaRPr>
+          </a:p>
+        </p:txBody>
+      </p:sp>
+      <p:sp>
+        <p:nvSpPr>
+          <p:cNvPr id="28" name="Rectangle 27"/>
+          <p:cNvSpPr/>
+          <p:nvPr/>
+        </p:nvSpPr>
+        <p:spPr>
+          <a:xfrm>
+            <a:off x="5069429" y="1024641"/>
+            <a:ext cx="2827923" cy="384246"/>
+          </a:xfrm>
+          <a:prstGeom prst="rect">
+            <a:avLst/>
+          </a:prstGeom>
+          <a:solidFill>
+            <a:schemeClr val="bg1">
+              <a:lumMod val="65000"/>
+              <a:lumOff val="35000"/>
+            </a:schemeClr>
+          </a:solidFill>
+          <a:ln>
+            <a:noFill/>
+          </a:ln>
+        </p:spPr>
+        <p:style>
+          <a:lnRef idx="1">
+            <a:schemeClr val="accent1"/>
+          </a:lnRef>
+          <a:fillRef idx="3">
+            <a:schemeClr val="accent1"/>
+          </a:fillRef>
+          <a:effectRef idx="2">
+            <a:schemeClr val="accent1"/>
+          </a:effectRef>
+          <a:fontRef idx="minor">
+            <a:schemeClr val="lt1"/>
+          </a:fontRef>
+        </p:style>
+        <p:txBody>
+          <a:bodyPr rtlCol="0" anchor="ctr"/>
+          <a:lstStyle/>
+          <a:p>
+            <a:pPr algn="ctr"/>
+            <a:r>
+              <a:rPr lang="en-US" dirty="0" smtClean="0">
+                <a:latin typeface="Segoe Light"/>
+                <a:cs typeface="Segoe Light"/>
+              </a:rPr>
+              <a:t>[AS16509] 172.26.241.133</a:t>
+            </a:r>
+            <a:endParaRPr lang="en-US" dirty="0">
+              <a:latin typeface="Segoe Light"/>
+              <a:cs typeface="Segoe Light"/>
+            </a:endParaRPr>
+          </a:p>
+        </p:txBody>
+      </p:sp>
+      <p:sp>
+        <p:nvSpPr>
+          <p:cNvPr id="29" name="Rectangle 28"/>
+          <p:cNvSpPr/>
+          <p:nvPr/>
+        </p:nvSpPr>
+        <p:spPr>
+          <a:xfrm>
+            <a:off x="5069430" y="584944"/>
+            <a:ext cx="2827922" cy="384246"/>
+          </a:xfrm>
+          <a:prstGeom prst="rect">
+            <a:avLst/>
+          </a:prstGeom>
+          <a:solidFill>
+            <a:schemeClr val="bg1">
+              <a:lumMod val="65000"/>
+              <a:lumOff val="35000"/>
+            </a:schemeClr>
+          </a:solidFill>
+          <a:ln>
+            <a:noFill/>
+          </a:ln>
+        </p:spPr>
+        <p:style>
+          <a:lnRef idx="1">
+            <a:schemeClr val="accent1"/>
+          </a:lnRef>
+          <a:fillRef idx="3">
+            <a:schemeClr val="accent1"/>
+          </a:fillRef>
+          <a:effectRef idx="2">
+            <a:schemeClr val="accent1"/>
+          </a:effectRef>
+          <a:fontRef idx="minor">
+            <a:schemeClr val="lt1"/>
+          </a:fontRef>
+        </p:style>
+        <p:txBody>
+          <a:bodyPr rtlCol="0" anchor="ctr"/>
+          <a:lstStyle/>
+          <a:p>
+            <a:pPr algn="ctr"/>
+            <a:r>
+              <a:rPr lang="en-US" dirty="0" smtClean="0">
+                <a:latin typeface="Segoe Light"/>
+                <a:cs typeface="Segoe Light"/>
+              </a:rPr>
+              <a:t>[AS16509] 172.26.236.2</a:t>
+            </a:r>
+            <a:endParaRPr lang="en-US" dirty="0">
+              <a:latin typeface="Segoe Light"/>
+              <a:cs typeface="Segoe Light"/>
+            </a:endParaRPr>
+          </a:p>
+        </p:txBody>
+      </p:sp>
+      <p:sp>
+        <p:nvSpPr>
+          <p:cNvPr id="30" name="Rectangle 29"/>
+          <p:cNvSpPr/>
+          <p:nvPr/>
+        </p:nvSpPr>
+        <p:spPr>
+          <a:xfrm>
+            <a:off x="5069430" y="1462745"/>
+            <a:ext cx="2827923" cy="868599"/>
+          </a:xfrm>
+          <a:prstGeom prst="rect">
+            <a:avLst/>
+          </a:prstGeom>
+          <a:solidFill>
+            <a:schemeClr val="bg1">
+              <a:lumMod val="65000"/>
+              <a:lumOff val="35000"/>
+            </a:schemeClr>
+          </a:solidFill>
+          <a:ln>
+            <a:noFill/>
+          </a:ln>
+        </p:spPr>
+        <p:style>
+          <a:lnRef idx="1">
+            <a:schemeClr val="accent1"/>
+          </a:lnRef>
+          <a:fillRef idx="3">
+            <a:schemeClr val="accent1"/>
+          </a:fillRef>
+          <a:effectRef idx="2">
+            <a:schemeClr val="accent1"/>
+          </a:effectRef>
+          <a:fontRef idx="minor">
+            <a:schemeClr val="lt1"/>
+          </a:fontRef>
+        </p:style>
+        <p:txBody>
+          <a:bodyPr rtlCol="0" anchor="ctr"/>
+          <a:lstStyle/>
+          <a:p>
+            <a:pPr algn="ctr"/>
+            <a:r>
+              <a:rPr lang="en-US" dirty="0" smtClean="0">
+                <a:latin typeface="Segoe Light"/>
+                <a:cs typeface="Segoe Light"/>
+              </a:rPr>
+              <a:t>[AS0] 172.26.96.10/172.26.96.11</a:t>
+            </a:r>
+          </a:p>
+          <a:p>
+            <a:pPr algn="ctr"/>
+            <a:r>
+              <a:rPr lang="en-US" dirty="0">
+                <a:latin typeface="Segoe Light"/>
+                <a:cs typeface="Segoe Light"/>
+              </a:rPr>
+              <a:t>172.26.96.3/</a:t>
+            </a:r>
+            <a:r>
+              <a:rPr lang="en-US" dirty="0" smtClean="0">
+                <a:latin typeface="Segoe Light"/>
+                <a:cs typeface="Segoe Light"/>
+              </a:rPr>
+              <a:t>172.26.96.2</a:t>
+            </a:r>
+            <a:endParaRPr lang="en-US" dirty="0">
+              <a:latin typeface="Segoe Light"/>
+              <a:cs typeface="Segoe Light"/>
+            </a:endParaRPr>
+          </a:p>
+        </p:txBody>
+      </p:sp>
+      <p:sp>
+        <p:nvSpPr>
+          <p:cNvPr id="32" name="Rectangle 31"/>
+          <p:cNvSpPr/>
+          <p:nvPr/>
+        </p:nvSpPr>
+        <p:spPr>
+          <a:xfrm>
+            <a:off x="5069429" y="2389112"/>
+            <a:ext cx="2827923" cy="384246"/>
+          </a:xfrm>
+          <a:prstGeom prst="rect">
+            <a:avLst/>
+          </a:prstGeom>
+          <a:solidFill>
+            <a:schemeClr val="bg1">
+              <a:lumMod val="65000"/>
+              <a:lumOff val="35000"/>
+            </a:schemeClr>
+          </a:solidFill>
+          <a:ln>
+            <a:noFill/>
+          </a:ln>
+        </p:spPr>
+        <p:style>
+          <a:lnRef idx="1">
+            <a:schemeClr val="accent1"/>
+          </a:lnRef>
+          <a:fillRef idx="3">
+            <a:schemeClr val="accent1"/>
+          </a:fillRef>
+          <a:effectRef idx="2">
+            <a:schemeClr val="accent1"/>
+          </a:effectRef>
+          <a:fontRef idx="minor">
+            <a:schemeClr val="lt1"/>
+          </a:fontRef>
+        </p:style>
+        <p:txBody>
+          <a:bodyPr rtlCol="0" anchor="ctr"/>
+          <a:lstStyle/>
+          <a:p>
+            <a:pPr algn="ctr"/>
+            <a:r>
+              <a:rPr lang="en-US" dirty="0" smtClean="0">
+                <a:latin typeface="Segoe Light"/>
+                <a:cs typeface="Segoe Light"/>
+              </a:rPr>
+              <a:t>[AS0] 172.26.96.193</a:t>
+            </a:r>
+            <a:endParaRPr lang="en-US" dirty="0">
+              <a:latin typeface="Segoe Light"/>
+              <a:cs typeface="Segoe Light"/>
+            </a:endParaRPr>
+          </a:p>
+        </p:txBody>
+      </p:sp>
+      <p:sp>
+        <p:nvSpPr>
+          <p:cNvPr id="33" name="Rectangle 32"/>
+          <p:cNvSpPr/>
+          <p:nvPr/>
+        </p:nvSpPr>
+        <p:spPr>
+          <a:xfrm>
+            <a:off x="5069430" y="2836355"/>
+            <a:ext cx="2827923" cy="384246"/>
+          </a:xfrm>
+          <a:prstGeom prst="rect">
+            <a:avLst/>
+          </a:prstGeom>
+          <a:solidFill>
+            <a:schemeClr val="bg1">
+              <a:lumMod val="65000"/>
+              <a:lumOff val="35000"/>
+            </a:schemeClr>
+          </a:solidFill>
+          <a:ln>
+            <a:noFill/>
+          </a:ln>
+        </p:spPr>
+        <p:style>
+          <a:lnRef idx="1">
+            <a:schemeClr val="accent1"/>
+          </a:lnRef>
+          <a:fillRef idx="3">
+            <a:schemeClr val="accent1"/>
+          </a:fillRef>
+          <a:effectRef idx="2">
+            <a:schemeClr val="accent1"/>
+          </a:effectRef>
+          <a:fontRef idx="minor">
+            <a:schemeClr val="lt1"/>
+          </a:fontRef>
+        </p:style>
+        <p:txBody>
+          <a:bodyPr rtlCol="0" anchor="ctr"/>
+          <a:lstStyle/>
+          <a:p>
+            <a:pPr algn="ctr"/>
+            <a:r>
+              <a:rPr lang="en-US" dirty="0" smtClean="0">
+                <a:latin typeface="Segoe Light"/>
+                <a:cs typeface="Segoe Light"/>
+              </a:rPr>
+              <a:t>[AS0] 172.16.121.113</a:t>
+            </a:r>
+            <a:endParaRPr lang="en-US" dirty="0">
+              <a:latin typeface="Segoe Light"/>
+              <a:cs typeface="Segoe Light"/>
+            </a:endParaRPr>
+          </a:p>
+        </p:txBody>
+      </p:sp>
+      <p:sp>
+        <p:nvSpPr>
+          <p:cNvPr id="34" name="Rectangle 33"/>
+          <p:cNvSpPr/>
+          <p:nvPr/>
+        </p:nvSpPr>
+        <p:spPr>
+          <a:xfrm>
+            <a:off x="5069430" y="3286342"/>
+            <a:ext cx="2827923" cy="384246"/>
+          </a:xfrm>
+          <a:prstGeom prst="rect">
+            <a:avLst/>
+          </a:prstGeom>
+          <a:solidFill>
+            <a:schemeClr val="bg1">
+              <a:lumMod val="65000"/>
+              <a:lumOff val="35000"/>
+            </a:schemeClr>
+          </a:solidFill>
+          <a:ln>
+            <a:noFill/>
+          </a:ln>
+        </p:spPr>
+        <p:style>
+          <a:lnRef idx="1">
+            <a:schemeClr val="accent1"/>
+          </a:lnRef>
+          <a:fillRef idx="3">
+            <a:schemeClr val="accent1"/>
+          </a:fillRef>
+          <a:effectRef idx="2">
+            <a:schemeClr val="accent1"/>
+          </a:effectRef>
+          <a:fontRef idx="minor">
+            <a:schemeClr val="lt1"/>
+          </a:fontRef>
+        </p:style>
+        <p:txBody>
+          <a:bodyPr rtlCol="0" anchor="ctr"/>
+          <a:lstStyle/>
+          <a:p>
+            <a:pPr algn="ctr"/>
+            <a:r>
+              <a:rPr lang="en-US" dirty="0" smtClean="0">
+                <a:latin typeface="Segoe Light"/>
+                <a:cs typeface="Segoe Light"/>
+              </a:rPr>
+              <a:t>[AS7018] 12.249.2.49</a:t>
+            </a:r>
+            <a:endParaRPr lang="en-US" dirty="0">
+              <a:latin typeface="Segoe Light"/>
+              <a:cs typeface="Segoe Light"/>
+            </a:endParaRPr>
+          </a:p>
+        </p:txBody>
+      </p:sp>
+      <p:sp>
+        <p:nvSpPr>
+          <p:cNvPr id="35" name="Rectangle 34"/>
+          <p:cNvSpPr/>
+          <p:nvPr/>
+        </p:nvSpPr>
+        <p:spPr>
+          <a:xfrm>
+            <a:off x="5069430" y="3735576"/>
+            <a:ext cx="2827923" cy="384246"/>
+          </a:xfrm>
+          <a:prstGeom prst="rect">
+            <a:avLst/>
+          </a:prstGeom>
+          <a:solidFill>
+            <a:schemeClr val="bg1">
+              <a:lumMod val="65000"/>
+              <a:lumOff val="35000"/>
+            </a:schemeClr>
+          </a:solidFill>
+          <a:ln>
+            <a:noFill/>
+          </a:ln>
+        </p:spPr>
+        <p:style>
+          <a:lnRef idx="1">
+            <a:schemeClr val="accent1"/>
+          </a:lnRef>
+          <a:fillRef idx="3">
+            <a:schemeClr val="accent1"/>
+          </a:fillRef>
+          <a:effectRef idx="2">
+            <a:schemeClr val="accent1"/>
+          </a:effectRef>
+          <a:fontRef idx="minor">
+            <a:schemeClr val="lt1"/>
+          </a:fontRef>
+        </p:style>
+        <p:txBody>
+          <a:bodyPr rtlCol="0" anchor="ctr"/>
+          <a:lstStyle/>
+          <a:p>
+            <a:pPr algn="ctr"/>
+            <a:r>
+              <a:rPr lang="en-US" dirty="0">
+                <a:latin typeface="Segoe Light"/>
+                <a:cs typeface="Segoe Light"/>
+              </a:rPr>
+              <a:t>[AS7018] </a:t>
+            </a:r>
+            <a:r>
+              <a:rPr lang="en-US" dirty="0" smtClean="0">
+                <a:latin typeface="Segoe Light"/>
+                <a:cs typeface="Segoe Light"/>
+              </a:rPr>
+              <a:t>12.83.180.82</a:t>
+            </a:r>
+            <a:endParaRPr lang="en-US" dirty="0">
+              <a:latin typeface="Segoe Light"/>
+              <a:cs typeface="Segoe Light"/>
+            </a:endParaRPr>
+          </a:p>
+        </p:txBody>
+      </p:sp>
+      <p:sp>
+        <p:nvSpPr>
+          <p:cNvPr id="36" name="Rectangle 35"/>
+          <p:cNvSpPr/>
+          <p:nvPr/>
+        </p:nvSpPr>
+        <p:spPr>
+          <a:xfrm>
+            <a:off x="5069429" y="4169976"/>
+            <a:ext cx="2827923" cy="850358"/>
+          </a:xfrm>
+          <a:prstGeom prst="rect">
+            <a:avLst/>
+          </a:prstGeom>
+          <a:solidFill>
+            <a:schemeClr val="bg1">
+              <a:lumMod val="65000"/>
+              <a:lumOff val="35000"/>
+            </a:schemeClr>
+          </a:solidFill>
+          <a:ln>
+            <a:noFill/>
+          </a:ln>
+        </p:spPr>
+        <p:style>
+          <a:lnRef idx="1">
+            <a:schemeClr val="accent1"/>
+          </a:lnRef>
+          <a:fillRef idx="3">
+            <a:schemeClr val="accent1"/>
+          </a:fillRef>
+          <a:effectRef idx="2">
+            <a:schemeClr val="accent1"/>
+          </a:effectRef>
+          <a:fontRef idx="minor">
+            <a:schemeClr val="lt1"/>
+          </a:fontRef>
+        </p:style>
+        <p:txBody>
+          <a:bodyPr rtlCol="0" anchor="ctr"/>
+          <a:lstStyle/>
+          <a:p>
+            <a:pPr algn="ctr"/>
+            <a:r>
+              <a:rPr lang="en-US" dirty="0">
+                <a:latin typeface="Segoe Light"/>
+                <a:cs typeface="Segoe Light"/>
+              </a:rPr>
+              <a:t>[AS7018</a:t>
+            </a:r>
+            <a:r>
+              <a:rPr lang="en-US" dirty="0" smtClean="0">
+                <a:latin typeface="Segoe Light"/>
+                <a:cs typeface="Segoe Light"/>
+              </a:rPr>
+              <a:t>]</a:t>
+            </a:r>
+          </a:p>
+          <a:p>
+            <a:pPr algn="ctr"/>
+            <a:r>
+              <a:rPr lang="en-US" dirty="0">
+                <a:latin typeface="Segoe Light"/>
+                <a:cs typeface="Segoe Light"/>
+              </a:rPr>
+              <a:t>12.122.200.9/12.122.114.5</a:t>
+            </a:r>
+            <a:endParaRPr lang="en-US" dirty="0" smtClean="0">
+              <a:latin typeface="Segoe Light"/>
+              <a:cs typeface="Segoe Light"/>
+            </a:endParaRPr>
+          </a:p>
+          <a:p>
+            <a:pPr algn="ctr"/>
+            <a:r>
+              <a:rPr lang="en-US" dirty="0" smtClean="0">
+                <a:latin typeface="Segoe Light"/>
+                <a:cs typeface="Segoe Light"/>
+              </a:rPr>
+              <a:t>12.122.1.118/12.122.8.79…</a:t>
+            </a:r>
+            <a:endParaRPr lang="en-US" dirty="0">
+              <a:latin typeface="Segoe Light"/>
+              <a:cs typeface="Segoe Light"/>
+            </a:endParaRPr>
+          </a:p>
+        </p:txBody>
+      </p:sp>
+      <p:sp>
+        <p:nvSpPr>
+          <p:cNvPr id="37" name="Rectangle 36"/>
+          <p:cNvSpPr/>
+          <p:nvPr/>
+        </p:nvSpPr>
+        <p:spPr>
+          <a:xfrm>
+            <a:off x="5069430" y="5077542"/>
+            <a:ext cx="2827923" cy="1158303"/>
+          </a:xfrm>
+          <a:prstGeom prst="rect">
+            <a:avLst/>
+          </a:prstGeom>
+          <a:solidFill>
+            <a:schemeClr val="bg1">
+              <a:lumMod val="65000"/>
+              <a:lumOff val="35000"/>
+            </a:schemeClr>
+          </a:solidFill>
+          <a:ln>
+            <a:noFill/>
+          </a:ln>
+        </p:spPr>
+        <p:style>
+          <a:lnRef idx="1">
+            <a:schemeClr val="accent1"/>
+          </a:lnRef>
+          <a:fillRef idx="3">
+            <a:schemeClr val="accent1"/>
+          </a:fillRef>
+          <a:effectRef idx="2">
+            <a:schemeClr val="accent1"/>
+          </a:effectRef>
+          <a:fontRef idx="minor">
+            <a:schemeClr val="lt1"/>
+          </a:fontRef>
+        </p:style>
+        <p:txBody>
+          <a:bodyPr rtlCol="0" anchor="ctr"/>
+          <a:lstStyle/>
+          <a:p>
+            <a:pPr algn="ctr"/>
+            <a:r>
+              <a:rPr lang="en-US" dirty="0">
+                <a:latin typeface="Segoe Light"/>
+                <a:cs typeface="Segoe Light"/>
+              </a:rPr>
+              <a:t>[AS7018</a:t>
+            </a:r>
+            <a:r>
+              <a:rPr lang="en-US" dirty="0" smtClean="0">
+                <a:latin typeface="Segoe Light"/>
+                <a:cs typeface="Segoe Light"/>
+              </a:rPr>
+              <a:t>]</a:t>
+            </a:r>
+          </a:p>
+          <a:p>
+            <a:pPr algn="ctr"/>
+            <a:r>
+              <a:rPr lang="en-US" dirty="0">
+                <a:latin typeface="Segoe Light"/>
+                <a:cs typeface="Segoe Light"/>
+              </a:rPr>
+              <a:t>12.122.114.21/</a:t>
+            </a:r>
+            <a:r>
+              <a:rPr lang="en-US" dirty="0" smtClean="0">
+                <a:latin typeface="Segoe Light"/>
+                <a:cs typeface="Segoe Light"/>
+              </a:rPr>
+              <a:t>12.123.30.5 </a:t>
+            </a:r>
+            <a:endParaRPr lang="en-US" dirty="0">
+              <a:latin typeface="Segoe Light"/>
+              <a:cs typeface="Segoe Light"/>
+            </a:endParaRPr>
+          </a:p>
+          <a:p>
+            <a:pPr algn="ctr"/>
+            <a:r>
+              <a:rPr lang="en-US" dirty="0" smtClean="0">
+                <a:latin typeface="Segoe Light"/>
+                <a:cs typeface="Segoe Light"/>
+              </a:rPr>
+              <a:t>[AS0]</a:t>
+            </a:r>
+          </a:p>
+          <a:p>
+            <a:pPr algn="ctr"/>
+            <a:r>
+              <a:rPr lang="en-US" dirty="0" smtClean="0">
+                <a:latin typeface="Segoe Light"/>
+                <a:cs typeface="Segoe Light"/>
+              </a:rPr>
+              <a:t>192.205.33.46/…</a:t>
+            </a:r>
+            <a:endParaRPr lang="en-US" dirty="0">
+              <a:latin typeface="Segoe Light"/>
+              <a:cs typeface="Segoe Light"/>
+            </a:endParaRPr>
+          </a:p>
+        </p:txBody>
+      </p:sp>
+      <p:sp>
+        <p:nvSpPr>
+          <p:cNvPr id="43" name="TextBox 42"/>
+          <p:cNvSpPr txBox="1"/>
+          <p:nvPr/>
+        </p:nvSpPr>
+        <p:spPr>
+          <a:xfrm>
+            <a:off x="9373334" y="618676"/>
+            <a:ext cx="68186" cy="369332"/>
+          </a:xfrm>
+          <a:prstGeom prst="rect">
+            <a:avLst/>
+          </a:prstGeom>
+          <a:noFill/>
+        </p:spPr>
+        <p:txBody>
+          <a:bodyPr wrap="square" rtlCol="0">
+            <a:spAutoFit/>
+          </a:bodyPr>
+          <a:lstStyle/>
+          <a:p>
+            <a:endParaRPr lang="en-US" dirty="0"/>
+          </a:p>
+        </p:txBody>
+      </p:sp>
+      <p:sp>
+        <p:nvSpPr>
+          <p:cNvPr id="44" name="Rectangle 43"/>
+          <p:cNvSpPr/>
+          <p:nvPr/>
+        </p:nvSpPr>
+        <p:spPr>
+          <a:xfrm>
+            <a:off x="8019974" y="152083"/>
+            <a:ext cx="1044185" cy="384246"/>
+          </a:xfrm>
+          <a:prstGeom prst="rect">
+            <a:avLst/>
+          </a:prstGeom>
+          <a:solidFill>
+            <a:schemeClr val="bg1">
+              <a:lumMod val="65000"/>
+              <a:lumOff val="35000"/>
+            </a:schemeClr>
+          </a:solidFill>
+          <a:ln>
+            <a:noFill/>
+          </a:ln>
+        </p:spPr>
+        <p:style>
+          <a:lnRef idx="1">
+            <a:schemeClr val="accent1"/>
+          </a:lnRef>
+          <a:fillRef idx="3">
+            <a:schemeClr val="accent1"/>
+          </a:fillRef>
+          <a:effectRef idx="2">
+            <a:schemeClr val="accent1"/>
+          </a:effectRef>
+          <a:fontRef idx="minor">
+            <a:schemeClr val="lt1"/>
+          </a:fontRef>
+        </p:style>
+        <p:txBody>
+          <a:bodyPr rtlCol="0" anchor="ctr"/>
+          <a:lstStyle/>
+          <a:p>
+            <a:pPr algn="ctr"/>
+            <a:r>
+              <a:rPr lang="en-US" dirty="0" smtClean="0">
+                <a:latin typeface="Segoe Light"/>
+                <a:cs typeface="Segoe Light"/>
+              </a:rPr>
+              <a:t>~0.7 </a:t>
+            </a:r>
+            <a:r>
+              <a:rPr lang="en-US" dirty="0" err="1" smtClean="0">
+                <a:latin typeface="Segoe Light"/>
+                <a:cs typeface="Segoe Light"/>
+              </a:rPr>
+              <a:t>ms</a:t>
+            </a:r>
+            <a:endParaRPr lang="en-US" dirty="0">
+              <a:latin typeface="Segoe Light"/>
+              <a:cs typeface="Segoe Light"/>
+            </a:endParaRPr>
+          </a:p>
+        </p:txBody>
+      </p:sp>
+      <p:sp>
+        <p:nvSpPr>
+          <p:cNvPr id="45" name="Rectangle 44"/>
+          <p:cNvSpPr/>
+          <p:nvPr/>
+        </p:nvSpPr>
+        <p:spPr>
+          <a:xfrm>
+            <a:off x="8019974" y="1024641"/>
+            <a:ext cx="1044186" cy="384246"/>
+          </a:xfrm>
+          <a:prstGeom prst="rect">
+            <a:avLst/>
+          </a:prstGeom>
+          <a:solidFill>
+            <a:schemeClr val="bg1">
+              <a:lumMod val="65000"/>
+              <a:lumOff val="35000"/>
+            </a:schemeClr>
+          </a:solidFill>
+          <a:ln>
+            <a:noFill/>
+          </a:ln>
+        </p:spPr>
+        <p:style>
+          <a:lnRef idx="1">
+            <a:schemeClr val="accent1"/>
+          </a:lnRef>
+          <a:fillRef idx="3">
+            <a:schemeClr val="accent1"/>
+          </a:fillRef>
+          <a:effectRef idx="2">
+            <a:schemeClr val="accent1"/>
+          </a:effectRef>
+          <a:fontRef idx="minor">
+            <a:schemeClr val="lt1"/>
+          </a:fontRef>
+        </p:style>
+        <p:txBody>
+          <a:bodyPr rtlCol="0" anchor="ctr"/>
+          <a:lstStyle/>
+          <a:p>
+            <a:pPr algn="ctr"/>
+            <a:r>
+              <a:rPr lang="en-US" dirty="0" smtClean="0">
+                <a:latin typeface="Segoe Light"/>
+                <a:cs typeface="Segoe Light"/>
+              </a:rPr>
+              <a:t>~30 </a:t>
+            </a:r>
+            <a:r>
+              <a:rPr lang="en-US" dirty="0" err="1" smtClean="0">
+                <a:latin typeface="Segoe Light"/>
+                <a:cs typeface="Segoe Light"/>
+              </a:rPr>
+              <a:t>ms</a:t>
+            </a:r>
+            <a:endParaRPr lang="en-US" dirty="0">
+              <a:latin typeface="Segoe Light"/>
+              <a:cs typeface="Segoe Light"/>
+            </a:endParaRPr>
+          </a:p>
+        </p:txBody>
+      </p:sp>
+      <p:sp>
+        <p:nvSpPr>
+          <p:cNvPr id="46" name="Rectangle 45"/>
+          <p:cNvSpPr/>
+          <p:nvPr/>
+        </p:nvSpPr>
+        <p:spPr>
+          <a:xfrm>
+            <a:off x="8019974" y="584944"/>
+            <a:ext cx="1044185" cy="384246"/>
+          </a:xfrm>
+          <a:prstGeom prst="rect">
+            <a:avLst/>
+          </a:prstGeom>
+          <a:solidFill>
+            <a:schemeClr val="bg1">
+              <a:lumMod val="65000"/>
+              <a:lumOff val="35000"/>
+            </a:schemeClr>
+          </a:solidFill>
+          <a:ln>
+            <a:noFill/>
+          </a:ln>
+        </p:spPr>
+        <p:style>
+          <a:lnRef idx="1">
+            <a:schemeClr val="accent1"/>
+          </a:lnRef>
+          <a:fillRef idx="3">
+            <a:schemeClr val="accent1"/>
+          </a:fillRef>
+          <a:effectRef idx="2">
+            <a:schemeClr val="accent1"/>
+          </a:effectRef>
+          <a:fontRef idx="minor">
+            <a:schemeClr val="lt1"/>
+          </a:fontRef>
+        </p:style>
+        <p:txBody>
+          <a:bodyPr rtlCol="0" anchor="ctr"/>
+          <a:lstStyle/>
+          <a:p>
+            <a:pPr algn="ctr"/>
+            <a:r>
+              <a:rPr lang="en-US" dirty="0" smtClean="0">
+                <a:latin typeface="Segoe Light"/>
+                <a:cs typeface="Segoe Light"/>
+              </a:rPr>
+              <a:t>~30 </a:t>
+            </a:r>
+            <a:r>
+              <a:rPr lang="en-US" dirty="0" err="1" smtClean="0">
+                <a:latin typeface="Segoe Light"/>
+                <a:cs typeface="Segoe Light"/>
+              </a:rPr>
+              <a:t>ms</a:t>
+            </a:r>
+            <a:endParaRPr lang="en-US" dirty="0">
+              <a:latin typeface="Segoe Light"/>
+              <a:cs typeface="Segoe Light"/>
+            </a:endParaRPr>
+          </a:p>
+        </p:txBody>
+      </p:sp>
+      <p:sp>
+        <p:nvSpPr>
+          <p:cNvPr id="47" name="Rectangle 46"/>
+          <p:cNvSpPr/>
+          <p:nvPr/>
+        </p:nvSpPr>
+        <p:spPr>
+          <a:xfrm>
+            <a:off x="8019975" y="1462745"/>
+            <a:ext cx="1044186" cy="868599"/>
+          </a:xfrm>
+          <a:prstGeom prst="rect">
+            <a:avLst/>
+          </a:prstGeom>
+          <a:solidFill>
+            <a:schemeClr val="bg1">
+              <a:lumMod val="65000"/>
+              <a:lumOff val="35000"/>
+            </a:schemeClr>
+          </a:solidFill>
+          <a:ln>
+            <a:noFill/>
+          </a:ln>
+        </p:spPr>
+        <p:style>
+          <a:lnRef idx="1">
+            <a:schemeClr val="accent1"/>
+          </a:lnRef>
+          <a:fillRef idx="3">
+            <a:schemeClr val="accent1"/>
+          </a:fillRef>
+          <a:effectRef idx="2">
+            <a:schemeClr val="accent1"/>
+          </a:effectRef>
+          <a:fontRef idx="minor">
+            <a:schemeClr val="lt1"/>
+          </a:fontRef>
+        </p:style>
+        <p:txBody>
+          <a:bodyPr rtlCol="0" anchor="ctr"/>
+          <a:lstStyle/>
+          <a:p>
+            <a:pPr algn="ctr"/>
+            <a:r>
+              <a:rPr lang="en-US" dirty="0" smtClean="0">
+                <a:latin typeface="Segoe Light"/>
+                <a:cs typeface="Segoe Light"/>
+              </a:rPr>
+              <a:t>~30 </a:t>
+            </a:r>
+            <a:r>
+              <a:rPr lang="en-US" dirty="0" err="1" smtClean="0">
+                <a:latin typeface="Segoe Light"/>
+                <a:cs typeface="Segoe Light"/>
+              </a:rPr>
+              <a:t>ms</a:t>
+            </a:r>
+            <a:endParaRPr lang="en-US" dirty="0">
+              <a:latin typeface="Segoe Light"/>
+              <a:cs typeface="Segoe Light"/>
+            </a:endParaRPr>
+          </a:p>
+        </p:txBody>
+      </p:sp>
+      <p:sp>
+        <p:nvSpPr>
+          <p:cNvPr id="48" name="Rectangle 47"/>
+          <p:cNvSpPr/>
+          <p:nvPr/>
+        </p:nvSpPr>
+        <p:spPr>
+          <a:xfrm>
+            <a:off x="8019974" y="2389112"/>
+            <a:ext cx="1044186" cy="384246"/>
+          </a:xfrm>
+          <a:prstGeom prst="rect">
+            <a:avLst/>
+          </a:prstGeom>
+          <a:solidFill>
+            <a:schemeClr val="bg1">
+              <a:lumMod val="65000"/>
+              <a:lumOff val="35000"/>
+            </a:schemeClr>
+          </a:solidFill>
+          <a:ln>
+            <a:noFill/>
+          </a:ln>
+        </p:spPr>
+        <p:style>
+          <a:lnRef idx="1">
+            <a:schemeClr val="accent1"/>
+          </a:lnRef>
+          <a:fillRef idx="3">
+            <a:schemeClr val="accent1"/>
+          </a:fillRef>
+          <a:effectRef idx="2">
+            <a:schemeClr val="accent1"/>
+          </a:effectRef>
+          <a:fontRef idx="minor">
+            <a:schemeClr val="lt1"/>
+          </a:fontRef>
+        </p:style>
+        <p:txBody>
+          <a:bodyPr rtlCol="0" anchor="ctr"/>
+          <a:lstStyle/>
+          <a:p>
+            <a:pPr algn="ctr"/>
+            <a:r>
+              <a:rPr lang="en-US" dirty="0" smtClean="0">
+                <a:latin typeface="Segoe Light"/>
+                <a:cs typeface="Segoe Light"/>
+              </a:rPr>
+              <a:t>~30 </a:t>
+            </a:r>
+            <a:r>
+              <a:rPr lang="en-US" dirty="0" err="1" smtClean="0">
+                <a:latin typeface="Segoe Light"/>
+                <a:cs typeface="Segoe Light"/>
+              </a:rPr>
+              <a:t>ms</a:t>
+            </a:r>
+            <a:endParaRPr lang="en-US" dirty="0">
+              <a:latin typeface="Segoe Light"/>
+              <a:cs typeface="Segoe Light"/>
+            </a:endParaRPr>
+          </a:p>
+        </p:txBody>
+      </p:sp>
+      <p:sp>
+        <p:nvSpPr>
+          <p:cNvPr id="49" name="Rectangle 48"/>
+          <p:cNvSpPr/>
+          <p:nvPr/>
+        </p:nvSpPr>
+        <p:spPr>
+          <a:xfrm>
+            <a:off x="8019975" y="2836355"/>
+            <a:ext cx="1044186" cy="384246"/>
+          </a:xfrm>
+          <a:prstGeom prst="rect">
+            <a:avLst/>
+          </a:prstGeom>
+          <a:solidFill>
+            <a:schemeClr val="bg1">
+              <a:lumMod val="65000"/>
+              <a:lumOff val="35000"/>
+            </a:schemeClr>
+          </a:solidFill>
+          <a:ln>
+            <a:noFill/>
+          </a:ln>
+        </p:spPr>
+        <p:style>
+          <a:lnRef idx="1">
+            <a:schemeClr val="accent1"/>
+          </a:lnRef>
+          <a:fillRef idx="3">
+            <a:schemeClr val="accent1"/>
+          </a:fillRef>
+          <a:effectRef idx="2">
+            <a:schemeClr val="accent1"/>
+          </a:effectRef>
+          <a:fontRef idx="minor">
+            <a:schemeClr val="lt1"/>
+          </a:fontRef>
+        </p:style>
+        <p:txBody>
+          <a:bodyPr rtlCol="0" anchor="ctr"/>
+          <a:lstStyle/>
+          <a:p>
+            <a:pPr algn="ctr"/>
+            <a:r>
+              <a:rPr lang="en-US" dirty="0" smtClean="0">
+                <a:latin typeface="Segoe Light"/>
+                <a:cs typeface="Segoe Light"/>
+              </a:rPr>
+              <a:t>~30 </a:t>
+            </a:r>
+            <a:r>
+              <a:rPr lang="en-US" dirty="0" err="1" smtClean="0">
+                <a:latin typeface="Segoe Light"/>
+                <a:cs typeface="Segoe Light"/>
+              </a:rPr>
+              <a:t>ms</a:t>
+            </a:r>
+            <a:endParaRPr lang="en-US" dirty="0">
+              <a:latin typeface="Segoe Light"/>
+              <a:cs typeface="Segoe Light"/>
+            </a:endParaRPr>
+          </a:p>
+        </p:txBody>
+      </p:sp>
+      <p:sp>
+        <p:nvSpPr>
+          <p:cNvPr id="50" name="Rectangle 49"/>
+          <p:cNvSpPr/>
+          <p:nvPr/>
+        </p:nvSpPr>
+        <p:spPr>
+          <a:xfrm>
+            <a:off x="8019975" y="3286342"/>
+            <a:ext cx="1044186" cy="384246"/>
+          </a:xfrm>
+          <a:prstGeom prst="rect">
+            <a:avLst/>
+          </a:prstGeom>
+          <a:solidFill>
+            <a:schemeClr val="bg1">
+              <a:lumMod val="65000"/>
+              <a:lumOff val="35000"/>
+            </a:schemeClr>
+          </a:solidFill>
+          <a:ln>
+            <a:noFill/>
+          </a:ln>
+        </p:spPr>
+        <p:style>
+          <a:lnRef idx="1">
+            <a:schemeClr val="accent1"/>
+          </a:lnRef>
+          <a:fillRef idx="3">
+            <a:schemeClr val="accent1"/>
+          </a:fillRef>
+          <a:effectRef idx="2">
+            <a:schemeClr val="accent1"/>
+          </a:effectRef>
+          <a:fontRef idx="minor">
+            <a:schemeClr val="lt1"/>
+          </a:fontRef>
+        </p:style>
+        <p:txBody>
+          <a:bodyPr rtlCol="0" anchor="ctr"/>
+          <a:lstStyle/>
+          <a:p>
+            <a:pPr algn="ctr"/>
+            <a:r>
+              <a:rPr lang="en-US" dirty="0" smtClean="0">
+                <a:latin typeface="Segoe Light"/>
+                <a:cs typeface="Segoe Light"/>
+              </a:rPr>
+              <a:t>~30 </a:t>
+            </a:r>
+            <a:r>
+              <a:rPr lang="en-US" dirty="0" err="1" smtClean="0">
+                <a:latin typeface="Segoe Light"/>
+                <a:cs typeface="Segoe Light"/>
+              </a:rPr>
+              <a:t>ms</a:t>
+            </a:r>
+            <a:endParaRPr lang="en-US" dirty="0">
+              <a:latin typeface="Segoe Light"/>
+              <a:cs typeface="Segoe Light"/>
+            </a:endParaRPr>
+          </a:p>
+        </p:txBody>
+      </p:sp>
+      <p:sp>
+        <p:nvSpPr>
+          <p:cNvPr id="51" name="Rectangle 50"/>
+          <p:cNvSpPr/>
+          <p:nvPr/>
+        </p:nvSpPr>
+        <p:spPr>
+          <a:xfrm>
+            <a:off x="8019975" y="3735576"/>
+            <a:ext cx="1044186" cy="384246"/>
+          </a:xfrm>
+          <a:prstGeom prst="rect">
+            <a:avLst/>
+          </a:prstGeom>
+          <a:solidFill>
+            <a:schemeClr val="bg1">
+              <a:lumMod val="65000"/>
+              <a:lumOff val="35000"/>
+            </a:schemeClr>
+          </a:solidFill>
+          <a:ln>
+            <a:noFill/>
+          </a:ln>
+        </p:spPr>
+        <p:style>
+          <a:lnRef idx="1">
+            <a:schemeClr val="accent1"/>
+          </a:lnRef>
+          <a:fillRef idx="3">
+            <a:schemeClr val="accent1"/>
+          </a:fillRef>
+          <a:effectRef idx="2">
+            <a:schemeClr val="accent1"/>
+          </a:effectRef>
+          <a:fontRef idx="minor">
+            <a:schemeClr val="lt1"/>
+          </a:fontRef>
+        </p:style>
+        <p:txBody>
+          <a:bodyPr rtlCol="0" anchor="ctr"/>
+          <a:lstStyle/>
+          <a:p>
+            <a:pPr algn="ctr"/>
+            <a:r>
+              <a:rPr lang="en-US" dirty="0" smtClean="0">
+                <a:latin typeface="Segoe Light"/>
+                <a:cs typeface="Segoe Light"/>
+              </a:rPr>
+              <a:t>~40 </a:t>
+            </a:r>
+            <a:r>
+              <a:rPr lang="en-US" dirty="0" err="1" smtClean="0">
+                <a:latin typeface="Segoe Light"/>
+                <a:cs typeface="Segoe Light"/>
+              </a:rPr>
+              <a:t>ms</a:t>
+            </a:r>
+            <a:endParaRPr lang="en-US" dirty="0">
+              <a:latin typeface="Segoe Light"/>
+              <a:cs typeface="Segoe Light"/>
+            </a:endParaRPr>
+          </a:p>
+        </p:txBody>
+      </p:sp>
+      <p:sp>
+        <p:nvSpPr>
+          <p:cNvPr id="52" name="Rectangle 51"/>
+          <p:cNvSpPr/>
+          <p:nvPr/>
+        </p:nvSpPr>
+        <p:spPr>
+          <a:xfrm>
+            <a:off x="8019974" y="4169976"/>
+            <a:ext cx="1044186" cy="850358"/>
+          </a:xfrm>
+          <a:prstGeom prst="rect">
+            <a:avLst/>
+          </a:prstGeom>
+          <a:solidFill>
+            <a:schemeClr val="bg1">
+              <a:lumMod val="65000"/>
+              <a:lumOff val="35000"/>
+            </a:schemeClr>
+          </a:solidFill>
+          <a:ln>
+            <a:noFill/>
+          </a:ln>
+        </p:spPr>
+        <p:style>
+          <a:lnRef idx="1">
+            <a:schemeClr val="accent1"/>
+          </a:lnRef>
+          <a:fillRef idx="3">
+            <a:schemeClr val="accent1"/>
+          </a:fillRef>
+          <a:effectRef idx="2">
+            <a:schemeClr val="accent1"/>
+          </a:effectRef>
+          <a:fontRef idx="minor">
+            <a:schemeClr val="lt1"/>
+          </a:fontRef>
+        </p:style>
+        <p:txBody>
+          <a:bodyPr rtlCol="0" anchor="ctr"/>
+          <a:lstStyle/>
+          <a:p>
+            <a:pPr algn="ctr"/>
+            <a:r>
+              <a:rPr lang="en-US" dirty="0">
+                <a:latin typeface="Segoe Light"/>
+                <a:cs typeface="Segoe Light"/>
+              </a:rPr>
+              <a:t>40 </a:t>
+            </a:r>
+            <a:r>
+              <a:rPr lang="en-US" dirty="0" err="1">
+                <a:latin typeface="Segoe Light"/>
+                <a:cs typeface="Segoe Light"/>
+              </a:rPr>
+              <a:t>ms</a:t>
+            </a:r>
+            <a:r>
+              <a:rPr lang="en-US" dirty="0">
+                <a:latin typeface="Segoe Light"/>
+                <a:cs typeface="Segoe Light"/>
+              </a:rPr>
+              <a:t> -</a:t>
+            </a:r>
+          </a:p>
+          <a:p>
+            <a:pPr algn="ctr"/>
+            <a:r>
+              <a:rPr lang="en-US" dirty="0">
+                <a:latin typeface="Segoe Light"/>
+                <a:cs typeface="Segoe Light"/>
+              </a:rPr>
+              <a:t>100 </a:t>
+            </a:r>
+            <a:r>
+              <a:rPr lang="en-US" dirty="0" err="1">
+                <a:latin typeface="Segoe Light"/>
+                <a:cs typeface="Segoe Light"/>
+              </a:rPr>
+              <a:t>ms</a:t>
+            </a:r>
+            <a:endParaRPr lang="en-US" dirty="0">
+              <a:latin typeface="Segoe Light"/>
+              <a:cs typeface="Segoe Light"/>
+            </a:endParaRPr>
+          </a:p>
+        </p:txBody>
+      </p:sp>
+      <p:sp>
+        <p:nvSpPr>
+          <p:cNvPr id="53" name="Rectangle 52"/>
+          <p:cNvSpPr/>
+          <p:nvPr/>
+        </p:nvSpPr>
+        <p:spPr>
+          <a:xfrm>
+            <a:off x="8019975" y="5077542"/>
+            <a:ext cx="1044186" cy="1158303"/>
+          </a:xfrm>
+          <a:prstGeom prst="rect">
+            <a:avLst/>
+          </a:prstGeom>
+          <a:solidFill>
+            <a:schemeClr val="bg1">
+              <a:lumMod val="65000"/>
+              <a:lumOff val="35000"/>
+            </a:schemeClr>
+          </a:solidFill>
+          <a:ln>
+            <a:noFill/>
+          </a:ln>
+        </p:spPr>
+        <p:style>
+          <a:lnRef idx="1">
+            <a:schemeClr val="accent1"/>
+          </a:lnRef>
+          <a:fillRef idx="3">
+            <a:schemeClr val="accent1"/>
+          </a:fillRef>
+          <a:effectRef idx="2">
+            <a:schemeClr val="accent1"/>
+          </a:effectRef>
+          <a:fontRef idx="minor">
+            <a:schemeClr val="lt1"/>
+          </a:fontRef>
+        </p:style>
+        <p:txBody>
+          <a:bodyPr rtlCol="0" anchor="ctr"/>
+          <a:lstStyle/>
+          <a:p>
+            <a:pPr algn="ctr"/>
+            <a:r>
+              <a:rPr lang="en-US" dirty="0" smtClean="0">
+                <a:latin typeface="Segoe Light"/>
+                <a:cs typeface="Segoe Light"/>
+              </a:rPr>
+              <a:t>40 </a:t>
+            </a:r>
+            <a:r>
+              <a:rPr lang="en-US" dirty="0" err="1" smtClean="0">
+                <a:latin typeface="Segoe Light"/>
+                <a:cs typeface="Segoe Light"/>
+              </a:rPr>
+              <a:t>ms</a:t>
+            </a:r>
+            <a:r>
+              <a:rPr lang="en-US" dirty="0" smtClean="0">
+                <a:latin typeface="Segoe Light"/>
+                <a:cs typeface="Segoe Light"/>
+              </a:rPr>
+              <a:t> -</a:t>
+            </a:r>
+          </a:p>
+          <a:p>
+            <a:pPr algn="ctr"/>
+            <a:r>
+              <a:rPr lang="en-US" dirty="0" smtClean="0">
+                <a:latin typeface="Segoe Light"/>
+                <a:cs typeface="Segoe Light"/>
+              </a:rPr>
+              <a:t>100 </a:t>
+            </a:r>
+            <a:r>
+              <a:rPr lang="en-US" dirty="0" err="1" smtClean="0">
+                <a:latin typeface="Segoe Light"/>
+                <a:cs typeface="Segoe Light"/>
+              </a:rPr>
+              <a:t>ms</a:t>
+            </a:r>
+            <a:endParaRPr lang="en-US" dirty="0">
+              <a:latin typeface="Segoe Light"/>
+              <a:cs typeface="Segoe Light"/>
+            </a:endParaRPr>
+          </a:p>
+        </p:txBody>
+      </p:sp>
+      <p:sp>
+        <p:nvSpPr>
+          <p:cNvPr id="55" name="Rectangle 54"/>
+          <p:cNvSpPr/>
+          <p:nvPr/>
+        </p:nvSpPr>
+        <p:spPr>
+          <a:xfrm>
+            <a:off x="5069430" y="6305292"/>
+            <a:ext cx="3994729" cy="407270"/>
+          </a:xfrm>
+          <a:prstGeom prst="rect">
+            <a:avLst/>
+          </a:prstGeom>
+          <a:solidFill>
+            <a:schemeClr val="bg1">
+              <a:lumMod val="65000"/>
+              <a:lumOff val="35000"/>
+            </a:schemeClr>
+          </a:solidFill>
+          <a:ln>
+            <a:noFill/>
+          </a:ln>
+        </p:spPr>
+        <p:style>
+          <a:lnRef idx="1">
+            <a:schemeClr val="accent1"/>
+          </a:lnRef>
+          <a:fillRef idx="3">
+            <a:schemeClr val="accent1"/>
+          </a:fillRef>
+          <a:effectRef idx="2">
+            <a:schemeClr val="accent1"/>
+          </a:effectRef>
+          <a:fontRef idx="minor">
+            <a:schemeClr val="lt1"/>
+          </a:fontRef>
+        </p:style>
+        <p:txBody>
+          <a:bodyPr rtlCol="0" anchor="ctr"/>
+          <a:lstStyle/>
+          <a:p>
+            <a:pPr algn="ctr"/>
+            <a:r>
+              <a:rPr lang="en-US" dirty="0" smtClean="0">
+                <a:latin typeface="Segoe Light"/>
+                <a:cs typeface="Segoe Light"/>
+              </a:rPr>
+              <a:t>Possibly Internet….  50 </a:t>
+            </a:r>
+            <a:r>
+              <a:rPr lang="en-US" dirty="0" err="1" smtClean="0">
+                <a:latin typeface="Segoe Light"/>
+                <a:cs typeface="Segoe Light"/>
+              </a:rPr>
+              <a:t>ms</a:t>
+            </a:r>
+            <a:r>
+              <a:rPr lang="en-US" dirty="0" smtClean="0">
+                <a:latin typeface="Segoe Light"/>
+                <a:cs typeface="Segoe Light"/>
+              </a:rPr>
+              <a:t> – 200 </a:t>
+            </a:r>
+            <a:r>
+              <a:rPr lang="en-US" dirty="0" err="1" smtClean="0">
+                <a:latin typeface="Segoe Light"/>
+                <a:cs typeface="Segoe Light"/>
+              </a:rPr>
+              <a:t>ms</a:t>
+            </a:r>
+            <a:endParaRPr lang="en-US" dirty="0">
               <a:latin typeface="Segoe Light"/>
               <a:cs typeface="Segoe Light"/>
             </a:endParaRPr>
@@ -7392,6 +9223,278 @@
     <p:extLst>
       <p:ext uri="{BB962C8B-B14F-4D97-AF65-F5344CB8AC3E}">
         <p14:creationId xmlns:p14="http://schemas.microsoft.com/office/powerpoint/2010/main" val="2674779977"/>
+      </p:ext>
+    </p:extLst>
+  </p:cSld>
+  <p:clrMapOvr>
+    <a:masterClrMapping/>
+  </p:clrMapOvr>
+  <p:timing>
+    <p:tnLst>
+      <p:par>
+        <p:cTn xmlns:p14="http://schemas.microsoft.com/office/powerpoint/2010/main" id="1" dur="indefinite" restart="never" nodeType="tmRoot"/>
+      </p:par>
+    </p:tnLst>
+  </p:timing>
+</p:sld>
+</file>
+
+<file path=ppt/slides/slide9.xml><?xml version="1.0" encoding="utf-8"?>
+<p:sld xmlns:a="http://schemas.openxmlformats.org/drawingml/2006/main" xmlns:r="http://schemas.openxmlformats.org/officeDocument/2006/relationships" xmlns:p="http://schemas.openxmlformats.org/presentationml/2006/main">
+  <p:cSld>
+    <p:spTree>
+      <p:nvGrpSpPr>
+        <p:cNvPr id="1" name=""/>
+        <p:cNvGrpSpPr/>
+        <p:nvPr/>
+      </p:nvGrpSpPr>
+      <p:grpSpPr>
+        <a:xfrm>
+          <a:off x="0" y="0"/>
+          <a:ext cx="0" cy="0"/>
+          <a:chOff x="0" y="0"/>
+          <a:chExt cx="0" cy="0"/>
+        </a:xfrm>
+      </p:grpSpPr>
+      <p:sp>
+        <p:nvSpPr>
+          <p:cNvPr id="3" name="Content Placeholder 2"/>
+          <p:cNvSpPr>
+            <a:spLocks noGrp="1"/>
+          </p:cNvSpPr>
+          <p:nvPr>
+            <p:ph idx="1"/>
+          </p:nvPr>
+        </p:nvSpPr>
+        <p:spPr>
+          <a:xfrm>
+            <a:off x="457200" y="2588731"/>
+            <a:ext cx="8164722" cy="1843860"/>
+          </a:xfrm>
+        </p:spPr>
+        <p:txBody>
+          <a:bodyPr>
+            <a:normAutofit/>
+          </a:bodyPr>
+          <a:lstStyle/>
+          <a:p>
+            <a:pPr marL="0" indent="0" algn="ctr">
+              <a:buNone/>
+            </a:pPr>
+            <a:r>
+              <a:rPr lang="en-US" dirty="0" smtClean="0">
+                <a:latin typeface="Segoe Light"/>
+                <a:cs typeface="Segoe Light"/>
+              </a:rPr>
+              <a:t>Question</a:t>
+            </a:r>
+            <a:r>
+              <a:rPr lang="en-US" altLang="zh-CN" dirty="0" smtClean="0">
+                <a:latin typeface="Segoe Light"/>
+                <a:cs typeface="Segoe Light"/>
+              </a:rPr>
+              <a:t>s</a:t>
+            </a:r>
+            <a:r>
+              <a:rPr lang="en-US" dirty="0" smtClean="0">
+                <a:latin typeface="Segoe Light"/>
+                <a:cs typeface="Segoe Light"/>
+              </a:rPr>
+              <a:t> &amp; Feedback?</a:t>
+            </a:r>
+            <a:endParaRPr lang="en-US" sz="5500" dirty="0" smtClean="0">
+              <a:latin typeface="Segoe Light"/>
+              <a:cs typeface="Segoe Light"/>
+            </a:endParaRPr>
+          </a:p>
+          <a:p>
+            <a:pPr marL="0" indent="0" algn="ctr">
+              <a:buNone/>
+            </a:pPr>
+            <a:r>
+              <a:rPr lang="en-US" sz="6700" dirty="0" smtClean="0">
+                <a:latin typeface="Segoe Light"/>
+                <a:cs typeface="Segoe Light"/>
+              </a:rPr>
+              <a:t>Thank you!</a:t>
+            </a:r>
+            <a:endParaRPr lang="en-US" sz="6700" dirty="0">
+              <a:latin typeface="Segoe Light"/>
+              <a:cs typeface="Segoe Light"/>
+            </a:endParaRPr>
+          </a:p>
+        </p:txBody>
+      </p:sp>
+      <p:sp>
+        <p:nvSpPr>
+          <p:cNvPr id="4" name="Content Placeholder 2"/>
+          <p:cNvSpPr txBox="1">
+            <a:spLocks/>
+          </p:cNvSpPr>
+          <p:nvPr/>
+        </p:nvSpPr>
+        <p:spPr>
+          <a:xfrm>
+            <a:off x="609600" y="1380593"/>
+            <a:ext cx="8229600" cy="5122129"/>
+          </a:xfrm>
+          <a:prstGeom prst="rect">
+            <a:avLst/>
+          </a:prstGeom>
+        </p:spPr>
+        <p:txBody>
+          <a:bodyPr vert="horz" lIns="91440" tIns="45720" rIns="91440" bIns="45720" rtlCol="0">
+            <a:normAutofit/>
+          </a:bodyPr>
+          <a:lstStyle>
+            <a:lvl1pPr marL="342900" indent="-342900" algn="l" defTabSz="914400" rtl="0" eaLnBrk="1" latinLnBrk="0" hangingPunct="1">
+              <a:spcBef>
+                <a:spcPct val="20000"/>
+              </a:spcBef>
+              <a:buFont typeface="Arial" pitchFamily="34" charset="0"/>
+              <a:buChar char="•"/>
+              <a:defRPr sz="3200" kern="1200">
+                <a:solidFill>
+                  <a:schemeClr val="tx1"/>
+                </a:solidFill>
+                <a:latin typeface="+mn-lt"/>
+                <a:ea typeface="+mn-ea"/>
+                <a:cs typeface="+mn-cs"/>
+              </a:defRPr>
+            </a:lvl1pPr>
+            <a:lvl2pPr marL="742950" indent="-285750" algn="l" defTabSz="914400" rtl="0" eaLnBrk="1" latinLnBrk="0" hangingPunct="1">
+              <a:spcBef>
+                <a:spcPct val="20000"/>
+              </a:spcBef>
+              <a:buFont typeface="Arial" pitchFamily="34" charset="0"/>
+              <a:buChar char="–"/>
+              <a:defRPr sz="2800" kern="1200">
+                <a:solidFill>
+                  <a:schemeClr val="tx1"/>
+                </a:solidFill>
+                <a:latin typeface="+mn-lt"/>
+                <a:ea typeface="+mn-ea"/>
+                <a:cs typeface="+mn-cs"/>
+              </a:defRPr>
+            </a:lvl2pPr>
+            <a:lvl3pPr marL="1143000" indent="-228600" algn="l" defTabSz="914400" rtl="0" eaLnBrk="1" latinLnBrk="0" hangingPunct="1">
+              <a:spcBef>
+                <a:spcPct val="20000"/>
+              </a:spcBef>
+              <a:buFont typeface="Arial" pitchFamily="34" charset="0"/>
+              <a:buChar char="•"/>
+              <a:defRPr sz="2400" kern="1200">
+                <a:solidFill>
+                  <a:schemeClr val="tx1"/>
+                </a:solidFill>
+                <a:latin typeface="+mn-lt"/>
+                <a:ea typeface="+mn-ea"/>
+                <a:cs typeface="+mn-cs"/>
+              </a:defRPr>
+            </a:lvl3pPr>
+            <a:lvl4pPr marL="1600200" indent="-228600" algn="l" defTabSz="914400" rtl="0" eaLnBrk="1" latinLnBrk="0" hangingPunct="1">
+              <a:spcBef>
+                <a:spcPct val="20000"/>
+              </a:spcBef>
+              <a:buFont typeface="Arial" pitchFamily="34" charset="0"/>
+              <a:buChar char="–"/>
+              <a:defRPr sz="2000" kern="1200">
+                <a:solidFill>
+                  <a:schemeClr val="tx1"/>
+                </a:solidFill>
+                <a:latin typeface="+mn-lt"/>
+                <a:ea typeface="+mn-ea"/>
+                <a:cs typeface="+mn-cs"/>
+              </a:defRPr>
+            </a:lvl4pPr>
+            <a:lvl5pPr marL="2057400" indent="-228600" algn="l" defTabSz="914400" rtl="0" eaLnBrk="1" latinLnBrk="0" hangingPunct="1">
+              <a:spcBef>
+                <a:spcPct val="20000"/>
+              </a:spcBef>
+              <a:buFont typeface="Arial" pitchFamily="34" charset="0"/>
+              <a:buChar char="»"/>
+              <a:defRPr sz="2000" kern="1200">
+                <a:solidFill>
+                  <a:schemeClr val="tx1"/>
+                </a:solidFill>
+                <a:latin typeface="+mn-lt"/>
+                <a:ea typeface="+mn-ea"/>
+                <a:cs typeface="+mn-cs"/>
+              </a:defRPr>
+            </a:lvl5pPr>
+            <a:lvl6pPr marL="2514600" indent="-228600" algn="l" defTabSz="914400" rtl="0" eaLnBrk="1" latinLnBrk="0" hangingPunct="1">
+              <a:spcBef>
+                <a:spcPct val="20000"/>
+              </a:spcBef>
+              <a:buFont typeface="Arial" pitchFamily="34" charset="0"/>
+              <a:buChar char="•"/>
+              <a:defRPr sz="2000" kern="1200">
+                <a:solidFill>
+                  <a:schemeClr val="tx1"/>
+                </a:solidFill>
+                <a:latin typeface="+mn-lt"/>
+                <a:ea typeface="+mn-ea"/>
+                <a:cs typeface="+mn-cs"/>
+              </a:defRPr>
+            </a:lvl6pPr>
+            <a:lvl7pPr marL="2971800" indent="-228600" algn="l" defTabSz="914400" rtl="0" eaLnBrk="1" latinLnBrk="0" hangingPunct="1">
+              <a:spcBef>
+                <a:spcPct val="20000"/>
+              </a:spcBef>
+              <a:buFont typeface="Arial" pitchFamily="34" charset="0"/>
+              <a:buChar char="•"/>
+              <a:defRPr sz="2000" kern="1200">
+                <a:solidFill>
+                  <a:schemeClr val="tx1"/>
+                </a:solidFill>
+                <a:latin typeface="+mn-lt"/>
+                <a:ea typeface="+mn-ea"/>
+                <a:cs typeface="+mn-cs"/>
+              </a:defRPr>
+            </a:lvl7pPr>
+            <a:lvl8pPr marL="3429000" indent="-228600" algn="l" defTabSz="914400" rtl="0" eaLnBrk="1" latinLnBrk="0" hangingPunct="1">
+              <a:spcBef>
+                <a:spcPct val="20000"/>
+              </a:spcBef>
+              <a:buFont typeface="Arial" pitchFamily="34" charset="0"/>
+              <a:buChar char="•"/>
+              <a:defRPr sz="2000" kern="1200">
+                <a:solidFill>
+                  <a:schemeClr val="tx1"/>
+                </a:solidFill>
+                <a:latin typeface="+mn-lt"/>
+                <a:ea typeface="+mn-ea"/>
+                <a:cs typeface="+mn-cs"/>
+              </a:defRPr>
+            </a:lvl8pPr>
+            <a:lvl9pPr marL="3886200" indent="-228600" algn="l" defTabSz="914400" rtl="0" eaLnBrk="1" latinLnBrk="0" hangingPunct="1">
+              <a:spcBef>
+                <a:spcPct val="20000"/>
+              </a:spcBef>
+              <a:buFont typeface="Arial" pitchFamily="34" charset="0"/>
+              <a:buChar char="•"/>
+              <a:defRPr sz="2000" kern="1200">
+                <a:solidFill>
+                  <a:schemeClr val="tx1"/>
+                </a:solidFill>
+                <a:latin typeface="+mn-lt"/>
+                <a:ea typeface="+mn-ea"/>
+                <a:cs typeface="+mn-cs"/>
+              </a:defRPr>
+            </a:lvl9pPr>
+          </a:lstStyle>
+          <a:p>
+            <a:endParaRPr lang="en-US" sz="2400" dirty="0" smtClean="0">
+              <a:latin typeface="Segoe Light"/>
+              <a:cs typeface="Segoe Light"/>
+            </a:endParaRPr>
+          </a:p>
+        </p:txBody>
+      </p:sp>
+    </p:spTree>
+    <p:extLst>
+      <p:ext uri="{BB962C8B-B14F-4D97-AF65-F5344CB8AC3E}">
+        <p14:creationId xmlns:p14="http://schemas.microsoft.com/office/powerpoint/2010/main" val="3997919413"/>
       </p:ext>
     </p:extLst>
   </p:cSld>

</xml_diff>

<commit_message>
add a figure of Mobile networks
</commit_message>
<xml_diff>
--- a/doc/MidTerm/MidTerm.pptx
+++ b/doc/MidTerm/MidTerm.pptx
@@ -200,7 +200,7 @@
           <a:p>
             <a:fld id="{A6609C19-3333-F748-BFA8-3DC416911B5B}" type="datetimeFigureOut">
               <a:rPr lang="en-US" smtClean="0"/>
-              <a:t>4/1/13</a:t>
+              <a:t>4/2/13</a:t>
             </a:fld>
             <a:endParaRPr lang="en-US"/>
           </a:p>
@@ -1416,7 +1416,7 @@
           <a:p>
             <a:fld id="{6B35E7C1-0930-394A-BB48-132AAC6FC298}" type="datetimeFigureOut">
               <a:rPr lang="en-US" smtClean="0"/>
-              <a:t>4/1/13</a:t>
+              <a:t>4/2/13</a:t>
             </a:fld>
             <a:endParaRPr lang="en-US"/>
           </a:p>
@@ -1586,7 +1586,7 @@
           <a:p>
             <a:fld id="{6B35E7C1-0930-394A-BB48-132AAC6FC298}" type="datetimeFigureOut">
               <a:rPr lang="en-US" smtClean="0"/>
-              <a:t>4/1/13</a:t>
+              <a:t>4/2/13</a:t>
             </a:fld>
             <a:endParaRPr lang="en-US"/>
           </a:p>
@@ -1766,7 +1766,7 @@
           <a:p>
             <a:fld id="{6B35E7C1-0930-394A-BB48-132AAC6FC298}" type="datetimeFigureOut">
               <a:rPr lang="en-US" smtClean="0"/>
-              <a:t>4/1/13</a:t>
+              <a:t>4/2/13</a:t>
             </a:fld>
             <a:endParaRPr lang="en-US"/>
           </a:p>
@@ -1936,7 +1936,7 @@
           <a:p>
             <a:fld id="{6B35E7C1-0930-394A-BB48-132AAC6FC298}" type="datetimeFigureOut">
               <a:rPr lang="en-US" smtClean="0"/>
-              <a:t>4/1/13</a:t>
+              <a:t>4/2/13</a:t>
             </a:fld>
             <a:endParaRPr lang="en-US"/>
           </a:p>
@@ -2182,7 +2182,7 @@
           <a:p>
             <a:fld id="{6B35E7C1-0930-394A-BB48-132AAC6FC298}" type="datetimeFigureOut">
               <a:rPr lang="en-US" smtClean="0"/>
-              <a:t>4/1/13</a:t>
+              <a:t>4/2/13</a:t>
             </a:fld>
             <a:endParaRPr lang="en-US"/>
           </a:p>
@@ -2470,7 +2470,7 @@
           <a:p>
             <a:fld id="{6B35E7C1-0930-394A-BB48-132AAC6FC298}" type="datetimeFigureOut">
               <a:rPr lang="en-US" smtClean="0"/>
-              <a:t>4/1/13</a:t>
+              <a:t>4/2/13</a:t>
             </a:fld>
             <a:endParaRPr lang="en-US"/>
           </a:p>
@@ -2892,7 +2892,7 @@
           <a:p>
             <a:fld id="{6B35E7C1-0930-394A-BB48-132AAC6FC298}" type="datetimeFigureOut">
               <a:rPr lang="en-US" smtClean="0"/>
-              <a:t>4/1/13</a:t>
+              <a:t>4/2/13</a:t>
             </a:fld>
             <a:endParaRPr lang="en-US"/>
           </a:p>
@@ -3010,7 +3010,7 @@
           <a:p>
             <a:fld id="{6B35E7C1-0930-394A-BB48-132AAC6FC298}" type="datetimeFigureOut">
               <a:rPr lang="en-US" smtClean="0"/>
-              <a:t>4/1/13</a:t>
+              <a:t>4/2/13</a:t>
             </a:fld>
             <a:endParaRPr lang="en-US"/>
           </a:p>
@@ -3105,7 +3105,7 @@
           <a:p>
             <a:fld id="{6B35E7C1-0930-394A-BB48-132AAC6FC298}" type="datetimeFigureOut">
               <a:rPr lang="en-US" smtClean="0"/>
-              <a:t>4/1/13</a:t>
+              <a:t>4/2/13</a:t>
             </a:fld>
             <a:endParaRPr lang="en-US"/>
           </a:p>
@@ -3382,7 +3382,7 @@
           <a:p>
             <a:fld id="{6B35E7C1-0930-394A-BB48-132AAC6FC298}" type="datetimeFigureOut">
               <a:rPr lang="en-US" smtClean="0"/>
-              <a:t>4/1/13</a:t>
+              <a:t>4/2/13</a:t>
             </a:fld>
             <a:endParaRPr lang="en-US"/>
           </a:p>
@@ -3639,7 +3639,7 @@
           <a:p>
             <a:fld id="{6B35E7C1-0930-394A-BB48-132AAC6FC298}" type="datetimeFigureOut">
               <a:rPr lang="en-US" smtClean="0"/>
-              <a:t>4/1/13</a:t>
+              <a:t>4/2/13</a:t>
             </a:fld>
             <a:endParaRPr lang="en-US"/>
           </a:p>
@@ -3858,7 +3858,7 @@
           <a:p>
             <a:fld id="{6B35E7C1-0930-394A-BB48-132AAC6FC298}" type="datetimeFigureOut">
               <a:rPr lang="en-US" smtClean="0"/>
-              <a:t>4/1/13</a:t>
+              <a:t>4/2/13</a:t>
             </a:fld>
             <a:endParaRPr lang="en-US"/>
           </a:p>
@@ -4987,57 +4987,18 @@
                 <a:latin typeface="Segoe Light"/>
                 <a:cs typeface="Segoe Light"/>
               </a:rPr>
-              <a:t>King, </a:t>
-            </a:r>
+              <a:t>King, T-King methods for arbitrary two hosts (DNS recursive query)</a:t>
+            </a:r>
+          </a:p>
+          <a:p>
+            <a:pPr lvl="1"/>
             <a:r>
               <a:rPr lang="en-US" sz="2000" dirty="0" smtClean="0">
                 <a:latin typeface="Segoe Light"/>
                 <a:cs typeface="Segoe Light"/>
               </a:rPr>
-              <a:t>T-King </a:t>
-            </a:r>
-            <a:r>
-              <a:rPr lang="en-US" sz="2000" dirty="0" smtClean="0">
-                <a:latin typeface="Segoe Light"/>
-                <a:cs typeface="Segoe Light"/>
-              </a:rPr>
-              <a:t>methods for arbitrary two hosts </a:t>
-            </a:r>
-            <a:r>
-              <a:rPr lang="en-US" sz="2000" dirty="0" smtClean="0">
-                <a:latin typeface="Segoe Light"/>
-                <a:cs typeface="Segoe Light"/>
-              </a:rPr>
-              <a:t>(DNS </a:t>
-            </a:r>
-            <a:r>
-              <a:rPr lang="en-US" sz="2000" dirty="0" smtClean="0">
-                <a:latin typeface="Segoe Light"/>
-                <a:cs typeface="Segoe Light"/>
-              </a:rPr>
-              <a:t>recursive query)</a:t>
-            </a:r>
-          </a:p>
-          <a:p>
-            <a:pPr lvl="1"/>
-            <a:r>
-              <a:rPr lang="en-US" sz="2000" dirty="0" smtClean="0">
-                <a:latin typeface="Segoe Light"/>
-                <a:cs typeface="Segoe Light"/>
-              </a:rPr>
-              <a:t>Vern’s work on end-to-end </a:t>
-            </a:r>
-            <a:r>
-              <a:rPr lang="en-US" sz="2000" dirty="0" smtClean="0">
-                <a:latin typeface="Segoe Light"/>
-                <a:cs typeface="Segoe Light"/>
-              </a:rPr>
-              <a:t>dynamics (~1995)</a:t>
-            </a:r>
-            <a:endParaRPr lang="en-US" sz="2000" dirty="0" smtClean="0">
-              <a:latin typeface="Segoe Light"/>
-              <a:cs typeface="Segoe Light"/>
-            </a:endParaRPr>
+              <a:t>Vern’s work on end-to-end dynamics (~1995)</a:t>
+            </a:r>
           </a:p>
           <a:p>
             <a:pPr lvl="1"/>
@@ -7777,1504 +7738,1577 @@
           </a:p>
         </p:txBody>
       </p:sp>
-      <p:sp>
-        <p:nvSpPr>
-          <p:cNvPr id="5" name="TextBox 4"/>
-          <p:cNvSpPr txBox="1"/>
+      <p:grpSp>
+        <p:nvGrpSpPr>
+          <p:cNvPr id="8" name="Group 7"/>
+          <p:cNvGrpSpPr/>
           <p:nvPr/>
-        </p:nvSpPr>
+        </p:nvGrpSpPr>
+        <p:grpSpPr>
+          <a:xfrm>
+            <a:off x="5069429" y="152083"/>
+            <a:ext cx="4372091" cy="6560479"/>
+            <a:chOff x="5069429" y="152083"/>
+            <a:chExt cx="4372091" cy="6560479"/>
+          </a:xfrm>
+        </p:grpSpPr>
+        <p:sp>
+          <p:nvSpPr>
+            <p:cNvPr id="5" name="TextBox 4"/>
+            <p:cNvSpPr txBox="1"/>
+            <p:nvPr/>
+          </p:nvSpPr>
+          <p:spPr>
+            <a:xfrm>
+              <a:off x="6422789" y="618676"/>
+              <a:ext cx="184666" cy="369332"/>
+            </a:xfrm>
+            <a:prstGeom prst="rect">
+              <a:avLst/>
+            </a:prstGeom>
+            <a:noFill/>
+          </p:spPr>
+          <p:txBody>
+            <a:bodyPr wrap="none" rtlCol="0">
+              <a:spAutoFit/>
+            </a:bodyPr>
+            <a:lstStyle/>
+            <a:p>
+              <a:endParaRPr lang="en-US" dirty="0"/>
+            </a:p>
+          </p:txBody>
+        </p:sp>
+        <p:sp>
+          <p:nvSpPr>
+            <p:cNvPr id="6" name="Rectangle 5"/>
+            <p:cNvSpPr/>
+            <p:nvPr/>
+          </p:nvSpPr>
+          <p:spPr>
+            <a:xfrm>
+              <a:off x="5069430" y="152083"/>
+              <a:ext cx="2827922" cy="384246"/>
+            </a:xfrm>
+            <a:prstGeom prst="rect">
+              <a:avLst/>
+            </a:prstGeom>
+            <a:solidFill>
+              <a:schemeClr val="bg1">
+                <a:lumMod val="65000"/>
+                <a:lumOff val="35000"/>
+              </a:schemeClr>
+            </a:solidFill>
+            <a:ln>
+              <a:noFill/>
+            </a:ln>
+          </p:spPr>
+          <p:style>
+            <a:lnRef idx="1">
+              <a:schemeClr val="accent1"/>
+            </a:lnRef>
+            <a:fillRef idx="3">
+              <a:schemeClr val="accent1"/>
+            </a:fillRef>
+            <a:effectRef idx="2">
+              <a:schemeClr val="accent1"/>
+            </a:effectRef>
+            <a:fontRef idx="minor">
+              <a:schemeClr val="lt1"/>
+            </a:fontRef>
+          </p:style>
+          <p:txBody>
+            <a:bodyPr rtlCol="0" anchor="ctr"/>
+            <a:lstStyle/>
+            <a:p>
+              <a:pPr algn="ctr"/>
+              <a:r>
+                <a:rPr lang="en-US" dirty="0">
+                  <a:latin typeface="Segoe Light"/>
+                  <a:cs typeface="Segoe Light"/>
+                </a:rPr>
+                <a:t>[AS0] </a:t>
+              </a:r>
+              <a:r>
+                <a:rPr lang="en-US" dirty="0" smtClean="0">
+                  <a:latin typeface="Segoe Light"/>
+                  <a:cs typeface="Segoe Light"/>
+                </a:rPr>
+                <a:t>172.20.10.1</a:t>
+              </a:r>
+              <a:endParaRPr lang="en-US" dirty="0">
+                <a:latin typeface="Segoe Light"/>
+                <a:cs typeface="Segoe Light"/>
+              </a:endParaRPr>
+            </a:p>
+          </p:txBody>
+        </p:sp>
+        <p:sp>
+          <p:nvSpPr>
+            <p:cNvPr id="28" name="Rectangle 27"/>
+            <p:cNvSpPr/>
+            <p:nvPr/>
+          </p:nvSpPr>
+          <p:spPr>
+            <a:xfrm>
+              <a:off x="5069429" y="1024641"/>
+              <a:ext cx="2827923" cy="384246"/>
+            </a:xfrm>
+            <a:prstGeom prst="rect">
+              <a:avLst/>
+            </a:prstGeom>
+            <a:solidFill>
+              <a:schemeClr val="bg1">
+                <a:lumMod val="65000"/>
+                <a:lumOff val="35000"/>
+              </a:schemeClr>
+            </a:solidFill>
+            <a:ln>
+              <a:noFill/>
+            </a:ln>
+          </p:spPr>
+          <p:style>
+            <a:lnRef idx="1">
+              <a:schemeClr val="accent1"/>
+            </a:lnRef>
+            <a:fillRef idx="3">
+              <a:schemeClr val="accent1"/>
+            </a:fillRef>
+            <a:effectRef idx="2">
+              <a:schemeClr val="accent1"/>
+            </a:effectRef>
+            <a:fontRef idx="minor">
+              <a:schemeClr val="lt1"/>
+            </a:fontRef>
+          </p:style>
+          <p:txBody>
+            <a:bodyPr rtlCol="0" anchor="ctr"/>
+            <a:lstStyle/>
+            <a:p>
+              <a:pPr algn="ctr"/>
+              <a:r>
+                <a:rPr lang="en-US" dirty="0" smtClean="0">
+                  <a:latin typeface="Segoe Light"/>
+                  <a:cs typeface="Segoe Light"/>
+                </a:rPr>
+                <a:t>[AS16509] 172.26.241.133</a:t>
+              </a:r>
+              <a:endParaRPr lang="en-US" dirty="0">
+                <a:latin typeface="Segoe Light"/>
+                <a:cs typeface="Segoe Light"/>
+              </a:endParaRPr>
+            </a:p>
+          </p:txBody>
+        </p:sp>
+        <p:sp>
+          <p:nvSpPr>
+            <p:cNvPr id="29" name="Rectangle 28"/>
+            <p:cNvSpPr/>
+            <p:nvPr/>
+          </p:nvSpPr>
+          <p:spPr>
+            <a:xfrm>
+              <a:off x="5069430" y="584944"/>
+              <a:ext cx="2827922" cy="384246"/>
+            </a:xfrm>
+            <a:prstGeom prst="rect">
+              <a:avLst/>
+            </a:prstGeom>
+            <a:solidFill>
+              <a:schemeClr val="bg1">
+                <a:lumMod val="65000"/>
+                <a:lumOff val="35000"/>
+              </a:schemeClr>
+            </a:solidFill>
+            <a:ln>
+              <a:noFill/>
+            </a:ln>
+          </p:spPr>
+          <p:style>
+            <a:lnRef idx="1">
+              <a:schemeClr val="accent1"/>
+            </a:lnRef>
+            <a:fillRef idx="3">
+              <a:schemeClr val="accent1"/>
+            </a:fillRef>
+            <a:effectRef idx="2">
+              <a:schemeClr val="accent1"/>
+            </a:effectRef>
+            <a:fontRef idx="minor">
+              <a:schemeClr val="lt1"/>
+            </a:fontRef>
+          </p:style>
+          <p:txBody>
+            <a:bodyPr rtlCol="0" anchor="ctr"/>
+            <a:lstStyle/>
+            <a:p>
+              <a:pPr algn="ctr"/>
+              <a:r>
+                <a:rPr lang="en-US" dirty="0" smtClean="0">
+                  <a:latin typeface="Segoe Light"/>
+                  <a:cs typeface="Segoe Light"/>
+                </a:rPr>
+                <a:t>[AS16509] 172.26.236.2</a:t>
+              </a:r>
+              <a:endParaRPr lang="en-US" dirty="0">
+                <a:latin typeface="Segoe Light"/>
+                <a:cs typeface="Segoe Light"/>
+              </a:endParaRPr>
+            </a:p>
+          </p:txBody>
+        </p:sp>
+        <p:sp>
+          <p:nvSpPr>
+            <p:cNvPr id="30" name="Rectangle 29"/>
+            <p:cNvSpPr/>
+            <p:nvPr/>
+          </p:nvSpPr>
+          <p:spPr>
+            <a:xfrm>
+              <a:off x="5069430" y="1462745"/>
+              <a:ext cx="2827923" cy="868599"/>
+            </a:xfrm>
+            <a:prstGeom prst="rect">
+              <a:avLst/>
+            </a:prstGeom>
+            <a:solidFill>
+              <a:schemeClr val="bg1">
+                <a:lumMod val="65000"/>
+                <a:lumOff val="35000"/>
+              </a:schemeClr>
+            </a:solidFill>
+            <a:ln>
+              <a:noFill/>
+            </a:ln>
+          </p:spPr>
+          <p:style>
+            <a:lnRef idx="1">
+              <a:schemeClr val="accent1"/>
+            </a:lnRef>
+            <a:fillRef idx="3">
+              <a:schemeClr val="accent1"/>
+            </a:fillRef>
+            <a:effectRef idx="2">
+              <a:schemeClr val="accent1"/>
+            </a:effectRef>
+            <a:fontRef idx="minor">
+              <a:schemeClr val="lt1"/>
+            </a:fontRef>
+          </p:style>
+          <p:txBody>
+            <a:bodyPr rtlCol="0" anchor="ctr"/>
+            <a:lstStyle/>
+            <a:p>
+              <a:pPr algn="ctr"/>
+              <a:r>
+                <a:rPr lang="en-US" dirty="0" smtClean="0">
+                  <a:latin typeface="Segoe Light"/>
+                  <a:cs typeface="Segoe Light"/>
+                </a:rPr>
+                <a:t>[AS0] 172.26.96.10/172.26.96.11</a:t>
+              </a:r>
+            </a:p>
+            <a:p>
+              <a:pPr algn="ctr"/>
+              <a:r>
+                <a:rPr lang="en-US" dirty="0">
+                  <a:latin typeface="Segoe Light"/>
+                  <a:cs typeface="Segoe Light"/>
+                </a:rPr>
+                <a:t>172.26.96.3/</a:t>
+              </a:r>
+              <a:r>
+                <a:rPr lang="en-US" dirty="0" smtClean="0">
+                  <a:latin typeface="Segoe Light"/>
+                  <a:cs typeface="Segoe Light"/>
+                </a:rPr>
+                <a:t>172.26.96.2</a:t>
+              </a:r>
+              <a:endParaRPr lang="en-US" dirty="0">
+                <a:latin typeface="Segoe Light"/>
+                <a:cs typeface="Segoe Light"/>
+              </a:endParaRPr>
+            </a:p>
+          </p:txBody>
+        </p:sp>
+        <p:sp>
+          <p:nvSpPr>
+            <p:cNvPr id="32" name="Rectangle 31"/>
+            <p:cNvSpPr/>
+            <p:nvPr/>
+          </p:nvSpPr>
+          <p:spPr>
+            <a:xfrm>
+              <a:off x="5069429" y="2389112"/>
+              <a:ext cx="2827923" cy="384246"/>
+            </a:xfrm>
+            <a:prstGeom prst="rect">
+              <a:avLst/>
+            </a:prstGeom>
+            <a:solidFill>
+              <a:schemeClr val="bg1">
+                <a:lumMod val="65000"/>
+                <a:lumOff val="35000"/>
+              </a:schemeClr>
+            </a:solidFill>
+            <a:ln>
+              <a:noFill/>
+            </a:ln>
+          </p:spPr>
+          <p:style>
+            <a:lnRef idx="1">
+              <a:schemeClr val="accent1"/>
+            </a:lnRef>
+            <a:fillRef idx="3">
+              <a:schemeClr val="accent1"/>
+            </a:fillRef>
+            <a:effectRef idx="2">
+              <a:schemeClr val="accent1"/>
+            </a:effectRef>
+            <a:fontRef idx="minor">
+              <a:schemeClr val="lt1"/>
+            </a:fontRef>
+          </p:style>
+          <p:txBody>
+            <a:bodyPr rtlCol="0" anchor="ctr"/>
+            <a:lstStyle/>
+            <a:p>
+              <a:pPr algn="ctr"/>
+              <a:r>
+                <a:rPr lang="en-US" dirty="0" smtClean="0">
+                  <a:latin typeface="Segoe Light"/>
+                  <a:cs typeface="Segoe Light"/>
+                </a:rPr>
+                <a:t>[AS0] 172.26.96.193</a:t>
+              </a:r>
+              <a:endParaRPr lang="en-US" dirty="0">
+                <a:latin typeface="Segoe Light"/>
+                <a:cs typeface="Segoe Light"/>
+              </a:endParaRPr>
+            </a:p>
+          </p:txBody>
+        </p:sp>
+        <p:sp>
+          <p:nvSpPr>
+            <p:cNvPr id="33" name="Rectangle 32"/>
+            <p:cNvSpPr/>
+            <p:nvPr/>
+          </p:nvSpPr>
+          <p:spPr>
+            <a:xfrm>
+              <a:off x="5069430" y="2836355"/>
+              <a:ext cx="2827923" cy="384246"/>
+            </a:xfrm>
+            <a:prstGeom prst="rect">
+              <a:avLst/>
+            </a:prstGeom>
+            <a:solidFill>
+              <a:schemeClr val="bg1">
+                <a:lumMod val="65000"/>
+                <a:lumOff val="35000"/>
+              </a:schemeClr>
+            </a:solidFill>
+            <a:ln>
+              <a:noFill/>
+            </a:ln>
+          </p:spPr>
+          <p:style>
+            <a:lnRef idx="1">
+              <a:schemeClr val="accent1"/>
+            </a:lnRef>
+            <a:fillRef idx="3">
+              <a:schemeClr val="accent1"/>
+            </a:fillRef>
+            <a:effectRef idx="2">
+              <a:schemeClr val="accent1"/>
+            </a:effectRef>
+            <a:fontRef idx="minor">
+              <a:schemeClr val="lt1"/>
+            </a:fontRef>
+          </p:style>
+          <p:txBody>
+            <a:bodyPr rtlCol="0" anchor="ctr"/>
+            <a:lstStyle/>
+            <a:p>
+              <a:pPr algn="ctr"/>
+              <a:r>
+                <a:rPr lang="en-US" dirty="0" smtClean="0">
+                  <a:latin typeface="Segoe Light"/>
+                  <a:cs typeface="Segoe Light"/>
+                </a:rPr>
+                <a:t>[AS0] 172.16.121.113</a:t>
+              </a:r>
+              <a:endParaRPr lang="en-US" dirty="0">
+                <a:latin typeface="Segoe Light"/>
+                <a:cs typeface="Segoe Light"/>
+              </a:endParaRPr>
+            </a:p>
+          </p:txBody>
+        </p:sp>
+        <p:sp>
+          <p:nvSpPr>
+            <p:cNvPr id="34" name="Rectangle 33"/>
+            <p:cNvSpPr/>
+            <p:nvPr/>
+          </p:nvSpPr>
+          <p:spPr>
+            <a:xfrm>
+              <a:off x="5069430" y="3286342"/>
+              <a:ext cx="2827923" cy="384246"/>
+            </a:xfrm>
+            <a:prstGeom prst="rect">
+              <a:avLst/>
+            </a:prstGeom>
+            <a:solidFill>
+              <a:schemeClr val="bg1">
+                <a:lumMod val="65000"/>
+                <a:lumOff val="35000"/>
+              </a:schemeClr>
+            </a:solidFill>
+            <a:ln>
+              <a:noFill/>
+            </a:ln>
+          </p:spPr>
+          <p:style>
+            <a:lnRef idx="1">
+              <a:schemeClr val="accent1"/>
+            </a:lnRef>
+            <a:fillRef idx="3">
+              <a:schemeClr val="accent1"/>
+            </a:fillRef>
+            <a:effectRef idx="2">
+              <a:schemeClr val="accent1"/>
+            </a:effectRef>
+            <a:fontRef idx="minor">
+              <a:schemeClr val="lt1"/>
+            </a:fontRef>
+          </p:style>
+          <p:txBody>
+            <a:bodyPr rtlCol="0" anchor="ctr"/>
+            <a:lstStyle/>
+            <a:p>
+              <a:pPr algn="ctr"/>
+              <a:r>
+                <a:rPr lang="en-US" dirty="0" smtClean="0">
+                  <a:latin typeface="Segoe Light"/>
+                  <a:cs typeface="Segoe Light"/>
+                </a:rPr>
+                <a:t>[AS7018] 12.249.2.49</a:t>
+              </a:r>
+              <a:endParaRPr lang="en-US" dirty="0">
+                <a:latin typeface="Segoe Light"/>
+                <a:cs typeface="Segoe Light"/>
+              </a:endParaRPr>
+            </a:p>
+          </p:txBody>
+        </p:sp>
+        <p:sp>
+          <p:nvSpPr>
+            <p:cNvPr id="35" name="Rectangle 34"/>
+            <p:cNvSpPr/>
+            <p:nvPr/>
+          </p:nvSpPr>
+          <p:spPr>
+            <a:xfrm>
+              <a:off x="5069430" y="3735576"/>
+              <a:ext cx="2827923" cy="384246"/>
+            </a:xfrm>
+            <a:prstGeom prst="rect">
+              <a:avLst/>
+            </a:prstGeom>
+            <a:solidFill>
+              <a:schemeClr val="bg1">
+                <a:lumMod val="65000"/>
+                <a:lumOff val="35000"/>
+              </a:schemeClr>
+            </a:solidFill>
+            <a:ln>
+              <a:noFill/>
+            </a:ln>
+          </p:spPr>
+          <p:style>
+            <a:lnRef idx="1">
+              <a:schemeClr val="accent1"/>
+            </a:lnRef>
+            <a:fillRef idx="3">
+              <a:schemeClr val="accent1"/>
+            </a:fillRef>
+            <a:effectRef idx="2">
+              <a:schemeClr val="accent1"/>
+            </a:effectRef>
+            <a:fontRef idx="minor">
+              <a:schemeClr val="lt1"/>
+            </a:fontRef>
+          </p:style>
+          <p:txBody>
+            <a:bodyPr rtlCol="0" anchor="ctr"/>
+            <a:lstStyle/>
+            <a:p>
+              <a:pPr algn="ctr"/>
+              <a:r>
+                <a:rPr lang="en-US" dirty="0">
+                  <a:latin typeface="Segoe Light"/>
+                  <a:cs typeface="Segoe Light"/>
+                </a:rPr>
+                <a:t>[AS7018] </a:t>
+              </a:r>
+              <a:r>
+                <a:rPr lang="en-US" dirty="0" smtClean="0">
+                  <a:latin typeface="Segoe Light"/>
+                  <a:cs typeface="Segoe Light"/>
+                </a:rPr>
+                <a:t>12.83.180.82</a:t>
+              </a:r>
+              <a:endParaRPr lang="en-US" dirty="0">
+                <a:latin typeface="Segoe Light"/>
+                <a:cs typeface="Segoe Light"/>
+              </a:endParaRPr>
+            </a:p>
+          </p:txBody>
+        </p:sp>
+        <p:sp>
+          <p:nvSpPr>
+            <p:cNvPr id="36" name="Rectangle 35"/>
+            <p:cNvSpPr/>
+            <p:nvPr/>
+          </p:nvSpPr>
+          <p:spPr>
+            <a:xfrm>
+              <a:off x="5069429" y="4169976"/>
+              <a:ext cx="2827923" cy="850358"/>
+            </a:xfrm>
+            <a:prstGeom prst="rect">
+              <a:avLst/>
+            </a:prstGeom>
+            <a:solidFill>
+              <a:schemeClr val="bg1">
+                <a:lumMod val="65000"/>
+                <a:lumOff val="35000"/>
+              </a:schemeClr>
+            </a:solidFill>
+            <a:ln>
+              <a:noFill/>
+            </a:ln>
+          </p:spPr>
+          <p:style>
+            <a:lnRef idx="1">
+              <a:schemeClr val="accent1"/>
+            </a:lnRef>
+            <a:fillRef idx="3">
+              <a:schemeClr val="accent1"/>
+            </a:fillRef>
+            <a:effectRef idx="2">
+              <a:schemeClr val="accent1"/>
+            </a:effectRef>
+            <a:fontRef idx="minor">
+              <a:schemeClr val="lt1"/>
+            </a:fontRef>
+          </p:style>
+          <p:txBody>
+            <a:bodyPr rtlCol="0" anchor="ctr"/>
+            <a:lstStyle/>
+            <a:p>
+              <a:pPr algn="ctr"/>
+              <a:r>
+                <a:rPr lang="en-US" dirty="0">
+                  <a:latin typeface="Segoe Light"/>
+                  <a:cs typeface="Segoe Light"/>
+                </a:rPr>
+                <a:t>[AS7018</a:t>
+              </a:r>
+              <a:r>
+                <a:rPr lang="en-US" dirty="0" smtClean="0">
+                  <a:latin typeface="Segoe Light"/>
+                  <a:cs typeface="Segoe Light"/>
+                </a:rPr>
+                <a:t>]</a:t>
+              </a:r>
+            </a:p>
+            <a:p>
+              <a:pPr algn="ctr"/>
+              <a:r>
+                <a:rPr lang="en-US" dirty="0">
+                  <a:latin typeface="Segoe Light"/>
+                  <a:cs typeface="Segoe Light"/>
+                </a:rPr>
+                <a:t>12.122.200.9/12.122.114.5</a:t>
+              </a:r>
+              <a:endParaRPr lang="en-US" dirty="0" smtClean="0">
+                <a:latin typeface="Segoe Light"/>
+                <a:cs typeface="Segoe Light"/>
+              </a:endParaRPr>
+            </a:p>
+            <a:p>
+              <a:pPr algn="ctr"/>
+              <a:r>
+                <a:rPr lang="en-US" dirty="0" smtClean="0">
+                  <a:latin typeface="Segoe Light"/>
+                  <a:cs typeface="Segoe Light"/>
+                </a:rPr>
+                <a:t>12.122.1.118/12.122.8.79…</a:t>
+              </a:r>
+              <a:endParaRPr lang="en-US" dirty="0">
+                <a:latin typeface="Segoe Light"/>
+                <a:cs typeface="Segoe Light"/>
+              </a:endParaRPr>
+            </a:p>
+          </p:txBody>
+        </p:sp>
+        <p:sp>
+          <p:nvSpPr>
+            <p:cNvPr id="37" name="Rectangle 36"/>
+            <p:cNvSpPr/>
+            <p:nvPr/>
+          </p:nvSpPr>
+          <p:spPr>
+            <a:xfrm>
+              <a:off x="5069430" y="5077542"/>
+              <a:ext cx="2827923" cy="1158303"/>
+            </a:xfrm>
+            <a:prstGeom prst="rect">
+              <a:avLst/>
+            </a:prstGeom>
+            <a:solidFill>
+              <a:schemeClr val="bg1">
+                <a:lumMod val="65000"/>
+                <a:lumOff val="35000"/>
+              </a:schemeClr>
+            </a:solidFill>
+            <a:ln>
+              <a:noFill/>
+            </a:ln>
+          </p:spPr>
+          <p:style>
+            <a:lnRef idx="1">
+              <a:schemeClr val="accent1"/>
+            </a:lnRef>
+            <a:fillRef idx="3">
+              <a:schemeClr val="accent1"/>
+            </a:fillRef>
+            <a:effectRef idx="2">
+              <a:schemeClr val="accent1"/>
+            </a:effectRef>
+            <a:fontRef idx="minor">
+              <a:schemeClr val="lt1"/>
+            </a:fontRef>
+          </p:style>
+          <p:txBody>
+            <a:bodyPr rtlCol="0" anchor="ctr"/>
+            <a:lstStyle/>
+            <a:p>
+              <a:pPr algn="ctr"/>
+              <a:r>
+                <a:rPr lang="en-US" dirty="0">
+                  <a:latin typeface="Segoe Light"/>
+                  <a:cs typeface="Segoe Light"/>
+                </a:rPr>
+                <a:t>[AS7018</a:t>
+              </a:r>
+              <a:r>
+                <a:rPr lang="en-US" dirty="0" smtClean="0">
+                  <a:latin typeface="Segoe Light"/>
+                  <a:cs typeface="Segoe Light"/>
+                </a:rPr>
+                <a:t>]</a:t>
+              </a:r>
+            </a:p>
+            <a:p>
+              <a:pPr algn="ctr"/>
+              <a:r>
+                <a:rPr lang="en-US" dirty="0">
+                  <a:latin typeface="Segoe Light"/>
+                  <a:cs typeface="Segoe Light"/>
+                </a:rPr>
+                <a:t>12.122.114.21/</a:t>
+              </a:r>
+              <a:r>
+                <a:rPr lang="en-US" dirty="0" smtClean="0">
+                  <a:latin typeface="Segoe Light"/>
+                  <a:cs typeface="Segoe Light"/>
+                </a:rPr>
+                <a:t>12.123.30.5 </a:t>
+              </a:r>
+              <a:endParaRPr lang="en-US" dirty="0">
+                <a:latin typeface="Segoe Light"/>
+                <a:cs typeface="Segoe Light"/>
+              </a:endParaRPr>
+            </a:p>
+            <a:p>
+              <a:pPr algn="ctr"/>
+              <a:r>
+                <a:rPr lang="en-US" dirty="0" smtClean="0">
+                  <a:latin typeface="Segoe Light"/>
+                  <a:cs typeface="Segoe Light"/>
+                </a:rPr>
+                <a:t>[AS0]</a:t>
+              </a:r>
+            </a:p>
+            <a:p>
+              <a:pPr algn="ctr"/>
+              <a:r>
+                <a:rPr lang="en-US" dirty="0" smtClean="0">
+                  <a:latin typeface="Segoe Light"/>
+                  <a:cs typeface="Segoe Light"/>
+                </a:rPr>
+                <a:t>192.205.33.46/…</a:t>
+              </a:r>
+              <a:endParaRPr lang="en-US" dirty="0">
+                <a:latin typeface="Segoe Light"/>
+                <a:cs typeface="Segoe Light"/>
+              </a:endParaRPr>
+            </a:p>
+          </p:txBody>
+        </p:sp>
+        <p:sp>
+          <p:nvSpPr>
+            <p:cNvPr id="43" name="TextBox 42"/>
+            <p:cNvSpPr txBox="1"/>
+            <p:nvPr/>
+          </p:nvSpPr>
+          <p:spPr>
+            <a:xfrm>
+              <a:off x="9373334" y="618676"/>
+              <a:ext cx="68186" cy="369332"/>
+            </a:xfrm>
+            <a:prstGeom prst="rect">
+              <a:avLst/>
+            </a:prstGeom>
+            <a:noFill/>
+          </p:spPr>
+          <p:txBody>
+            <a:bodyPr wrap="square" rtlCol="0">
+              <a:spAutoFit/>
+            </a:bodyPr>
+            <a:lstStyle/>
+            <a:p>
+              <a:endParaRPr lang="en-US" dirty="0"/>
+            </a:p>
+          </p:txBody>
+        </p:sp>
+        <p:sp>
+          <p:nvSpPr>
+            <p:cNvPr id="44" name="Rectangle 43"/>
+            <p:cNvSpPr/>
+            <p:nvPr/>
+          </p:nvSpPr>
+          <p:spPr>
+            <a:xfrm>
+              <a:off x="8019974" y="152083"/>
+              <a:ext cx="1044185" cy="384246"/>
+            </a:xfrm>
+            <a:prstGeom prst="rect">
+              <a:avLst/>
+            </a:prstGeom>
+            <a:solidFill>
+              <a:schemeClr val="bg1">
+                <a:lumMod val="65000"/>
+                <a:lumOff val="35000"/>
+              </a:schemeClr>
+            </a:solidFill>
+            <a:ln>
+              <a:noFill/>
+            </a:ln>
+          </p:spPr>
+          <p:style>
+            <a:lnRef idx="1">
+              <a:schemeClr val="accent1"/>
+            </a:lnRef>
+            <a:fillRef idx="3">
+              <a:schemeClr val="accent1"/>
+            </a:fillRef>
+            <a:effectRef idx="2">
+              <a:schemeClr val="accent1"/>
+            </a:effectRef>
+            <a:fontRef idx="minor">
+              <a:schemeClr val="lt1"/>
+            </a:fontRef>
+          </p:style>
+          <p:txBody>
+            <a:bodyPr rtlCol="0" anchor="ctr"/>
+            <a:lstStyle/>
+            <a:p>
+              <a:pPr algn="ctr"/>
+              <a:r>
+                <a:rPr lang="en-US" dirty="0" smtClean="0">
+                  <a:latin typeface="Segoe Light"/>
+                  <a:cs typeface="Segoe Light"/>
+                </a:rPr>
+                <a:t>~0.7 </a:t>
+              </a:r>
+              <a:r>
+                <a:rPr lang="en-US" dirty="0" err="1" smtClean="0">
+                  <a:latin typeface="Segoe Light"/>
+                  <a:cs typeface="Segoe Light"/>
+                </a:rPr>
+                <a:t>ms</a:t>
+              </a:r>
+              <a:endParaRPr lang="en-US" dirty="0">
+                <a:latin typeface="Segoe Light"/>
+                <a:cs typeface="Segoe Light"/>
+              </a:endParaRPr>
+            </a:p>
+          </p:txBody>
+        </p:sp>
+        <p:sp>
+          <p:nvSpPr>
+            <p:cNvPr id="45" name="Rectangle 44"/>
+            <p:cNvSpPr/>
+            <p:nvPr/>
+          </p:nvSpPr>
+          <p:spPr>
+            <a:xfrm>
+              <a:off x="8019974" y="1024641"/>
+              <a:ext cx="1044186" cy="384246"/>
+            </a:xfrm>
+            <a:prstGeom prst="rect">
+              <a:avLst/>
+            </a:prstGeom>
+            <a:solidFill>
+              <a:schemeClr val="bg1">
+                <a:lumMod val="65000"/>
+                <a:lumOff val="35000"/>
+              </a:schemeClr>
+            </a:solidFill>
+            <a:ln>
+              <a:noFill/>
+            </a:ln>
+          </p:spPr>
+          <p:style>
+            <a:lnRef idx="1">
+              <a:schemeClr val="accent1"/>
+            </a:lnRef>
+            <a:fillRef idx="3">
+              <a:schemeClr val="accent1"/>
+            </a:fillRef>
+            <a:effectRef idx="2">
+              <a:schemeClr val="accent1"/>
+            </a:effectRef>
+            <a:fontRef idx="minor">
+              <a:schemeClr val="lt1"/>
+            </a:fontRef>
+          </p:style>
+          <p:txBody>
+            <a:bodyPr rtlCol="0" anchor="ctr"/>
+            <a:lstStyle/>
+            <a:p>
+              <a:pPr algn="ctr"/>
+              <a:r>
+                <a:rPr lang="en-US" dirty="0" smtClean="0">
+                  <a:latin typeface="Segoe Light"/>
+                  <a:cs typeface="Segoe Light"/>
+                </a:rPr>
+                <a:t>~</a:t>
+              </a:r>
+              <a:r>
+                <a:rPr lang="en-US" dirty="0" smtClean="0">
+                  <a:latin typeface="Segoe Light"/>
+                  <a:cs typeface="Segoe Light"/>
+                </a:rPr>
+                <a:t>35 </a:t>
+              </a:r>
+              <a:r>
+                <a:rPr lang="en-US" dirty="0" err="1" smtClean="0">
+                  <a:latin typeface="Segoe Light"/>
+                  <a:cs typeface="Segoe Light"/>
+                </a:rPr>
+                <a:t>ms</a:t>
+              </a:r>
+              <a:endParaRPr lang="en-US" dirty="0">
+                <a:latin typeface="Segoe Light"/>
+                <a:cs typeface="Segoe Light"/>
+              </a:endParaRPr>
+            </a:p>
+          </p:txBody>
+        </p:sp>
+        <p:sp>
+          <p:nvSpPr>
+            <p:cNvPr id="46" name="Rectangle 45"/>
+            <p:cNvSpPr/>
+            <p:nvPr/>
+          </p:nvSpPr>
+          <p:spPr>
+            <a:xfrm>
+              <a:off x="8019974" y="584944"/>
+              <a:ext cx="1044185" cy="384246"/>
+            </a:xfrm>
+            <a:prstGeom prst="rect">
+              <a:avLst/>
+            </a:prstGeom>
+            <a:solidFill>
+              <a:schemeClr val="bg1">
+                <a:lumMod val="65000"/>
+                <a:lumOff val="35000"/>
+              </a:schemeClr>
+            </a:solidFill>
+            <a:ln>
+              <a:noFill/>
+            </a:ln>
+          </p:spPr>
+          <p:style>
+            <a:lnRef idx="1">
+              <a:schemeClr val="accent1"/>
+            </a:lnRef>
+            <a:fillRef idx="3">
+              <a:schemeClr val="accent1"/>
+            </a:fillRef>
+            <a:effectRef idx="2">
+              <a:schemeClr val="accent1"/>
+            </a:effectRef>
+            <a:fontRef idx="minor">
+              <a:schemeClr val="lt1"/>
+            </a:fontRef>
+          </p:style>
+          <p:txBody>
+            <a:bodyPr rtlCol="0" anchor="ctr"/>
+            <a:lstStyle/>
+            <a:p>
+              <a:pPr algn="ctr"/>
+              <a:r>
+                <a:rPr lang="en-US" dirty="0" smtClean="0">
+                  <a:latin typeface="Segoe Light"/>
+                  <a:cs typeface="Segoe Light"/>
+                </a:rPr>
+                <a:t>~</a:t>
+              </a:r>
+              <a:r>
+                <a:rPr lang="en-US" dirty="0" smtClean="0">
+                  <a:latin typeface="Segoe Light"/>
+                  <a:cs typeface="Segoe Light"/>
+                </a:rPr>
+                <a:t>35 </a:t>
+              </a:r>
+              <a:r>
+                <a:rPr lang="en-US" dirty="0" err="1" smtClean="0">
+                  <a:latin typeface="Segoe Light"/>
+                  <a:cs typeface="Segoe Light"/>
+                </a:rPr>
+                <a:t>ms</a:t>
+              </a:r>
+              <a:endParaRPr lang="en-US" dirty="0">
+                <a:latin typeface="Segoe Light"/>
+                <a:cs typeface="Segoe Light"/>
+              </a:endParaRPr>
+            </a:p>
+          </p:txBody>
+        </p:sp>
+        <p:sp>
+          <p:nvSpPr>
+            <p:cNvPr id="47" name="Rectangle 46"/>
+            <p:cNvSpPr/>
+            <p:nvPr/>
+          </p:nvSpPr>
+          <p:spPr>
+            <a:xfrm>
+              <a:off x="8019975" y="1462745"/>
+              <a:ext cx="1044186" cy="868599"/>
+            </a:xfrm>
+            <a:prstGeom prst="rect">
+              <a:avLst/>
+            </a:prstGeom>
+            <a:solidFill>
+              <a:schemeClr val="bg1">
+                <a:lumMod val="65000"/>
+                <a:lumOff val="35000"/>
+              </a:schemeClr>
+            </a:solidFill>
+            <a:ln>
+              <a:noFill/>
+            </a:ln>
+          </p:spPr>
+          <p:style>
+            <a:lnRef idx="1">
+              <a:schemeClr val="accent1"/>
+            </a:lnRef>
+            <a:fillRef idx="3">
+              <a:schemeClr val="accent1"/>
+            </a:fillRef>
+            <a:effectRef idx="2">
+              <a:schemeClr val="accent1"/>
+            </a:effectRef>
+            <a:fontRef idx="minor">
+              <a:schemeClr val="lt1"/>
+            </a:fontRef>
+          </p:style>
+          <p:txBody>
+            <a:bodyPr rtlCol="0" anchor="ctr"/>
+            <a:lstStyle/>
+            <a:p>
+              <a:pPr algn="ctr"/>
+              <a:r>
+                <a:rPr lang="en-US" dirty="0" smtClean="0">
+                  <a:latin typeface="Segoe Light"/>
+                  <a:cs typeface="Segoe Light"/>
+                </a:rPr>
+                <a:t>~</a:t>
+              </a:r>
+              <a:r>
+                <a:rPr lang="en-US" dirty="0" smtClean="0">
+                  <a:latin typeface="Segoe Light"/>
+                  <a:cs typeface="Segoe Light"/>
+                </a:rPr>
+                <a:t>35 </a:t>
+              </a:r>
+              <a:r>
+                <a:rPr lang="en-US" dirty="0" err="1" smtClean="0">
+                  <a:latin typeface="Segoe Light"/>
+                  <a:cs typeface="Segoe Light"/>
+                </a:rPr>
+                <a:t>ms</a:t>
+              </a:r>
+              <a:endParaRPr lang="en-US" dirty="0">
+                <a:latin typeface="Segoe Light"/>
+                <a:cs typeface="Segoe Light"/>
+              </a:endParaRPr>
+            </a:p>
+          </p:txBody>
+        </p:sp>
+        <p:sp>
+          <p:nvSpPr>
+            <p:cNvPr id="48" name="Rectangle 47"/>
+            <p:cNvSpPr/>
+            <p:nvPr/>
+          </p:nvSpPr>
+          <p:spPr>
+            <a:xfrm>
+              <a:off x="8019974" y="2389112"/>
+              <a:ext cx="1044186" cy="384246"/>
+            </a:xfrm>
+            <a:prstGeom prst="rect">
+              <a:avLst/>
+            </a:prstGeom>
+            <a:solidFill>
+              <a:schemeClr val="bg1">
+                <a:lumMod val="65000"/>
+                <a:lumOff val="35000"/>
+              </a:schemeClr>
+            </a:solidFill>
+            <a:ln>
+              <a:noFill/>
+            </a:ln>
+          </p:spPr>
+          <p:style>
+            <a:lnRef idx="1">
+              <a:schemeClr val="accent1"/>
+            </a:lnRef>
+            <a:fillRef idx="3">
+              <a:schemeClr val="accent1"/>
+            </a:fillRef>
+            <a:effectRef idx="2">
+              <a:schemeClr val="accent1"/>
+            </a:effectRef>
+            <a:fontRef idx="minor">
+              <a:schemeClr val="lt1"/>
+            </a:fontRef>
+          </p:style>
+          <p:txBody>
+            <a:bodyPr rtlCol="0" anchor="ctr"/>
+            <a:lstStyle/>
+            <a:p>
+              <a:pPr algn="ctr"/>
+              <a:r>
+                <a:rPr lang="en-US" dirty="0" smtClean="0">
+                  <a:latin typeface="Segoe Light"/>
+                  <a:cs typeface="Segoe Light"/>
+                </a:rPr>
+                <a:t>~</a:t>
+              </a:r>
+              <a:r>
+                <a:rPr lang="en-US" dirty="0" smtClean="0">
+                  <a:latin typeface="Segoe Light"/>
+                  <a:cs typeface="Segoe Light"/>
+                </a:rPr>
+                <a:t>35 </a:t>
+              </a:r>
+              <a:r>
+                <a:rPr lang="en-US" dirty="0" err="1" smtClean="0">
+                  <a:latin typeface="Segoe Light"/>
+                  <a:cs typeface="Segoe Light"/>
+                </a:rPr>
+                <a:t>ms</a:t>
+              </a:r>
+              <a:endParaRPr lang="en-US" dirty="0">
+                <a:latin typeface="Segoe Light"/>
+                <a:cs typeface="Segoe Light"/>
+              </a:endParaRPr>
+            </a:p>
+          </p:txBody>
+        </p:sp>
+        <p:sp>
+          <p:nvSpPr>
+            <p:cNvPr id="49" name="Rectangle 48"/>
+            <p:cNvSpPr/>
+            <p:nvPr/>
+          </p:nvSpPr>
+          <p:spPr>
+            <a:xfrm>
+              <a:off x="8019975" y="2836355"/>
+              <a:ext cx="1044186" cy="384246"/>
+            </a:xfrm>
+            <a:prstGeom prst="rect">
+              <a:avLst/>
+            </a:prstGeom>
+            <a:solidFill>
+              <a:schemeClr val="bg1">
+                <a:lumMod val="65000"/>
+                <a:lumOff val="35000"/>
+              </a:schemeClr>
+            </a:solidFill>
+            <a:ln>
+              <a:noFill/>
+            </a:ln>
+          </p:spPr>
+          <p:style>
+            <a:lnRef idx="1">
+              <a:schemeClr val="accent1"/>
+            </a:lnRef>
+            <a:fillRef idx="3">
+              <a:schemeClr val="accent1"/>
+            </a:fillRef>
+            <a:effectRef idx="2">
+              <a:schemeClr val="accent1"/>
+            </a:effectRef>
+            <a:fontRef idx="minor">
+              <a:schemeClr val="lt1"/>
+            </a:fontRef>
+          </p:style>
+          <p:txBody>
+            <a:bodyPr rtlCol="0" anchor="ctr"/>
+            <a:lstStyle/>
+            <a:p>
+              <a:pPr algn="ctr"/>
+              <a:r>
+                <a:rPr lang="en-US" dirty="0" smtClean="0">
+                  <a:latin typeface="Segoe Light"/>
+                  <a:cs typeface="Segoe Light"/>
+                </a:rPr>
+                <a:t>~50 </a:t>
+              </a:r>
+              <a:r>
+                <a:rPr lang="en-US" dirty="0" err="1" smtClean="0">
+                  <a:latin typeface="Segoe Light"/>
+                  <a:cs typeface="Segoe Light"/>
+                </a:rPr>
+                <a:t>ms</a:t>
+              </a:r>
+              <a:endParaRPr lang="en-US" dirty="0">
+                <a:latin typeface="Segoe Light"/>
+                <a:cs typeface="Segoe Light"/>
+              </a:endParaRPr>
+            </a:p>
+          </p:txBody>
+        </p:sp>
+        <p:sp>
+          <p:nvSpPr>
+            <p:cNvPr id="50" name="Rectangle 49"/>
+            <p:cNvSpPr/>
+            <p:nvPr/>
+          </p:nvSpPr>
+          <p:spPr>
+            <a:xfrm>
+              <a:off x="8019975" y="3286342"/>
+              <a:ext cx="1044186" cy="384246"/>
+            </a:xfrm>
+            <a:prstGeom prst="rect">
+              <a:avLst/>
+            </a:prstGeom>
+            <a:solidFill>
+              <a:schemeClr val="bg1">
+                <a:lumMod val="65000"/>
+                <a:lumOff val="35000"/>
+              </a:schemeClr>
+            </a:solidFill>
+            <a:ln>
+              <a:noFill/>
+            </a:ln>
+          </p:spPr>
+          <p:style>
+            <a:lnRef idx="1">
+              <a:schemeClr val="accent1"/>
+            </a:lnRef>
+            <a:fillRef idx="3">
+              <a:schemeClr val="accent1"/>
+            </a:fillRef>
+            <a:effectRef idx="2">
+              <a:schemeClr val="accent1"/>
+            </a:effectRef>
+            <a:fontRef idx="minor">
+              <a:schemeClr val="lt1"/>
+            </a:fontRef>
+          </p:style>
+          <p:txBody>
+            <a:bodyPr rtlCol="0" anchor="ctr"/>
+            <a:lstStyle/>
+            <a:p>
+              <a:pPr algn="ctr"/>
+              <a:r>
+                <a:rPr lang="en-US" dirty="0" smtClean="0">
+                  <a:latin typeface="Segoe Light"/>
+                  <a:cs typeface="Segoe Light"/>
+                </a:rPr>
+                <a:t>~60 </a:t>
+              </a:r>
+              <a:r>
+                <a:rPr lang="en-US" dirty="0" err="1" smtClean="0">
+                  <a:latin typeface="Segoe Light"/>
+                  <a:cs typeface="Segoe Light"/>
+                </a:rPr>
+                <a:t>ms</a:t>
+              </a:r>
+              <a:endParaRPr lang="en-US" dirty="0">
+                <a:latin typeface="Segoe Light"/>
+                <a:cs typeface="Segoe Light"/>
+              </a:endParaRPr>
+            </a:p>
+          </p:txBody>
+        </p:sp>
+        <p:sp>
+          <p:nvSpPr>
+            <p:cNvPr id="51" name="Rectangle 50"/>
+            <p:cNvSpPr/>
+            <p:nvPr/>
+          </p:nvSpPr>
+          <p:spPr>
+            <a:xfrm>
+              <a:off x="8019975" y="3735576"/>
+              <a:ext cx="1044186" cy="384246"/>
+            </a:xfrm>
+            <a:prstGeom prst="rect">
+              <a:avLst/>
+            </a:prstGeom>
+            <a:solidFill>
+              <a:schemeClr val="bg1">
+                <a:lumMod val="65000"/>
+                <a:lumOff val="35000"/>
+              </a:schemeClr>
+            </a:solidFill>
+            <a:ln>
+              <a:noFill/>
+            </a:ln>
+          </p:spPr>
+          <p:style>
+            <a:lnRef idx="1">
+              <a:schemeClr val="accent1"/>
+            </a:lnRef>
+            <a:fillRef idx="3">
+              <a:schemeClr val="accent1"/>
+            </a:fillRef>
+            <a:effectRef idx="2">
+              <a:schemeClr val="accent1"/>
+            </a:effectRef>
+            <a:fontRef idx="minor">
+              <a:schemeClr val="lt1"/>
+            </a:fontRef>
+          </p:style>
+          <p:txBody>
+            <a:bodyPr rtlCol="0" anchor="ctr"/>
+            <a:lstStyle/>
+            <a:p>
+              <a:pPr algn="ctr"/>
+              <a:r>
+                <a:rPr lang="en-US" dirty="0" smtClean="0">
+                  <a:latin typeface="Segoe Light"/>
+                  <a:cs typeface="Segoe Light"/>
+                </a:rPr>
+                <a:t>~50 </a:t>
+              </a:r>
+              <a:r>
+                <a:rPr lang="en-US" dirty="0" err="1" smtClean="0">
+                  <a:latin typeface="Segoe Light"/>
+                  <a:cs typeface="Segoe Light"/>
+                </a:rPr>
+                <a:t>ms</a:t>
+              </a:r>
+              <a:endParaRPr lang="en-US" dirty="0">
+                <a:latin typeface="Segoe Light"/>
+                <a:cs typeface="Segoe Light"/>
+              </a:endParaRPr>
+            </a:p>
+          </p:txBody>
+        </p:sp>
+        <p:sp>
+          <p:nvSpPr>
+            <p:cNvPr id="52" name="Rectangle 51"/>
+            <p:cNvSpPr/>
+            <p:nvPr/>
+          </p:nvSpPr>
+          <p:spPr>
+            <a:xfrm>
+              <a:off x="8019974" y="4169976"/>
+              <a:ext cx="1044186" cy="850358"/>
+            </a:xfrm>
+            <a:prstGeom prst="rect">
+              <a:avLst/>
+            </a:prstGeom>
+            <a:solidFill>
+              <a:schemeClr val="bg1">
+                <a:lumMod val="65000"/>
+                <a:lumOff val="35000"/>
+              </a:schemeClr>
+            </a:solidFill>
+            <a:ln>
+              <a:noFill/>
+            </a:ln>
+          </p:spPr>
+          <p:style>
+            <a:lnRef idx="1">
+              <a:schemeClr val="accent1"/>
+            </a:lnRef>
+            <a:fillRef idx="3">
+              <a:schemeClr val="accent1"/>
+            </a:fillRef>
+            <a:effectRef idx="2">
+              <a:schemeClr val="accent1"/>
+            </a:effectRef>
+            <a:fontRef idx="minor">
+              <a:schemeClr val="lt1"/>
+            </a:fontRef>
+          </p:style>
+          <p:txBody>
+            <a:bodyPr rtlCol="0" anchor="ctr"/>
+            <a:lstStyle/>
+            <a:p>
+              <a:pPr algn="ctr"/>
+              <a:r>
+                <a:rPr lang="en-US" dirty="0">
+                  <a:latin typeface="Segoe Light"/>
+                  <a:cs typeface="Segoe Light"/>
+                </a:rPr>
+                <a:t>40 </a:t>
+              </a:r>
+              <a:r>
+                <a:rPr lang="en-US" dirty="0" err="1">
+                  <a:latin typeface="Segoe Light"/>
+                  <a:cs typeface="Segoe Light"/>
+                </a:rPr>
+                <a:t>ms</a:t>
+              </a:r>
+              <a:r>
+                <a:rPr lang="en-US" dirty="0">
+                  <a:latin typeface="Segoe Light"/>
+                  <a:cs typeface="Segoe Light"/>
+                </a:rPr>
+                <a:t> -</a:t>
+              </a:r>
+            </a:p>
+            <a:p>
+              <a:pPr algn="ctr"/>
+              <a:r>
+                <a:rPr lang="en-US" dirty="0">
+                  <a:latin typeface="Segoe Light"/>
+                  <a:cs typeface="Segoe Light"/>
+                </a:rPr>
+                <a:t>100 </a:t>
+              </a:r>
+              <a:r>
+                <a:rPr lang="en-US" dirty="0" err="1">
+                  <a:latin typeface="Segoe Light"/>
+                  <a:cs typeface="Segoe Light"/>
+                </a:rPr>
+                <a:t>ms</a:t>
+              </a:r>
+              <a:endParaRPr lang="en-US" dirty="0">
+                <a:latin typeface="Segoe Light"/>
+                <a:cs typeface="Segoe Light"/>
+              </a:endParaRPr>
+            </a:p>
+          </p:txBody>
+        </p:sp>
+        <p:sp>
+          <p:nvSpPr>
+            <p:cNvPr id="53" name="Rectangle 52"/>
+            <p:cNvSpPr/>
+            <p:nvPr/>
+          </p:nvSpPr>
+          <p:spPr>
+            <a:xfrm>
+              <a:off x="8019975" y="5077542"/>
+              <a:ext cx="1044186" cy="1158303"/>
+            </a:xfrm>
+            <a:prstGeom prst="rect">
+              <a:avLst/>
+            </a:prstGeom>
+            <a:solidFill>
+              <a:schemeClr val="bg1">
+                <a:lumMod val="65000"/>
+                <a:lumOff val="35000"/>
+              </a:schemeClr>
+            </a:solidFill>
+            <a:ln>
+              <a:noFill/>
+            </a:ln>
+          </p:spPr>
+          <p:style>
+            <a:lnRef idx="1">
+              <a:schemeClr val="accent1"/>
+            </a:lnRef>
+            <a:fillRef idx="3">
+              <a:schemeClr val="accent1"/>
+            </a:fillRef>
+            <a:effectRef idx="2">
+              <a:schemeClr val="accent1"/>
+            </a:effectRef>
+            <a:fontRef idx="minor">
+              <a:schemeClr val="lt1"/>
+            </a:fontRef>
+          </p:style>
+          <p:txBody>
+            <a:bodyPr rtlCol="0" anchor="ctr"/>
+            <a:lstStyle/>
+            <a:p>
+              <a:pPr algn="ctr"/>
+              <a:r>
+                <a:rPr lang="en-US" dirty="0" smtClean="0">
+                  <a:latin typeface="Segoe Light"/>
+                  <a:cs typeface="Segoe Light"/>
+                </a:rPr>
+                <a:t>40 </a:t>
+              </a:r>
+              <a:r>
+                <a:rPr lang="en-US" dirty="0" err="1" smtClean="0">
+                  <a:latin typeface="Segoe Light"/>
+                  <a:cs typeface="Segoe Light"/>
+                </a:rPr>
+                <a:t>ms</a:t>
+              </a:r>
+              <a:r>
+                <a:rPr lang="en-US" dirty="0" smtClean="0">
+                  <a:latin typeface="Segoe Light"/>
+                  <a:cs typeface="Segoe Light"/>
+                </a:rPr>
+                <a:t> -</a:t>
+              </a:r>
+            </a:p>
+            <a:p>
+              <a:pPr algn="ctr"/>
+              <a:r>
+                <a:rPr lang="en-US" dirty="0" smtClean="0">
+                  <a:latin typeface="Segoe Light"/>
+                  <a:cs typeface="Segoe Light"/>
+                </a:rPr>
+                <a:t>100 </a:t>
+              </a:r>
+              <a:r>
+                <a:rPr lang="en-US" dirty="0" err="1" smtClean="0">
+                  <a:latin typeface="Segoe Light"/>
+                  <a:cs typeface="Segoe Light"/>
+                </a:rPr>
+                <a:t>ms</a:t>
+              </a:r>
+              <a:endParaRPr lang="en-US" dirty="0">
+                <a:latin typeface="Segoe Light"/>
+                <a:cs typeface="Segoe Light"/>
+              </a:endParaRPr>
+            </a:p>
+          </p:txBody>
+        </p:sp>
+        <p:sp>
+          <p:nvSpPr>
+            <p:cNvPr id="55" name="Rectangle 54"/>
+            <p:cNvSpPr/>
+            <p:nvPr/>
+          </p:nvSpPr>
+          <p:spPr>
+            <a:xfrm>
+              <a:off x="5069430" y="6305292"/>
+              <a:ext cx="3994729" cy="407270"/>
+            </a:xfrm>
+            <a:prstGeom prst="rect">
+              <a:avLst/>
+            </a:prstGeom>
+            <a:solidFill>
+              <a:schemeClr val="bg1">
+                <a:lumMod val="65000"/>
+                <a:lumOff val="35000"/>
+              </a:schemeClr>
+            </a:solidFill>
+            <a:ln>
+              <a:noFill/>
+            </a:ln>
+          </p:spPr>
+          <p:style>
+            <a:lnRef idx="1">
+              <a:schemeClr val="accent1"/>
+            </a:lnRef>
+            <a:fillRef idx="3">
+              <a:schemeClr val="accent1"/>
+            </a:fillRef>
+            <a:effectRef idx="2">
+              <a:schemeClr val="accent1"/>
+            </a:effectRef>
+            <a:fontRef idx="minor">
+              <a:schemeClr val="lt1"/>
+            </a:fontRef>
+          </p:style>
+          <p:txBody>
+            <a:bodyPr rtlCol="0" anchor="ctr"/>
+            <a:lstStyle/>
+            <a:p>
+              <a:pPr algn="ctr"/>
+              <a:r>
+                <a:rPr lang="en-US" dirty="0" smtClean="0">
+                  <a:latin typeface="Segoe Light"/>
+                  <a:cs typeface="Segoe Light"/>
+                </a:rPr>
+                <a:t>Possibly Internet….  50 </a:t>
+              </a:r>
+              <a:r>
+                <a:rPr lang="en-US" dirty="0" err="1" smtClean="0">
+                  <a:latin typeface="Segoe Light"/>
+                  <a:cs typeface="Segoe Light"/>
+                </a:rPr>
+                <a:t>ms</a:t>
+              </a:r>
+              <a:r>
+                <a:rPr lang="en-US" dirty="0" smtClean="0">
+                  <a:latin typeface="Segoe Light"/>
+                  <a:cs typeface="Segoe Light"/>
+                </a:rPr>
+                <a:t> – 200 </a:t>
+              </a:r>
+              <a:r>
+                <a:rPr lang="en-US" dirty="0" err="1" smtClean="0">
+                  <a:latin typeface="Segoe Light"/>
+                  <a:cs typeface="Segoe Light"/>
+                </a:rPr>
+                <a:t>ms</a:t>
+              </a:r>
+              <a:endParaRPr lang="en-US" dirty="0">
+                <a:latin typeface="Segoe Light"/>
+                <a:cs typeface="Segoe Light"/>
+              </a:endParaRPr>
+            </a:p>
+          </p:txBody>
+        </p:sp>
+      </p:grpSp>
+      <p:pic>
+        <p:nvPicPr>
+          <p:cNvPr id="7" name="Picture 6" descr="barplot.png"/>
+          <p:cNvPicPr>
+            <a:picLocks noChangeAspect="1"/>
+          </p:cNvPicPr>
+          <p:nvPr/>
+        </p:nvPicPr>
+        <p:blipFill>
+          <a:blip r:embed="rId3">
+            <a:extLst>
+              <a:ext uri="{28A0092B-C50C-407E-A947-70E740481C1C}">
+                <a14:useLocalDpi xmlns:a14="http://schemas.microsoft.com/office/drawing/2010/main" val="0"/>
+              </a:ext>
+            </a:extLst>
+          </a:blip>
+          <a:stretch>
+            <a:fillRect/>
+          </a:stretch>
+        </p:blipFill>
         <p:spPr>
           <a:xfrm>
-            <a:off x="6422789" y="618676"/>
-            <a:ext cx="184666" cy="369332"/>
+            <a:off x="457200" y="3512676"/>
+            <a:ext cx="4196564" cy="3139929"/>
           </a:xfrm>
           <a:prstGeom prst="rect">
             <a:avLst/>
           </a:prstGeom>
-          <a:noFill/>
         </p:spPr>
-        <p:txBody>
-          <a:bodyPr wrap="none" rtlCol="0">
-            <a:spAutoFit/>
-          </a:bodyPr>
-          <a:lstStyle/>
-          <a:p>
-            <a:endParaRPr lang="en-US" dirty="0"/>
-          </a:p>
-        </p:txBody>
-      </p:sp>
-      <p:sp>
-        <p:nvSpPr>
-          <p:cNvPr id="6" name="Rectangle 5"/>
-          <p:cNvSpPr/>
-          <p:nvPr/>
-        </p:nvSpPr>
-        <p:spPr>
-          <a:xfrm>
-            <a:off x="5069430" y="152083"/>
-            <a:ext cx="2827922" cy="384246"/>
-          </a:xfrm>
-          <a:prstGeom prst="rect">
-            <a:avLst/>
-          </a:prstGeom>
-          <a:solidFill>
-            <a:schemeClr val="bg1">
-              <a:lumMod val="65000"/>
-              <a:lumOff val="35000"/>
-            </a:schemeClr>
-          </a:solidFill>
-          <a:ln>
-            <a:noFill/>
-          </a:ln>
-        </p:spPr>
-        <p:style>
-          <a:lnRef idx="1">
-            <a:schemeClr val="accent1"/>
-          </a:lnRef>
-          <a:fillRef idx="3">
-            <a:schemeClr val="accent1"/>
-          </a:fillRef>
-          <a:effectRef idx="2">
-            <a:schemeClr val="accent1"/>
-          </a:effectRef>
-          <a:fontRef idx="minor">
-            <a:schemeClr val="lt1"/>
-          </a:fontRef>
-        </p:style>
-        <p:txBody>
-          <a:bodyPr rtlCol="0" anchor="ctr"/>
-          <a:lstStyle/>
-          <a:p>
-            <a:pPr algn="ctr"/>
-            <a:r>
-              <a:rPr lang="en-US" dirty="0">
-                <a:latin typeface="Segoe Light"/>
-                <a:cs typeface="Segoe Light"/>
-              </a:rPr>
-              <a:t>[AS0] </a:t>
-            </a:r>
-            <a:r>
-              <a:rPr lang="en-US" dirty="0" smtClean="0">
-                <a:latin typeface="Segoe Light"/>
-                <a:cs typeface="Segoe Light"/>
-              </a:rPr>
-              <a:t>172.20.10.1</a:t>
-            </a:r>
-            <a:endParaRPr lang="en-US" dirty="0">
-              <a:latin typeface="Segoe Light"/>
-              <a:cs typeface="Segoe Light"/>
-            </a:endParaRPr>
-          </a:p>
-        </p:txBody>
-      </p:sp>
-      <p:sp>
-        <p:nvSpPr>
-          <p:cNvPr id="28" name="Rectangle 27"/>
-          <p:cNvSpPr/>
-          <p:nvPr/>
-        </p:nvSpPr>
-        <p:spPr>
-          <a:xfrm>
-            <a:off x="5069429" y="1024641"/>
-            <a:ext cx="2827923" cy="384246"/>
-          </a:xfrm>
-          <a:prstGeom prst="rect">
-            <a:avLst/>
-          </a:prstGeom>
-          <a:solidFill>
-            <a:schemeClr val="bg1">
-              <a:lumMod val="65000"/>
-              <a:lumOff val="35000"/>
-            </a:schemeClr>
-          </a:solidFill>
-          <a:ln>
-            <a:noFill/>
-          </a:ln>
-        </p:spPr>
-        <p:style>
-          <a:lnRef idx="1">
-            <a:schemeClr val="accent1"/>
-          </a:lnRef>
-          <a:fillRef idx="3">
-            <a:schemeClr val="accent1"/>
-          </a:fillRef>
-          <a:effectRef idx="2">
-            <a:schemeClr val="accent1"/>
-          </a:effectRef>
-          <a:fontRef idx="minor">
-            <a:schemeClr val="lt1"/>
-          </a:fontRef>
-        </p:style>
-        <p:txBody>
-          <a:bodyPr rtlCol="0" anchor="ctr"/>
-          <a:lstStyle/>
-          <a:p>
-            <a:pPr algn="ctr"/>
-            <a:r>
-              <a:rPr lang="en-US" dirty="0" smtClean="0">
-                <a:latin typeface="Segoe Light"/>
-                <a:cs typeface="Segoe Light"/>
-              </a:rPr>
-              <a:t>[AS16509] 172.26.241.133</a:t>
-            </a:r>
-            <a:endParaRPr lang="en-US" dirty="0">
-              <a:latin typeface="Segoe Light"/>
-              <a:cs typeface="Segoe Light"/>
-            </a:endParaRPr>
-          </a:p>
-        </p:txBody>
-      </p:sp>
-      <p:sp>
-        <p:nvSpPr>
-          <p:cNvPr id="29" name="Rectangle 28"/>
-          <p:cNvSpPr/>
-          <p:nvPr/>
-        </p:nvSpPr>
-        <p:spPr>
-          <a:xfrm>
-            <a:off x="5069430" y="584944"/>
-            <a:ext cx="2827922" cy="384246"/>
-          </a:xfrm>
-          <a:prstGeom prst="rect">
-            <a:avLst/>
-          </a:prstGeom>
-          <a:solidFill>
-            <a:schemeClr val="bg1">
-              <a:lumMod val="65000"/>
-              <a:lumOff val="35000"/>
-            </a:schemeClr>
-          </a:solidFill>
-          <a:ln>
-            <a:noFill/>
-          </a:ln>
-        </p:spPr>
-        <p:style>
-          <a:lnRef idx="1">
-            <a:schemeClr val="accent1"/>
-          </a:lnRef>
-          <a:fillRef idx="3">
-            <a:schemeClr val="accent1"/>
-          </a:fillRef>
-          <a:effectRef idx="2">
-            <a:schemeClr val="accent1"/>
-          </a:effectRef>
-          <a:fontRef idx="minor">
-            <a:schemeClr val="lt1"/>
-          </a:fontRef>
-        </p:style>
-        <p:txBody>
-          <a:bodyPr rtlCol="0" anchor="ctr"/>
-          <a:lstStyle/>
-          <a:p>
-            <a:pPr algn="ctr"/>
-            <a:r>
-              <a:rPr lang="en-US" dirty="0" smtClean="0">
-                <a:latin typeface="Segoe Light"/>
-                <a:cs typeface="Segoe Light"/>
-              </a:rPr>
-              <a:t>[AS16509] 172.26.236.2</a:t>
-            </a:r>
-            <a:endParaRPr lang="en-US" dirty="0">
-              <a:latin typeface="Segoe Light"/>
-              <a:cs typeface="Segoe Light"/>
-            </a:endParaRPr>
-          </a:p>
-        </p:txBody>
-      </p:sp>
-      <p:sp>
-        <p:nvSpPr>
-          <p:cNvPr id="30" name="Rectangle 29"/>
-          <p:cNvSpPr/>
-          <p:nvPr/>
-        </p:nvSpPr>
-        <p:spPr>
-          <a:xfrm>
-            <a:off x="5069430" y="1462745"/>
-            <a:ext cx="2827923" cy="868599"/>
-          </a:xfrm>
-          <a:prstGeom prst="rect">
-            <a:avLst/>
-          </a:prstGeom>
-          <a:solidFill>
-            <a:schemeClr val="bg1">
-              <a:lumMod val="65000"/>
-              <a:lumOff val="35000"/>
-            </a:schemeClr>
-          </a:solidFill>
-          <a:ln>
-            <a:noFill/>
-          </a:ln>
-        </p:spPr>
-        <p:style>
-          <a:lnRef idx="1">
-            <a:schemeClr val="accent1"/>
-          </a:lnRef>
-          <a:fillRef idx="3">
-            <a:schemeClr val="accent1"/>
-          </a:fillRef>
-          <a:effectRef idx="2">
-            <a:schemeClr val="accent1"/>
-          </a:effectRef>
-          <a:fontRef idx="minor">
-            <a:schemeClr val="lt1"/>
-          </a:fontRef>
-        </p:style>
-        <p:txBody>
-          <a:bodyPr rtlCol="0" anchor="ctr"/>
-          <a:lstStyle/>
-          <a:p>
-            <a:pPr algn="ctr"/>
-            <a:r>
-              <a:rPr lang="en-US" dirty="0" smtClean="0">
-                <a:latin typeface="Segoe Light"/>
-                <a:cs typeface="Segoe Light"/>
-              </a:rPr>
-              <a:t>[AS0] 172.26.96.10/172.26.96.11</a:t>
-            </a:r>
-          </a:p>
-          <a:p>
-            <a:pPr algn="ctr"/>
-            <a:r>
-              <a:rPr lang="en-US" dirty="0">
-                <a:latin typeface="Segoe Light"/>
-                <a:cs typeface="Segoe Light"/>
-              </a:rPr>
-              <a:t>172.26.96.3/</a:t>
-            </a:r>
-            <a:r>
-              <a:rPr lang="en-US" dirty="0" smtClean="0">
-                <a:latin typeface="Segoe Light"/>
-                <a:cs typeface="Segoe Light"/>
-              </a:rPr>
-              <a:t>172.26.96.2</a:t>
-            </a:r>
-            <a:endParaRPr lang="en-US" dirty="0">
-              <a:latin typeface="Segoe Light"/>
-              <a:cs typeface="Segoe Light"/>
-            </a:endParaRPr>
-          </a:p>
-        </p:txBody>
-      </p:sp>
-      <p:sp>
-        <p:nvSpPr>
-          <p:cNvPr id="32" name="Rectangle 31"/>
-          <p:cNvSpPr/>
-          <p:nvPr/>
-        </p:nvSpPr>
-        <p:spPr>
-          <a:xfrm>
-            <a:off x="5069429" y="2389112"/>
-            <a:ext cx="2827923" cy="384246"/>
-          </a:xfrm>
-          <a:prstGeom prst="rect">
-            <a:avLst/>
-          </a:prstGeom>
-          <a:solidFill>
-            <a:schemeClr val="bg1">
-              <a:lumMod val="65000"/>
-              <a:lumOff val="35000"/>
-            </a:schemeClr>
-          </a:solidFill>
-          <a:ln>
-            <a:noFill/>
-          </a:ln>
-        </p:spPr>
-        <p:style>
-          <a:lnRef idx="1">
-            <a:schemeClr val="accent1"/>
-          </a:lnRef>
-          <a:fillRef idx="3">
-            <a:schemeClr val="accent1"/>
-          </a:fillRef>
-          <a:effectRef idx="2">
-            <a:schemeClr val="accent1"/>
-          </a:effectRef>
-          <a:fontRef idx="minor">
-            <a:schemeClr val="lt1"/>
-          </a:fontRef>
-        </p:style>
-        <p:txBody>
-          <a:bodyPr rtlCol="0" anchor="ctr"/>
-          <a:lstStyle/>
-          <a:p>
-            <a:pPr algn="ctr"/>
-            <a:r>
-              <a:rPr lang="en-US" dirty="0" smtClean="0">
-                <a:latin typeface="Segoe Light"/>
-                <a:cs typeface="Segoe Light"/>
-              </a:rPr>
-              <a:t>[AS0] 172.26.96.193</a:t>
-            </a:r>
-            <a:endParaRPr lang="en-US" dirty="0">
-              <a:latin typeface="Segoe Light"/>
-              <a:cs typeface="Segoe Light"/>
-            </a:endParaRPr>
-          </a:p>
-        </p:txBody>
-      </p:sp>
-      <p:sp>
-        <p:nvSpPr>
-          <p:cNvPr id="33" name="Rectangle 32"/>
-          <p:cNvSpPr/>
-          <p:nvPr/>
-        </p:nvSpPr>
-        <p:spPr>
-          <a:xfrm>
-            <a:off x="5069430" y="2836355"/>
-            <a:ext cx="2827923" cy="384246"/>
-          </a:xfrm>
-          <a:prstGeom prst="rect">
-            <a:avLst/>
-          </a:prstGeom>
-          <a:solidFill>
-            <a:schemeClr val="bg1">
-              <a:lumMod val="65000"/>
-              <a:lumOff val="35000"/>
-            </a:schemeClr>
-          </a:solidFill>
-          <a:ln>
-            <a:noFill/>
-          </a:ln>
-        </p:spPr>
-        <p:style>
-          <a:lnRef idx="1">
-            <a:schemeClr val="accent1"/>
-          </a:lnRef>
-          <a:fillRef idx="3">
-            <a:schemeClr val="accent1"/>
-          </a:fillRef>
-          <a:effectRef idx="2">
-            <a:schemeClr val="accent1"/>
-          </a:effectRef>
-          <a:fontRef idx="minor">
-            <a:schemeClr val="lt1"/>
-          </a:fontRef>
-        </p:style>
-        <p:txBody>
-          <a:bodyPr rtlCol="0" anchor="ctr"/>
-          <a:lstStyle/>
-          <a:p>
-            <a:pPr algn="ctr"/>
-            <a:r>
-              <a:rPr lang="en-US" dirty="0" smtClean="0">
-                <a:latin typeface="Segoe Light"/>
-                <a:cs typeface="Segoe Light"/>
-              </a:rPr>
-              <a:t>[AS0] 172.16.121.113</a:t>
-            </a:r>
-            <a:endParaRPr lang="en-US" dirty="0">
-              <a:latin typeface="Segoe Light"/>
-              <a:cs typeface="Segoe Light"/>
-            </a:endParaRPr>
-          </a:p>
-        </p:txBody>
-      </p:sp>
-      <p:sp>
-        <p:nvSpPr>
-          <p:cNvPr id="34" name="Rectangle 33"/>
-          <p:cNvSpPr/>
-          <p:nvPr/>
-        </p:nvSpPr>
-        <p:spPr>
-          <a:xfrm>
-            <a:off x="5069430" y="3286342"/>
-            <a:ext cx="2827923" cy="384246"/>
-          </a:xfrm>
-          <a:prstGeom prst="rect">
-            <a:avLst/>
-          </a:prstGeom>
-          <a:solidFill>
-            <a:schemeClr val="bg1">
-              <a:lumMod val="65000"/>
-              <a:lumOff val="35000"/>
-            </a:schemeClr>
-          </a:solidFill>
-          <a:ln>
-            <a:noFill/>
-          </a:ln>
-        </p:spPr>
-        <p:style>
-          <a:lnRef idx="1">
-            <a:schemeClr val="accent1"/>
-          </a:lnRef>
-          <a:fillRef idx="3">
-            <a:schemeClr val="accent1"/>
-          </a:fillRef>
-          <a:effectRef idx="2">
-            <a:schemeClr val="accent1"/>
-          </a:effectRef>
-          <a:fontRef idx="minor">
-            <a:schemeClr val="lt1"/>
-          </a:fontRef>
-        </p:style>
-        <p:txBody>
-          <a:bodyPr rtlCol="0" anchor="ctr"/>
-          <a:lstStyle/>
-          <a:p>
-            <a:pPr algn="ctr"/>
-            <a:r>
-              <a:rPr lang="en-US" dirty="0" smtClean="0">
-                <a:latin typeface="Segoe Light"/>
-                <a:cs typeface="Segoe Light"/>
-              </a:rPr>
-              <a:t>[AS7018] 12.249.2.49</a:t>
-            </a:r>
-            <a:endParaRPr lang="en-US" dirty="0">
-              <a:latin typeface="Segoe Light"/>
-              <a:cs typeface="Segoe Light"/>
-            </a:endParaRPr>
-          </a:p>
-        </p:txBody>
-      </p:sp>
-      <p:sp>
-        <p:nvSpPr>
-          <p:cNvPr id="35" name="Rectangle 34"/>
-          <p:cNvSpPr/>
-          <p:nvPr/>
-        </p:nvSpPr>
-        <p:spPr>
-          <a:xfrm>
-            <a:off x="5069430" y="3735576"/>
-            <a:ext cx="2827923" cy="384246"/>
-          </a:xfrm>
-          <a:prstGeom prst="rect">
-            <a:avLst/>
-          </a:prstGeom>
-          <a:solidFill>
-            <a:schemeClr val="bg1">
-              <a:lumMod val="65000"/>
-              <a:lumOff val="35000"/>
-            </a:schemeClr>
-          </a:solidFill>
-          <a:ln>
-            <a:noFill/>
-          </a:ln>
-        </p:spPr>
-        <p:style>
-          <a:lnRef idx="1">
-            <a:schemeClr val="accent1"/>
-          </a:lnRef>
-          <a:fillRef idx="3">
-            <a:schemeClr val="accent1"/>
-          </a:fillRef>
-          <a:effectRef idx="2">
-            <a:schemeClr val="accent1"/>
-          </a:effectRef>
-          <a:fontRef idx="minor">
-            <a:schemeClr val="lt1"/>
-          </a:fontRef>
-        </p:style>
-        <p:txBody>
-          <a:bodyPr rtlCol="0" anchor="ctr"/>
-          <a:lstStyle/>
-          <a:p>
-            <a:pPr algn="ctr"/>
-            <a:r>
-              <a:rPr lang="en-US" dirty="0">
-                <a:latin typeface="Segoe Light"/>
-                <a:cs typeface="Segoe Light"/>
-              </a:rPr>
-              <a:t>[AS7018] </a:t>
-            </a:r>
-            <a:r>
-              <a:rPr lang="en-US" dirty="0" smtClean="0">
-                <a:latin typeface="Segoe Light"/>
-                <a:cs typeface="Segoe Light"/>
-              </a:rPr>
-              <a:t>12.83.180.82</a:t>
-            </a:r>
-            <a:endParaRPr lang="en-US" dirty="0">
-              <a:latin typeface="Segoe Light"/>
-              <a:cs typeface="Segoe Light"/>
-            </a:endParaRPr>
-          </a:p>
-        </p:txBody>
-      </p:sp>
-      <p:sp>
-        <p:nvSpPr>
-          <p:cNvPr id="36" name="Rectangle 35"/>
-          <p:cNvSpPr/>
-          <p:nvPr/>
-        </p:nvSpPr>
-        <p:spPr>
-          <a:xfrm>
-            <a:off x="5069429" y="4169976"/>
-            <a:ext cx="2827923" cy="850358"/>
-          </a:xfrm>
-          <a:prstGeom prst="rect">
-            <a:avLst/>
-          </a:prstGeom>
-          <a:solidFill>
-            <a:schemeClr val="bg1">
-              <a:lumMod val="65000"/>
-              <a:lumOff val="35000"/>
-            </a:schemeClr>
-          </a:solidFill>
-          <a:ln>
-            <a:noFill/>
-          </a:ln>
-        </p:spPr>
-        <p:style>
-          <a:lnRef idx="1">
-            <a:schemeClr val="accent1"/>
-          </a:lnRef>
-          <a:fillRef idx="3">
-            <a:schemeClr val="accent1"/>
-          </a:fillRef>
-          <a:effectRef idx="2">
-            <a:schemeClr val="accent1"/>
-          </a:effectRef>
-          <a:fontRef idx="minor">
-            <a:schemeClr val="lt1"/>
-          </a:fontRef>
-        </p:style>
-        <p:txBody>
-          <a:bodyPr rtlCol="0" anchor="ctr"/>
-          <a:lstStyle/>
-          <a:p>
-            <a:pPr algn="ctr"/>
-            <a:r>
-              <a:rPr lang="en-US" dirty="0">
-                <a:latin typeface="Segoe Light"/>
-                <a:cs typeface="Segoe Light"/>
-              </a:rPr>
-              <a:t>[AS7018</a:t>
-            </a:r>
-            <a:r>
-              <a:rPr lang="en-US" dirty="0" smtClean="0">
-                <a:latin typeface="Segoe Light"/>
-                <a:cs typeface="Segoe Light"/>
-              </a:rPr>
-              <a:t>]</a:t>
-            </a:r>
-          </a:p>
-          <a:p>
-            <a:pPr algn="ctr"/>
-            <a:r>
-              <a:rPr lang="en-US" dirty="0">
-                <a:latin typeface="Segoe Light"/>
-                <a:cs typeface="Segoe Light"/>
-              </a:rPr>
-              <a:t>12.122.200.9/12.122.114.5</a:t>
-            </a:r>
-            <a:endParaRPr lang="en-US" dirty="0" smtClean="0">
-              <a:latin typeface="Segoe Light"/>
-              <a:cs typeface="Segoe Light"/>
-            </a:endParaRPr>
-          </a:p>
-          <a:p>
-            <a:pPr algn="ctr"/>
-            <a:r>
-              <a:rPr lang="en-US" dirty="0" smtClean="0">
-                <a:latin typeface="Segoe Light"/>
-                <a:cs typeface="Segoe Light"/>
-              </a:rPr>
-              <a:t>12.122.1.118/12.122.8.79…</a:t>
-            </a:r>
-            <a:endParaRPr lang="en-US" dirty="0">
-              <a:latin typeface="Segoe Light"/>
-              <a:cs typeface="Segoe Light"/>
-            </a:endParaRPr>
-          </a:p>
-        </p:txBody>
-      </p:sp>
-      <p:sp>
-        <p:nvSpPr>
-          <p:cNvPr id="37" name="Rectangle 36"/>
-          <p:cNvSpPr/>
-          <p:nvPr/>
-        </p:nvSpPr>
-        <p:spPr>
-          <a:xfrm>
-            <a:off x="5069430" y="5077542"/>
-            <a:ext cx="2827923" cy="1158303"/>
-          </a:xfrm>
-          <a:prstGeom prst="rect">
-            <a:avLst/>
-          </a:prstGeom>
-          <a:solidFill>
-            <a:schemeClr val="bg1">
-              <a:lumMod val="65000"/>
-              <a:lumOff val="35000"/>
-            </a:schemeClr>
-          </a:solidFill>
-          <a:ln>
-            <a:noFill/>
-          </a:ln>
-        </p:spPr>
-        <p:style>
-          <a:lnRef idx="1">
-            <a:schemeClr val="accent1"/>
-          </a:lnRef>
-          <a:fillRef idx="3">
-            <a:schemeClr val="accent1"/>
-          </a:fillRef>
-          <a:effectRef idx="2">
-            <a:schemeClr val="accent1"/>
-          </a:effectRef>
-          <a:fontRef idx="minor">
-            <a:schemeClr val="lt1"/>
-          </a:fontRef>
-        </p:style>
-        <p:txBody>
-          <a:bodyPr rtlCol="0" anchor="ctr"/>
-          <a:lstStyle/>
-          <a:p>
-            <a:pPr algn="ctr"/>
-            <a:r>
-              <a:rPr lang="en-US" dirty="0">
-                <a:latin typeface="Segoe Light"/>
-                <a:cs typeface="Segoe Light"/>
-              </a:rPr>
-              <a:t>[AS7018</a:t>
-            </a:r>
-            <a:r>
-              <a:rPr lang="en-US" dirty="0" smtClean="0">
-                <a:latin typeface="Segoe Light"/>
-                <a:cs typeface="Segoe Light"/>
-              </a:rPr>
-              <a:t>]</a:t>
-            </a:r>
-          </a:p>
-          <a:p>
-            <a:pPr algn="ctr"/>
-            <a:r>
-              <a:rPr lang="en-US" dirty="0">
-                <a:latin typeface="Segoe Light"/>
-                <a:cs typeface="Segoe Light"/>
-              </a:rPr>
-              <a:t>12.122.114.21/</a:t>
-            </a:r>
-            <a:r>
-              <a:rPr lang="en-US" dirty="0" smtClean="0">
-                <a:latin typeface="Segoe Light"/>
-                <a:cs typeface="Segoe Light"/>
-              </a:rPr>
-              <a:t>12.123.30.5 </a:t>
-            </a:r>
-            <a:endParaRPr lang="en-US" dirty="0">
-              <a:latin typeface="Segoe Light"/>
-              <a:cs typeface="Segoe Light"/>
-            </a:endParaRPr>
-          </a:p>
-          <a:p>
-            <a:pPr algn="ctr"/>
-            <a:r>
-              <a:rPr lang="en-US" dirty="0" smtClean="0">
-                <a:latin typeface="Segoe Light"/>
-                <a:cs typeface="Segoe Light"/>
-              </a:rPr>
-              <a:t>[AS0]</a:t>
-            </a:r>
-          </a:p>
-          <a:p>
-            <a:pPr algn="ctr"/>
-            <a:r>
-              <a:rPr lang="en-US" dirty="0" smtClean="0">
-                <a:latin typeface="Segoe Light"/>
-                <a:cs typeface="Segoe Light"/>
-              </a:rPr>
-              <a:t>192.205.33.46/…</a:t>
-            </a:r>
-            <a:endParaRPr lang="en-US" dirty="0">
-              <a:latin typeface="Segoe Light"/>
-              <a:cs typeface="Segoe Light"/>
-            </a:endParaRPr>
-          </a:p>
-        </p:txBody>
-      </p:sp>
-      <p:sp>
-        <p:nvSpPr>
-          <p:cNvPr id="43" name="TextBox 42"/>
-          <p:cNvSpPr txBox="1"/>
-          <p:nvPr/>
-        </p:nvSpPr>
-        <p:spPr>
-          <a:xfrm>
-            <a:off x="9373334" y="618676"/>
-            <a:ext cx="68186" cy="369332"/>
-          </a:xfrm>
-          <a:prstGeom prst="rect">
-            <a:avLst/>
-          </a:prstGeom>
-          <a:noFill/>
-        </p:spPr>
-        <p:txBody>
-          <a:bodyPr wrap="square" rtlCol="0">
-            <a:spAutoFit/>
-          </a:bodyPr>
-          <a:lstStyle/>
-          <a:p>
-            <a:endParaRPr lang="en-US" dirty="0"/>
-          </a:p>
-        </p:txBody>
-      </p:sp>
-      <p:sp>
-        <p:nvSpPr>
-          <p:cNvPr id="44" name="Rectangle 43"/>
-          <p:cNvSpPr/>
-          <p:nvPr/>
-        </p:nvSpPr>
-        <p:spPr>
-          <a:xfrm>
-            <a:off x="8019974" y="152083"/>
-            <a:ext cx="1044185" cy="384246"/>
-          </a:xfrm>
-          <a:prstGeom prst="rect">
-            <a:avLst/>
-          </a:prstGeom>
-          <a:solidFill>
-            <a:schemeClr val="bg1">
-              <a:lumMod val="65000"/>
-              <a:lumOff val="35000"/>
-            </a:schemeClr>
-          </a:solidFill>
-          <a:ln>
-            <a:noFill/>
-          </a:ln>
-        </p:spPr>
-        <p:style>
-          <a:lnRef idx="1">
-            <a:schemeClr val="accent1"/>
-          </a:lnRef>
-          <a:fillRef idx="3">
-            <a:schemeClr val="accent1"/>
-          </a:fillRef>
-          <a:effectRef idx="2">
-            <a:schemeClr val="accent1"/>
-          </a:effectRef>
-          <a:fontRef idx="minor">
-            <a:schemeClr val="lt1"/>
-          </a:fontRef>
-        </p:style>
-        <p:txBody>
-          <a:bodyPr rtlCol="0" anchor="ctr"/>
-          <a:lstStyle/>
-          <a:p>
-            <a:pPr algn="ctr"/>
-            <a:r>
-              <a:rPr lang="en-US" dirty="0" smtClean="0">
-                <a:latin typeface="Segoe Light"/>
-                <a:cs typeface="Segoe Light"/>
-              </a:rPr>
-              <a:t>~0.7 </a:t>
-            </a:r>
-            <a:r>
-              <a:rPr lang="en-US" dirty="0" err="1" smtClean="0">
-                <a:latin typeface="Segoe Light"/>
-                <a:cs typeface="Segoe Light"/>
-              </a:rPr>
-              <a:t>ms</a:t>
-            </a:r>
-            <a:endParaRPr lang="en-US" dirty="0">
-              <a:latin typeface="Segoe Light"/>
-              <a:cs typeface="Segoe Light"/>
-            </a:endParaRPr>
-          </a:p>
-        </p:txBody>
-      </p:sp>
-      <p:sp>
-        <p:nvSpPr>
-          <p:cNvPr id="45" name="Rectangle 44"/>
-          <p:cNvSpPr/>
-          <p:nvPr/>
-        </p:nvSpPr>
-        <p:spPr>
-          <a:xfrm>
-            <a:off x="8019974" y="1024641"/>
-            <a:ext cx="1044186" cy="384246"/>
-          </a:xfrm>
-          <a:prstGeom prst="rect">
-            <a:avLst/>
-          </a:prstGeom>
-          <a:solidFill>
-            <a:schemeClr val="bg1">
-              <a:lumMod val="65000"/>
-              <a:lumOff val="35000"/>
-            </a:schemeClr>
-          </a:solidFill>
-          <a:ln>
-            <a:noFill/>
-          </a:ln>
-        </p:spPr>
-        <p:style>
-          <a:lnRef idx="1">
-            <a:schemeClr val="accent1"/>
-          </a:lnRef>
-          <a:fillRef idx="3">
-            <a:schemeClr val="accent1"/>
-          </a:fillRef>
-          <a:effectRef idx="2">
-            <a:schemeClr val="accent1"/>
-          </a:effectRef>
-          <a:fontRef idx="minor">
-            <a:schemeClr val="lt1"/>
-          </a:fontRef>
-        </p:style>
-        <p:txBody>
-          <a:bodyPr rtlCol="0" anchor="ctr"/>
-          <a:lstStyle/>
-          <a:p>
-            <a:pPr algn="ctr"/>
-            <a:r>
-              <a:rPr lang="en-US" dirty="0" smtClean="0">
-                <a:latin typeface="Segoe Light"/>
-                <a:cs typeface="Segoe Light"/>
-              </a:rPr>
-              <a:t>~30 </a:t>
-            </a:r>
-            <a:r>
-              <a:rPr lang="en-US" dirty="0" err="1" smtClean="0">
-                <a:latin typeface="Segoe Light"/>
-                <a:cs typeface="Segoe Light"/>
-              </a:rPr>
-              <a:t>ms</a:t>
-            </a:r>
-            <a:endParaRPr lang="en-US" dirty="0">
-              <a:latin typeface="Segoe Light"/>
-              <a:cs typeface="Segoe Light"/>
-            </a:endParaRPr>
-          </a:p>
-        </p:txBody>
-      </p:sp>
-      <p:sp>
-        <p:nvSpPr>
-          <p:cNvPr id="46" name="Rectangle 45"/>
-          <p:cNvSpPr/>
-          <p:nvPr/>
-        </p:nvSpPr>
-        <p:spPr>
-          <a:xfrm>
-            <a:off x="8019974" y="584944"/>
-            <a:ext cx="1044185" cy="384246"/>
-          </a:xfrm>
-          <a:prstGeom prst="rect">
-            <a:avLst/>
-          </a:prstGeom>
-          <a:solidFill>
-            <a:schemeClr val="bg1">
-              <a:lumMod val="65000"/>
-              <a:lumOff val="35000"/>
-            </a:schemeClr>
-          </a:solidFill>
-          <a:ln>
-            <a:noFill/>
-          </a:ln>
-        </p:spPr>
-        <p:style>
-          <a:lnRef idx="1">
-            <a:schemeClr val="accent1"/>
-          </a:lnRef>
-          <a:fillRef idx="3">
-            <a:schemeClr val="accent1"/>
-          </a:fillRef>
-          <a:effectRef idx="2">
-            <a:schemeClr val="accent1"/>
-          </a:effectRef>
-          <a:fontRef idx="minor">
-            <a:schemeClr val="lt1"/>
-          </a:fontRef>
-        </p:style>
-        <p:txBody>
-          <a:bodyPr rtlCol="0" anchor="ctr"/>
-          <a:lstStyle/>
-          <a:p>
-            <a:pPr algn="ctr"/>
-            <a:r>
-              <a:rPr lang="en-US" dirty="0" smtClean="0">
-                <a:latin typeface="Segoe Light"/>
-                <a:cs typeface="Segoe Light"/>
-              </a:rPr>
-              <a:t>~30 </a:t>
-            </a:r>
-            <a:r>
-              <a:rPr lang="en-US" dirty="0" err="1" smtClean="0">
-                <a:latin typeface="Segoe Light"/>
-                <a:cs typeface="Segoe Light"/>
-              </a:rPr>
-              <a:t>ms</a:t>
-            </a:r>
-            <a:endParaRPr lang="en-US" dirty="0">
-              <a:latin typeface="Segoe Light"/>
-              <a:cs typeface="Segoe Light"/>
-            </a:endParaRPr>
-          </a:p>
-        </p:txBody>
-      </p:sp>
-      <p:sp>
-        <p:nvSpPr>
-          <p:cNvPr id="47" name="Rectangle 46"/>
-          <p:cNvSpPr/>
-          <p:nvPr/>
-        </p:nvSpPr>
-        <p:spPr>
-          <a:xfrm>
-            <a:off x="8019975" y="1462745"/>
-            <a:ext cx="1044186" cy="868599"/>
-          </a:xfrm>
-          <a:prstGeom prst="rect">
-            <a:avLst/>
-          </a:prstGeom>
-          <a:solidFill>
-            <a:schemeClr val="bg1">
-              <a:lumMod val="65000"/>
-              <a:lumOff val="35000"/>
-            </a:schemeClr>
-          </a:solidFill>
-          <a:ln>
-            <a:noFill/>
-          </a:ln>
-        </p:spPr>
-        <p:style>
-          <a:lnRef idx="1">
-            <a:schemeClr val="accent1"/>
-          </a:lnRef>
-          <a:fillRef idx="3">
-            <a:schemeClr val="accent1"/>
-          </a:fillRef>
-          <a:effectRef idx="2">
-            <a:schemeClr val="accent1"/>
-          </a:effectRef>
-          <a:fontRef idx="minor">
-            <a:schemeClr val="lt1"/>
-          </a:fontRef>
-        </p:style>
-        <p:txBody>
-          <a:bodyPr rtlCol="0" anchor="ctr"/>
-          <a:lstStyle/>
-          <a:p>
-            <a:pPr algn="ctr"/>
-            <a:r>
-              <a:rPr lang="en-US" dirty="0" smtClean="0">
-                <a:latin typeface="Segoe Light"/>
-                <a:cs typeface="Segoe Light"/>
-              </a:rPr>
-              <a:t>~30 </a:t>
-            </a:r>
-            <a:r>
-              <a:rPr lang="en-US" dirty="0" err="1" smtClean="0">
-                <a:latin typeface="Segoe Light"/>
-                <a:cs typeface="Segoe Light"/>
-              </a:rPr>
-              <a:t>ms</a:t>
-            </a:r>
-            <a:endParaRPr lang="en-US" dirty="0">
-              <a:latin typeface="Segoe Light"/>
-              <a:cs typeface="Segoe Light"/>
-            </a:endParaRPr>
-          </a:p>
-        </p:txBody>
-      </p:sp>
-      <p:sp>
-        <p:nvSpPr>
-          <p:cNvPr id="48" name="Rectangle 47"/>
-          <p:cNvSpPr/>
-          <p:nvPr/>
-        </p:nvSpPr>
-        <p:spPr>
-          <a:xfrm>
-            <a:off x="8019974" y="2389112"/>
-            <a:ext cx="1044186" cy="384246"/>
-          </a:xfrm>
-          <a:prstGeom prst="rect">
-            <a:avLst/>
-          </a:prstGeom>
-          <a:solidFill>
-            <a:schemeClr val="bg1">
-              <a:lumMod val="65000"/>
-              <a:lumOff val="35000"/>
-            </a:schemeClr>
-          </a:solidFill>
-          <a:ln>
-            <a:noFill/>
-          </a:ln>
-        </p:spPr>
-        <p:style>
-          <a:lnRef idx="1">
-            <a:schemeClr val="accent1"/>
-          </a:lnRef>
-          <a:fillRef idx="3">
-            <a:schemeClr val="accent1"/>
-          </a:fillRef>
-          <a:effectRef idx="2">
-            <a:schemeClr val="accent1"/>
-          </a:effectRef>
-          <a:fontRef idx="minor">
-            <a:schemeClr val="lt1"/>
-          </a:fontRef>
-        </p:style>
-        <p:txBody>
-          <a:bodyPr rtlCol="0" anchor="ctr"/>
-          <a:lstStyle/>
-          <a:p>
-            <a:pPr algn="ctr"/>
-            <a:r>
-              <a:rPr lang="en-US" dirty="0" smtClean="0">
-                <a:latin typeface="Segoe Light"/>
-                <a:cs typeface="Segoe Light"/>
-              </a:rPr>
-              <a:t>~30 </a:t>
-            </a:r>
-            <a:r>
-              <a:rPr lang="en-US" dirty="0" err="1" smtClean="0">
-                <a:latin typeface="Segoe Light"/>
-                <a:cs typeface="Segoe Light"/>
-              </a:rPr>
-              <a:t>ms</a:t>
-            </a:r>
-            <a:endParaRPr lang="en-US" dirty="0">
-              <a:latin typeface="Segoe Light"/>
-              <a:cs typeface="Segoe Light"/>
-            </a:endParaRPr>
-          </a:p>
-        </p:txBody>
-      </p:sp>
-      <p:sp>
-        <p:nvSpPr>
-          <p:cNvPr id="49" name="Rectangle 48"/>
-          <p:cNvSpPr/>
-          <p:nvPr/>
-        </p:nvSpPr>
-        <p:spPr>
-          <a:xfrm>
-            <a:off x="8019975" y="2836355"/>
-            <a:ext cx="1044186" cy="384246"/>
-          </a:xfrm>
-          <a:prstGeom prst="rect">
-            <a:avLst/>
-          </a:prstGeom>
-          <a:solidFill>
-            <a:schemeClr val="bg1">
-              <a:lumMod val="65000"/>
-              <a:lumOff val="35000"/>
-            </a:schemeClr>
-          </a:solidFill>
-          <a:ln>
-            <a:noFill/>
-          </a:ln>
-        </p:spPr>
-        <p:style>
-          <a:lnRef idx="1">
-            <a:schemeClr val="accent1"/>
-          </a:lnRef>
-          <a:fillRef idx="3">
-            <a:schemeClr val="accent1"/>
-          </a:fillRef>
-          <a:effectRef idx="2">
-            <a:schemeClr val="accent1"/>
-          </a:effectRef>
-          <a:fontRef idx="minor">
-            <a:schemeClr val="lt1"/>
-          </a:fontRef>
-        </p:style>
-        <p:txBody>
-          <a:bodyPr rtlCol="0" anchor="ctr"/>
-          <a:lstStyle/>
-          <a:p>
-            <a:pPr algn="ctr"/>
-            <a:r>
-              <a:rPr lang="en-US" dirty="0" smtClean="0">
-                <a:latin typeface="Segoe Light"/>
-                <a:cs typeface="Segoe Light"/>
-              </a:rPr>
-              <a:t>~30 </a:t>
-            </a:r>
-            <a:r>
-              <a:rPr lang="en-US" dirty="0" err="1" smtClean="0">
-                <a:latin typeface="Segoe Light"/>
-                <a:cs typeface="Segoe Light"/>
-              </a:rPr>
-              <a:t>ms</a:t>
-            </a:r>
-            <a:endParaRPr lang="en-US" dirty="0">
-              <a:latin typeface="Segoe Light"/>
-              <a:cs typeface="Segoe Light"/>
-            </a:endParaRPr>
-          </a:p>
-        </p:txBody>
-      </p:sp>
-      <p:sp>
-        <p:nvSpPr>
-          <p:cNvPr id="50" name="Rectangle 49"/>
-          <p:cNvSpPr/>
-          <p:nvPr/>
-        </p:nvSpPr>
-        <p:spPr>
-          <a:xfrm>
-            <a:off x="8019975" y="3286342"/>
-            <a:ext cx="1044186" cy="384246"/>
-          </a:xfrm>
-          <a:prstGeom prst="rect">
-            <a:avLst/>
-          </a:prstGeom>
-          <a:solidFill>
-            <a:schemeClr val="bg1">
-              <a:lumMod val="65000"/>
-              <a:lumOff val="35000"/>
-            </a:schemeClr>
-          </a:solidFill>
-          <a:ln>
-            <a:noFill/>
-          </a:ln>
-        </p:spPr>
-        <p:style>
-          <a:lnRef idx="1">
-            <a:schemeClr val="accent1"/>
-          </a:lnRef>
-          <a:fillRef idx="3">
-            <a:schemeClr val="accent1"/>
-          </a:fillRef>
-          <a:effectRef idx="2">
-            <a:schemeClr val="accent1"/>
-          </a:effectRef>
-          <a:fontRef idx="minor">
-            <a:schemeClr val="lt1"/>
-          </a:fontRef>
-        </p:style>
-        <p:txBody>
-          <a:bodyPr rtlCol="0" anchor="ctr"/>
-          <a:lstStyle/>
-          <a:p>
-            <a:pPr algn="ctr"/>
-            <a:r>
-              <a:rPr lang="en-US" dirty="0" smtClean="0">
-                <a:latin typeface="Segoe Light"/>
-                <a:cs typeface="Segoe Light"/>
-              </a:rPr>
-              <a:t>~30 </a:t>
-            </a:r>
-            <a:r>
-              <a:rPr lang="en-US" dirty="0" err="1" smtClean="0">
-                <a:latin typeface="Segoe Light"/>
-                <a:cs typeface="Segoe Light"/>
-              </a:rPr>
-              <a:t>ms</a:t>
-            </a:r>
-            <a:endParaRPr lang="en-US" dirty="0">
-              <a:latin typeface="Segoe Light"/>
-              <a:cs typeface="Segoe Light"/>
-            </a:endParaRPr>
-          </a:p>
-        </p:txBody>
-      </p:sp>
-      <p:sp>
-        <p:nvSpPr>
-          <p:cNvPr id="51" name="Rectangle 50"/>
-          <p:cNvSpPr/>
-          <p:nvPr/>
-        </p:nvSpPr>
-        <p:spPr>
-          <a:xfrm>
-            <a:off x="8019975" y="3735576"/>
-            <a:ext cx="1044186" cy="384246"/>
-          </a:xfrm>
-          <a:prstGeom prst="rect">
-            <a:avLst/>
-          </a:prstGeom>
-          <a:solidFill>
-            <a:schemeClr val="bg1">
-              <a:lumMod val="65000"/>
-              <a:lumOff val="35000"/>
-            </a:schemeClr>
-          </a:solidFill>
-          <a:ln>
-            <a:noFill/>
-          </a:ln>
-        </p:spPr>
-        <p:style>
-          <a:lnRef idx="1">
-            <a:schemeClr val="accent1"/>
-          </a:lnRef>
-          <a:fillRef idx="3">
-            <a:schemeClr val="accent1"/>
-          </a:fillRef>
-          <a:effectRef idx="2">
-            <a:schemeClr val="accent1"/>
-          </a:effectRef>
-          <a:fontRef idx="minor">
-            <a:schemeClr val="lt1"/>
-          </a:fontRef>
-        </p:style>
-        <p:txBody>
-          <a:bodyPr rtlCol="0" anchor="ctr"/>
-          <a:lstStyle/>
-          <a:p>
-            <a:pPr algn="ctr"/>
-            <a:r>
-              <a:rPr lang="en-US" dirty="0" smtClean="0">
-                <a:latin typeface="Segoe Light"/>
-                <a:cs typeface="Segoe Light"/>
-              </a:rPr>
-              <a:t>~40 </a:t>
-            </a:r>
-            <a:r>
-              <a:rPr lang="en-US" dirty="0" err="1" smtClean="0">
-                <a:latin typeface="Segoe Light"/>
-                <a:cs typeface="Segoe Light"/>
-              </a:rPr>
-              <a:t>ms</a:t>
-            </a:r>
-            <a:endParaRPr lang="en-US" dirty="0">
-              <a:latin typeface="Segoe Light"/>
-              <a:cs typeface="Segoe Light"/>
-            </a:endParaRPr>
-          </a:p>
-        </p:txBody>
-      </p:sp>
-      <p:sp>
-        <p:nvSpPr>
-          <p:cNvPr id="52" name="Rectangle 51"/>
-          <p:cNvSpPr/>
-          <p:nvPr/>
-        </p:nvSpPr>
-        <p:spPr>
-          <a:xfrm>
-            <a:off x="8019974" y="4169976"/>
-            <a:ext cx="1044186" cy="850358"/>
-          </a:xfrm>
-          <a:prstGeom prst="rect">
-            <a:avLst/>
-          </a:prstGeom>
-          <a:solidFill>
-            <a:schemeClr val="bg1">
-              <a:lumMod val="65000"/>
-              <a:lumOff val="35000"/>
-            </a:schemeClr>
-          </a:solidFill>
-          <a:ln>
-            <a:noFill/>
-          </a:ln>
-        </p:spPr>
-        <p:style>
-          <a:lnRef idx="1">
-            <a:schemeClr val="accent1"/>
-          </a:lnRef>
-          <a:fillRef idx="3">
-            <a:schemeClr val="accent1"/>
-          </a:fillRef>
-          <a:effectRef idx="2">
-            <a:schemeClr val="accent1"/>
-          </a:effectRef>
-          <a:fontRef idx="minor">
-            <a:schemeClr val="lt1"/>
-          </a:fontRef>
-        </p:style>
-        <p:txBody>
-          <a:bodyPr rtlCol="0" anchor="ctr"/>
-          <a:lstStyle/>
-          <a:p>
-            <a:pPr algn="ctr"/>
-            <a:r>
-              <a:rPr lang="en-US" dirty="0">
-                <a:latin typeface="Segoe Light"/>
-                <a:cs typeface="Segoe Light"/>
-              </a:rPr>
-              <a:t>40 </a:t>
-            </a:r>
-            <a:r>
-              <a:rPr lang="en-US" dirty="0" err="1">
-                <a:latin typeface="Segoe Light"/>
-                <a:cs typeface="Segoe Light"/>
-              </a:rPr>
-              <a:t>ms</a:t>
-            </a:r>
-            <a:r>
-              <a:rPr lang="en-US" dirty="0">
-                <a:latin typeface="Segoe Light"/>
-                <a:cs typeface="Segoe Light"/>
-              </a:rPr>
-              <a:t> -</a:t>
-            </a:r>
-          </a:p>
-          <a:p>
-            <a:pPr algn="ctr"/>
-            <a:r>
-              <a:rPr lang="en-US" dirty="0">
-                <a:latin typeface="Segoe Light"/>
-                <a:cs typeface="Segoe Light"/>
-              </a:rPr>
-              <a:t>100 </a:t>
-            </a:r>
-            <a:r>
-              <a:rPr lang="en-US" dirty="0" err="1">
-                <a:latin typeface="Segoe Light"/>
-                <a:cs typeface="Segoe Light"/>
-              </a:rPr>
-              <a:t>ms</a:t>
-            </a:r>
-            <a:endParaRPr lang="en-US" dirty="0">
-              <a:latin typeface="Segoe Light"/>
-              <a:cs typeface="Segoe Light"/>
-            </a:endParaRPr>
-          </a:p>
-        </p:txBody>
-      </p:sp>
-      <p:sp>
-        <p:nvSpPr>
-          <p:cNvPr id="53" name="Rectangle 52"/>
-          <p:cNvSpPr/>
-          <p:nvPr/>
-        </p:nvSpPr>
-        <p:spPr>
-          <a:xfrm>
-            <a:off x="8019975" y="5077542"/>
-            <a:ext cx="1044186" cy="1158303"/>
-          </a:xfrm>
-          <a:prstGeom prst="rect">
-            <a:avLst/>
-          </a:prstGeom>
-          <a:solidFill>
-            <a:schemeClr val="bg1">
-              <a:lumMod val="65000"/>
-              <a:lumOff val="35000"/>
-            </a:schemeClr>
-          </a:solidFill>
-          <a:ln>
-            <a:noFill/>
-          </a:ln>
-        </p:spPr>
-        <p:style>
-          <a:lnRef idx="1">
-            <a:schemeClr val="accent1"/>
-          </a:lnRef>
-          <a:fillRef idx="3">
-            <a:schemeClr val="accent1"/>
-          </a:fillRef>
-          <a:effectRef idx="2">
-            <a:schemeClr val="accent1"/>
-          </a:effectRef>
-          <a:fontRef idx="minor">
-            <a:schemeClr val="lt1"/>
-          </a:fontRef>
-        </p:style>
-        <p:txBody>
-          <a:bodyPr rtlCol="0" anchor="ctr"/>
-          <a:lstStyle/>
-          <a:p>
-            <a:pPr algn="ctr"/>
-            <a:r>
-              <a:rPr lang="en-US" dirty="0" smtClean="0">
-                <a:latin typeface="Segoe Light"/>
-                <a:cs typeface="Segoe Light"/>
-              </a:rPr>
-              <a:t>40 </a:t>
-            </a:r>
-            <a:r>
-              <a:rPr lang="en-US" dirty="0" err="1" smtClean="0">
-                <a:latin typeface="Segoe Light"/>
-                <a:cs typeface="Segoe Light"/>
-              </a:rPr>
-              <a:t>ms</a:t>
-            </a:r>
-            <a:r>
-              <a:rPr lang="en-US" dirty="0" smtClean="0">
-                <a:latin typeface="Segoe Light"/>
-                <a:cs typeface="Segoe Light"/>
-              </a:rPr>
-              <a:t> -</a:t>
-            </a:r>
-          </a:p>
-          <a:p>
-            <a:pPr algn="ctr"/>
-            <a:r>
-              <a:rPr lang="en-US" dirty="0" smtClean="0">
-                <a:latin typeface="Segoe Light"/>
-                <a:cs typeface="Segoe Light"/>
-              </a:rPr>
-              <a:t>100 </a:t>
-            </a:r>
-            <a:r>
-              <a:rPr lang="en-US" dirty="0" err="1" smtClean="0">
-                <a:latin typeface="Segoe Light"/>
-                <a:cs typeface="Segoe Light"/>
-              </a:rPr>
-              <a:t>ms</a:t>
-            </a:r>
-            <a:endParaRPr lang="en-US" dirty="0">
-              <a:latin typeface="Segoe Light"/>
-              <a:cs typeface="Segoe Light"/>
-            </a:endParaRPr>
-          </a:p>
-        </p:txBody>
-      </p:sp>
-      <p:sp>
-        <p:nvSpPr>
-          <p:cNvPr id="55" name="Rectangle 54"/>
-          <p:cNvSpPr/>
-          <p:nvPr/>
-        </p:nvSpPr>
-        <p:spPr>
-          <a:xfrm>
-            <a:off x="5069430" y="6305292"/>
-            <a:ext cx="3994729" cy="407270"/>
-          </a:xfrm>
-          <a:prstGeom prst="rect">
-            <a:avLst/>
-          </a:prstGeom>
-          <a:solidFill>
-            <a:schemeClr val="bg1">
-              <a:lumMod val="65000"/>
-              <a:lumOff val="35000"/>
-            </a:schemeClr>
-          </a:solidFill>
-          <a:ln>
-            <a:noFill/>
-          </a:ln>
-        </p:spPr>
-        <p:style>
-          <a:lnRef idx="1">
-            <a:schemeClr val="accent1"/>
-          </a:lnRef>
-          <a:fillRef idx="3">
-            <a:schemeClr val="accent1"/>
-          </a:fillRef>
-          <a:effectRef idx="2">
-            <a:schemeClr val="accent1"/>
-          </a:effectRef>
-          <a:fontRef idx="minor">
-            <a:schemeClr val="lt1"/>
-          </a:fontRef>
-        </p:style>
-        <p:txBody>
-          <a:bodyPr rtlCol="0" anchor="ctr"/>
-          <a:lstStyle/>
-          <a:p>
-            <a:pPr algn="ctr"/>
-            <a:r>
-              <a:rPr lang="en-US" dirty="0" smtClean="0">
-                <a:latin typeface="Segoe Light"/>
-                <a:cs typeface="Segoe Light"/>
-              </a:rPr>
-              <a:t>Possibly Internet….  50 </a:t>
-            </a:r>
-            <a:r>
-              <a:rPr lang="en-US" dirty="0" err="1" smtClean="0">
-                <a:latin typeface="Segoe Light"/>
-                <a:cs typeface="Segoe Light"/>
-              </a:rPr>
-              <a:t>ms</a:t>
-            </a:r>
-            <a:r>
-              <a:rPr lang="en-US" dirty="0" smtClean="0">
-                <a:latin typeface="Segoe Light"/>
-                <a:cs typeface="Segoe Light"/>
-              </a:rPr>
-              <a:t> – 200 </a:t>
-            </a:r>
-            <a:r>
-              <a:rPr lang="en-US" dirty="0" err="1" smtClean="0">
-                <a:latin typeface="Segoe Light"/>
-                <a:cs typeface="Segoe Light"/>
-              </a:rPr>
-              <a:t>ms</a:t>
-            </a:r>
-            <a:endParaRPr lang="en-US" dirty="0">
-              <a:latin typeface="Segoe Light"/>
-              <a:cs typeface="Segoe Light"/>
-            </a:endParaRPr>
-          </a:p>
-        </p:txBody>
-      </p:sp>
+      </p:pic>
     </p:spTree>
     <p:extLst>
       <p:ext uri="{BB962C8B-B14F-4D97-AF65-F5344CB8AC3E}">
@@ -9288,7 +9322,120 @@
   <p:timing>
     <p:tnLst>
       <p:par>
-        <p:cTn xmlns:p14="http://schemas.microsoft.com/office/powerpoint/2010/main" id="1" dur="indefinite" restart="never" nodeType="tmRoot"/>
+        <p:cTn xmlns:p14="http://schemas.microsoft.com/office/powerpoint/2010/main" id="1" dur="indefinite" restart="never" nodeType="tmRoot">
+          <p:childTnLst>
+            <p:seq concurrent="1" nextAc="seek">
+              <p:cTn id="2" dur="indefinite" nodeType="mainSeq">
+                <p:childTnLst>
+                  <p:par>
+                    <p:cTn id="3" fill="hold">
+                      <p:stCondLst>
+                        <p:cond delay="indefinite"/>
+                      </p:stCondLst>
+                      <p:childTnLst>
+                        <p:par>
+                          <p:cTn id="4" fill="hold">
+                            <p:stCondLst>
+                              <p:cond delay="0"/>
+                            </p:stCondLst>
+                            <p:childTnLst>
+                              <p:par>
+                                <p:cTn id="5" presetID="1" presetClass="entr" presetSubtype="0" fill="hold" nodeType="clickEffect">
+                                  <p:stCondLst>
+                                    <p:cond delay="0"/>
+                                  </p:stCondLst>
+                                  <p:childTnLst>
+                                    <p:set>
+                                      <p:cBhvr>
+                                        <p:cTn id="6" dur="1" fill="hold">
+                                          <p:stCondLst>
+                                            <p:cond delay="0"/>
+                                          </p:stCondLst>
+                                        </p:cTn>
+                                        <p:tgtEl>
+                                          <p:spTgt spid="8"/>
+                                        </p:tgtEl>
+                                        <p:attrNameLst>
+                                          <p:attrName>style.visibility</p:attrName>
+                                        </p:attrNameLst>
+                                      </p:cBhvr>
+                                      <p:to>
+                                        <p:strVal val="visible"/>
+                                      </p:to>
+                                    </p:set>
+                                  </p:childTnLst>
+                                </p:cTn>
+                              </p:par>
+                            </p:childTnLst>
+                          </p:cTn>
+                        </p:par>
+                      </p:childTnLst>
+                    </p:cTn>
+                  </p:par>
+                  <p:par>
+                    <p:cTn id="7" fill="hold">
+                      <p:stCondLst>
+                        <p:cond delay="indefinite"/>
+                      </p:stCondLst>
+                      <p:childTnLst>
+                        <p:par>
+                          <p:cTn id="8" fill="hold">
+                            <p:stCondLst>
+                              <p:cond delay="0"/>
+                            </p:stCondLst>
+                            <p:childTnLst>
+                              <p:par>
+                                <p:cTn id="9" presetID="1" presetClass="entr" presetSubtype="0" fill="hold" nodeType="clickEffect">
+                                  <p:stCondLst>
+                                    <p:cond delay="0"/>
+                                  </p:stCondLst>
+                                  <p:childTnLst>
+                                    <p:set>
+                                      <p:cBhvr>
+                                        <p:cTn id="10" dur="1" fill="hold">
+                                          <p:stCondLst>
+                                            <p:cond delay="0"/>
+                                          </p:stCondLst>
+                                        </p:cTn>
+                                        <p:tgtEl>
+                                          <p:spTgt spid="7"/>
+                                        </p:tgtEl>
+                                        <p:attrNameLst>
+                                          <p:attrName>style.visibility</p:attrName>
+                                        </p:attrNameLst>
+                                      </p:cBhvr>
+                                      <p:to>
+                                        <p:strVal val="visible"/>
+                                      </p:to>
+                                    </p:set>
+                                  </p:childTnLst>
+                                </p:cTn>
+                              </p:par>
+                            </p:childTnLst>
+                          </p:cTn>
+                        </p:par>
+                      </p:childTnLst>
+                    </p:cTn>
+                  </p:par>
+                </p:childTnLst>
+              </p:cTn>
+              <p:prevCondLst>
+                <p:cond evt="onPrev" delay="0">
+                  <p:tgtEl>
+                    <p:sldTgt/>
+                  </p:tgtEl>
+                </p:cond>
+              </p:prevCondLst>
+              <p:nextCondLst>
+                <p:cond evt="onNext" delay="0">
+                  <p:tgtEl>
+                    <p:sldTgt/>
+                  </p:tgtEl>
+                </p:cond>
+              </p:nextCondLst>
+            </p:seq>
+          </p:childTnLst>
+        </p:cTn>
       </p:par>
     </p:tnLst>
   </p:timing>

</xml_diff>

<commit_message>
ahir added texts before presentation
</commit_message>
<xml_diff>
--- a/doc/MidTerm/MidTerm.pptx
+++ b/doc/MidTerm/MidTerm.pptx
@@ -200,7 +200,7 @@
           <a:p>
             <a:fld id="{A6609C19-3333-F748-BFA8-3DC416911B5B}" type="datetimeFigureOut">
               <a:rPr lang="en-US" smtClean="0"/>
-              <a:t>4/2/13</a:t>
+              <a:t>4/3/13</a:t>
             </a:fld>
             <a:endParaRPr lang="en-US"/>
           </a:p>
@@ -830,6 +830,39 @@
           <a:p>
             <a:endParaRPr lang="en-US" dirty="0"/>
           </a:p>
+          <a:p>
+            <a:r>
+              <a:rPr lang="en-US" dirty="0"/>
+              <a:t>----- Meeting Notes (4/3/13 13:22) -----</a:t>
+            </a:r>
+          </a:p>
+          <a:p>
+            <a:r>
+              <a:rPr lang="en-US" dirty="0"/>
+              <a:t>WAN</a:t>
+            </a:r>
+          </a:p>
+          <a:p>
+            <a:r>
+              <a:rPr lang="en-US" dirty="0"/>
+              <a:t>Use Turbo king to test a wide range of networks</a:t>
+            </a:r>
+          </a:p>
+          <a:p>
+            <a:endParaRPr lang="en-US" dirty="0"/>
+          </a:p>
+          <a:p>
+            <a:r>
+              <a:rPr lang="en-US" dirty="0"/>
+              <a:t>Mobile</a:t>
+            </a:r>
+          </a:p>
+          <a:p>
+            <a:r>
+              <a:rPr lang="en-US" dirty="0"/>
+              <a:t>We are limited by the fact there there is not a distributed network of wireless nodes that we can use for testing. So instead we are looking to better understand the latency of the networks we have access</a:t>
+            </a:r>
+          </a:p>
         </p:txBody>
       </p:sp>
       <p:sp>
@@ -1416,7 +1449,7 @@
           <a:p>
             <a:fld id="{6B35E7C1-0930-394A-BB48-132AAC6FC298}" type="datetimeFigureOut">
               <a:rPr lang="en-US" smtClean="0"/>
-              <a:t>4/2/13</a:t>
+              <a:t>4/3/13</a:t>
             </a:fld>
             <a:endParaRPr lang="en-US"/>
           </a:p>
@@ -1586,7 +1619,7 @@
           <a:p>
             <a:fld id="{6B35E7C1-0930-394A-BB48-132AAC6FC298}" type="datetimeFigureOut">
               <a:rPr lang="en-US" smtClean="0"/>
-              <a:t>4/2/13</a:t>
+              <a:t>4/3/13</a:t>
             </a:fld>
             <a:endParaRPr lang="en-US"/>
           </a:p>
@@ -1766,7 +1799,7 @@
           <a:p>
             <a:fld id="{6B35E7C1-0930-394A-BB48-132AAC6FC298}" type="datetimeFigureOut">
               <a:rPr lang="en-US" smtClean="0"/>
-              <a:t>4/2/13</a:t>
+              <a:t>4/3/13</a:t>
             </a:fld>
             <a:endParaRPr lang="en-US"/>
           </a:p>
@@ -1936,7 +1969,7 @@
           <a:p>
             <a:fld id="{6B35E7C1-0930-394A-BB48-132AAC6FC298}" type="datetimeFigureOut">
               <a:rPr lang="en-US" smtClean="0"/>
-              <a:t>4/2/13</a:t>
+              <a:t>4/3/13</a:t>
             </a:fld>
             <a:endParaRPr lang="en-US"/>
           </a:p>
@@ -2182,7 +2215,7 @@
           <a:p>
             <a:fld id="{6B35E7C1-0930-394A-BB48-132AAC6FC298}" type="datetimeFigureOut">
               <a:rPr lang="en-US" smtClean="0"/>
-              <a:t>4/2/13</a:t>
+              <a:t>4/3/13</a:t>
             </a:fld>
             <a:endParaRPr lang="en-US"/>
           </a:p>
@@ -2470,7 +2503,7 @@
           <a:p>
             <a:fld id="{6B35E7C1-0930-394A-BB48-132AAC6FC298}" type="datetimeFigureOut">
               <a:rPr lang="en-US" smtClean="0"/>
-              <a:t>4/2/13</a:t>
+              <a:t>4/3/13</a:t>
             </a:fld>
             <a:endParaRPr lang="en-US"/>
           </a:p>
@@ -2892,7 +2925,7 @@
           <a:p>
             <a:fld id="{6B35E7C1-0930-394A-BB48-132AAC6FC298}" type="datetimeFigureOut">
               <a:rPr lang="en-US" smtClean="0"/>
-              <a:t>4/2/13</a:t>
+              <a:t>4/3/13</a:t>
             </a:fld>
             <a:endParaRPr lang="en-US"/>
           </a:p>
@@ -3010,7 +3043,7 @@
           <a:p>
             <a:fld id="{6B35E7C1-0930-394A-BB48-132AAC6FC298}" type="datetimeFigureOut">
               <a:rPr lang="en-US" smtClean="0"/>
-              <a:t>4/2/13</a:t>
+              <a:t>4/3/13</a:t>
             </a:fld>
             <a:endParaRPr lang="en-US"/>
           </a:p>
@@ -3105,7 +3138,7 @@
           <a:p>
             <a:fld id="{6B35E7C1-0930-394A-BB48-132AAC6FC298}" type="datetimeFigureOut">
               <a:rPr lang="en-US" smtClean="0"/>
-              <a:t>4/2/13</a:t>
+              <a:t>4/3/13</a:t>
             </a:fld>
             <a:endParaRPr lang="en-US"/>
           </a:p>
@@ -3382,7 +3415,7 @@
           <a:p>
             <a:fld id="{6B35E7C1-0930-394A-BB48-132AAC6FC298}" type="datetimeFigureOut">
               <a:rPr lang="en-US" smtClean="0"/>
-              <a:t>4/2/13</a:t>
+              <a:t>4/3/13</a:t>
             </a:fld>
             <a:endParaRPr lang="en-US"/>
           </a:p>
@@ -3639,7 +3672,7 @@
           <a:p>
             <a:fld id="{6B35E7C1-0930-394A-BB48-132AAC6FC298}" type="datetimeFigureOut">
               <a:rPr lang="en-US" smtClean="0"/>
-              <a:t>4/2/13</a:t>
+              <a:t>4/3/13</a:t>
             </a:fld>
             <a:endParaRPr lang="en-US"/>
           </a:p>
@@ -3858,7 +3891,7 @@
           <a:p>
             <a:fld id="{6B35E7C1-0930-394A-BB48-132AAC6FC298}" type="datetimeFigureOut">
               <a:rPr lang="en-US" smtClean="0"/>
-              <a:t>4/2/13</a:t>
+              <a:t>4/3/13</a:t>
             </a:fld>
             <a:endParaRPr lang="en-US"/>
           </a:p>
@@ -8596,14 +8629,7 @@
                   <a:latin typeface="Segoe Light"/>
                   <a:cs typeface="Segoe Light"/>
                 </a:rPr>
-                <a:t>~</a:t>
-              </a:r>
-              <a:r>
-                <a:rPr lang="en-US" dirty="0" smtClean="0">
-                  <a:latin typeface="Segoe Light"/>
-                  <a:cs typeface="Segoe Light"/>
-                </a:rPr>
-                <a:t>35 </a:t>
+                <a:t>~35 </a:t>
               </a:r>
               <a:r>
                 <a:rPr lang="en-US" dirty="0" err="1" smtClean="0">
@@ -8667,14 +8693,7 @@
                   <a:latin typeface="Segoe Light"/>
                   <a:cs typeface="Segoe Light"/>
                 </a:rPr>
-                <a:t>~</a:t>
-              </a:r>
-              <a:r>
-                <a:rPr lang="en-US" dirty="0" smtClean="0">
-                  <a:latin typeface="Segoe Light"/>
-                  <a:cs typeface="Segoe Light"/>
-                </a:rPr>
-                <a:t>35 </a:t>
+                <a:t>~35 </a:t>
               </a:r>
               <a:r>
                 <a:rPr lang="en-US" dirty="0" err="1" smtClean="0">
@@ -8738,14 +8757,7 @@
                   <a:latin typeface="Segoe Light"/>
                   <a:cs typeface="Segoe Light"/>
                 </a:rPr>
-                <a:t>~</a:t>
-              </a:r>
-              <a:r>
-                <a:rPr lang="en-US" dirty="0" smtClean="0">
-                  <a:latin typeface="Segoe Light"/>
-                  <a:cs typeface="Segoe Light"/>
-                </a:rPr>
-                <a:t>35 </a:t>
+                <a:t>~35 </a:t>
               </a:r>
               <a:r>
                 <a:rPr lang="en-US" dirty="0" err="1" smtClean="0">
@@ -8809,14 +8821,7 @@
                   <a:latin typeface="Segoe Light"/>
                   <a:cs typeface="Segoe Light"/>
                 </a:rPr>
-                <a:t>~</a:t>
-              </a:r>
-              <a:r>
-                <a:rPr lang="en-US" dirty="0" smtClean="0">
-                  <a:latin typeface="Segoe Light"/>
-                  <a:cs typeface="Segoe Light"/>
-                </a:rPr>
-                <a:t>35 </a:t>
+                <a:t>~35 </a:t>
               </a:r>
               <a:r>
                 <a:rPr lang="en-US" dirty="0" err="1" smtClean="0">

</xml_diff>